<commit_message>
update gitflow lesson for 2024
</commit_message>
<xml_diff>
--- a/Day1/gitflow.pptx
+++ b/Day1/gitflow.pptx
@@ -9,47 +9,40 @@
   </p:notesMasterIdLst>
   <p:sldIdLst>
     <p:sldId id="256" r:id="rId2"/>
-    <p:sldId id="260" r:id="rId3"/>
-    <p:sldId id="261" r:id="rId4"/>
-    <p:sldId id="265" r:id="rId5"/>
-    <p:sldId id="268" r:id="rId6"/>
-    <p:sldId id="290" r:id="rId7"/>
-    <p:sldId id="272" r:id="rId8"/>
-    <p:sldId id="292" r:id="rId9"/>
-    <p:sldId id="293" r:id="rId10"/>
-    <p:sldId id="274" r:id="rId11"/>
-    <p:sldId id="291" r:id="rId12"/>
-    <p:sldId id="294" r:id="rId13"/>
-    <p:sldId id="289" r:id="rId14"/>
-    <p:sldId id="262" r:id="rId15"/>
-    <p:sldId id="269" r:id="rId16"/>
-    <p:sldId id="270" r:id="rId17"/>
-    <p:sldId id="271" r:id="rId18"/>
-    <p:sldId id="257" r:id="rId19"/>
+    <p:sldId id="257" r:id="rId3"/>
+    <p:sldId id="260" r:id="rId4"/>
+    <p:sldId id="261" r:id="rId5"/>
+    <p:sldId id="265" r:id="rId6"/>
+    <p:sldId id="268" r:id="rId7"/>
+    <p:sldId id="290" r:id="rId8"/>
+    <p:sldId id="272" r:id="rId9"/>
+    <p:sldId id="292" r:id="rId10"/>
+    <p:sldId id="293" r:id="rId11"/>
+    <p:sldId id="274" r:id="rId12"/>
+    <p:sldId id="291" r:id="rId13"/>
+    <p:sldId id="262" r:id="rId14"/>
+    <p:sldId id="294" r:id="rId15"/>
+    <p:sldId id="289" r:id="rId16"/>
+    <p:sldId id="269" r:id="rId17"/>
+    <p:sldId id="270" r:id="rId18"/>
+    <p:sldId id="271" r:id="rId19"/>
   </p:sldIdLst>
   <p:sldSz cx="24384000" cy="13716000"/>
   <p:notesSz cx="6858000" cy="9144000"/>
   <p:embeddedFontLst>
     <p:embeddedFont>
-      <p:font typeface="Calibri" panose="020F0502020204030204" pitchFamily="34" charset="0"/>
+      <p:font typeface="Helvetica Neue" panose="02000503000000020004" pitchFamily="2" charset="0"/>
       <p:regular r:id="rId21"/>
       <p:bold r:id="rId22"/>
       <p:italic r:id="rId23"/>
       <p:boldItalic r:id="rId24"/>
     </p:embeddedFont>
     <p:embeddedFont>
-      <p:font typeface="Helvetica Neue" panose="02000503000000020004" pitchFamily="2" charset="0"/>
+      <p:font typeface="Helvetica Neue Light" panose="02000403000000020004" pitchFamily="2" charset="0"/>
       <p:regular r:id="rId25"/>
       <p:bold r:id="rId26"/>
       <p:italic r:id="rId27"/>
       <p:boldItalic r:id="rId28"/>
-    </p:embeddedFont>
-    <p:embeddedFont>
-      <p:font typeface="Helvetica Neue Light" panose="02000403000000020004" pitchFamily="2" charset="0"/>
-      <p:regular r:id="rId29"/>
-      <p:bold r:id="rId30"/>
-      <p:italic r:id="rId31"/>
-      <p:boldItalic r:id="rId32"/>
     </p:embeddedFont>
   </p:embeddedFontLst>
   <p:defaultTextStyle>
@@ -286,7 +279,7 @@
       <p15:sldGuideLst xmlns:p15="http://schemas.microsoft.com/office/powerpoint/2012/main"/>
     </p:ext>
     <p:ext uri="http://customooxmlschemas.google.com/">
-      <go:slidesCustomData xmlns:go="http://customooxmlschemas.google.com/" xmlns:ahyp="http://schemas.microsoft.com/office/drawing/2018/hyperlinkcolor" xmlns:p15="http://schemas.microsoft.com/office/powerpoint/2012/main" xmlns:p14="http://schemas.microsoft.com/office/powerpoint/2010/main" xmlns:com="http://schemas.openxmlformats.org/drawingml/2006/compatibility" xmlns:pvml="urn:schemas-microsoft-com:office:powerpoint" xmlns:v="urn:schemas-microsoft-com:vml" xmlns:o="urn:schemas-microsoft-com:office:office" xmlns:dgm="http://schemas.openxmlformats.org/drawingml/2006/diagram" xmlns:c="http://schemas.openxmlformats.org/drawingml/2006/chart" xmlns:mv="urn:schemas-microsoft-com:mac:vml" xmlns:mc="http://schemas.openxmlformats.org/markup-compatibility/2006" xmlns="" r:id="rId33" roundtripDataSignature="AMtx7mhACr3GF+oaOhhGKWHfbSq2XX1c1g=="/>
+      <go:slidesCustomData xmlns="" xmlns:mc="http://schemas.openxmlformats.org/markup-compatibility/2006" xmlns:mv="urn:schemas-microsoft-com:mac:vml" xmlns:c="http://schemas.openxmlformats.org/drawingml/2006/chart" xmlns:dgm="http://schemas.openxmlformats.org/drawingml/2006/diagram" xmlns:o="urn:schemas-microsoft-com:office:office" xmlns:v="urn:schemas-microsoft-com:vml" xmlns:pvml="urn:schemas-microsoft-com:office:powerpoint" xmlns:com="http://schemas.openxmlformats.org/drawingml/2006/compatibility" xmlns:p14="http://schemas.microsoft.com/office/powerpoint/2010/main" xmlns:p15="http://schemas.microsoft.com/office/powerpoint/2012/main" xmlns:ahyp="http://schemas.microsoft.com/office/drawing/2018/hyperlinkcolor" xmlns:go="http://customooxmlschemas.google.com/" r:id="rId33" roundtripDataSignature="AMtx7mhACr3GF+oaOhhGKWHfbSq2XX1c1g=="/>
     </p:ext>
   </p:extLst>
 </p:presentation>
@@ -908,6 +901,115 @@
   <p:cSld>
     <p:spTree>
       <p:nvGrpSpPr>
+        <p:cNvPr id="1" name="Shape 96"/>
+        <p:cNvGrpSpPr/>
+        <p:nvPr/>
+      </p:nvGrpSpPr>
+      <p:grpSpPr>
+        <a:xfrm>
+          <a:off x="0" y="0"/>
+          <a:ext cx="0" cy="0"/>
+          <a:chOff x="0" y="0"/>
+          <a:chExt cx="0" cy="0"/>
+        </a:xfrm>
+      </p:grpSpPr>
+      <p:sp>
+        <p:nvSpPr>
+          <p:cNvPr id="97" name="Google Shape;97;p3:notes"/>
+          <p:cNvSpPr txBox="1">
+            <a:spLocks noGrp="1"/>
+          </p:cNvSpPr>
+          <p:nvPr>
+            <p:ph type="body" idx="1"/>
+          </p:nvPr>
+        </p:nvSpPr>
+        <p:spPr>
+          <a:xfrm>
+            <a:off x="914400" y="4343400"/>
+            <a:ext cx="5029200" cy="4114800"/>
+          </a:xfrm>
+          <a:prstGeom prst="rect">
+            <a:avLst/>
+          </a:prstGeom>
+        </p:spPr>
+        <p:txBody>
+          <a:bodyPr spcFirstLastPara="1" wrap="square" lIns="91425" tIns="45700" rIns="91425" bIns="45700" anchor="t" anchorCtr="0">
+            <a:noAutofit/>
+          </a:bodyPr>
+          <a:lstStyle/>
+          <a:p>
+            <a:pPr marL="0" lvl="0" indent="0" algn="l" rtl="0">
+              <a:spcBef>
+                <a:spcPts val="0"/>
+              </a:spcBef>
+              <a:spcAft>
+                <a:spcPts val="0"/>
+              </a:spcAft>
+              <a:buNone/>
+            </a:pPr>
+            <a:endParaRPr dirty="0"/>
+          </a:p>
+        </p:txBody>
+      </p:sp>
+      <p:sp>
+        <p:nvSpPr>
+          <p:cNvPr id="98" name="Google Shape;98;p3:notes"/>
+          <p:cNvSpPr>
+            <a:spLocks noGrp="1" noRot="1" noChangeAspect="1"/>
+          </p:cNvSpPr>
+          <p:nvPr>
+            <p:ph type="sldImg" idx="2"/>
+          </p:nvPr>
+        </p:nvSpPr>
+        <p:spPr>
+          <a:xfrm>
+            <a:off x="381000" y="685800"/>
+            <a:ext cx="6096000" cy="3429000"/>
+          </a:xfrm>
+          <a:custGeom>
+            <a:avLst/>
+            <a:gdLst/>
+            <a:ahLst/>
+            <a:cxnLst/>
+            <a:rect l="l" t="t" r="r" b="b"/>
+            <a:pathLst>
+              <a:path w="120000" h="120000" extrusionOk="0">
+                <a:moveTo>
+                  <a:pt x="0" y="0"/>
+                </a:moveTo>
+                <a:lnTo>
+                  <a:pt x="120000" y="0"/>
+                </a:lnTo>
+                <a:lnTo>
+                  <a:pt x="120000" y="120000"/>
+                </a:lnTo>
+                <a:lnTo>
+                  <a:pt x="0" y="120000"/>
+                </a:lnTo>
+                <a:close/>
+              </a:path>
+            </a:pathLst>
+          </a:custGeom>
+        </p:spPr>
+      </p:sp>
+    </p:spTree>
+    <p:extLst>
+      <p:ext uri="{BB962C8B-B14F-4D97-AF65-F5344CB8AC3E}">
+        <p14:creationId xmlns:p14="http://schemas.microsoft.com/office/powerpoint/2010/main" val="31036007"/>
+      </p:ext>
+    </p:extLst>
+  </p:cSld>
+  <p:clrMapOvr>
+    <a:masterClrMapping/>
+  </p:clrMapOvr>
+</p:notes>
+</file>
+
+<file path=ppt/notesSlides/notesSlide11.xml><?xml version="1.0" encoding="utf-8"?>
+<p:notes xmlns:a="http://schemas.openxmlformats.org/drawingml/2006/main" xmlns:r="http://schemas.openxmlformats.org/officeDocument/2006/relationships" xmlns:p="http://schemas.openxmlformats.org/presentationml/2006/main" showMasterSp="0" showMasterPhAnim="0">
+  <p:cSld>
+    <p:spTree>
+      <p:nvGrpSpPr>
         <p:cNvPr id="1" name="Shape 211"/>
         <p:cNvGrpSpPr/>
         <p:nvPr/>
@@ -1007,7 +1109,7 @@
 </p:notes>
 </file>
 
-<file path=ppt/notesSlides/notesSlide11.xml><?xml version="1.0" encoding="utf-8"?>
+<file path=ppt/notesSlides/notesSlide12.xml><?xml version="1.0" encoding="utf-8"?>
 <p:notes xmlns:a="http://schemas.openxmlformats.org/drawingml/2006/main" xmlns:r="http://schemas.openxmlformats.org/officeDocument/2006/relationships" xmlns:p="http://schemas.openxmlformats.org/presentationml/2006/main" showMasterSp="0" showMasterPhAnim="0">
   <p:cSld>
     <p:spTree>
@@ -1107,115 +1209,6 @@
     <p:extLst>
       <p:ext uri="{BB962C8B-B14F-4D97-AF65-F5344CB8AC3E}">
         <p14:creationId xmlns:p14="http://schemas.microsoft.com/office/powerpoint/2010/main" val="1895333862"/>
-      </p:ext>
-    </p:extLst>
-  </p:cSld>
-  <p:clrMapOvr>
-    <a:masterClrMapping/>
-  </p:clrMapOvr>
-</p:notes>
-</file>
-
-<file path=ppt/notesSlides/notesSlide12.xml><?xml version="1.0" encoding="utf-8"?>
-<p:notes xmlns:a="http://schemas.openxmlformats.org/drawingml/2006/main" xmlns:r="http://schemas.openxmlformats.org/officeDocument/2006/relationships" xmlns:p="http://schemas.openxmlformats.org/presentationml/2006/main" showMasterSp="0" showMasterPhAnim="0">
-  <p:cSld>
-    <p:spTree>
-      <p:nvGrpSpPr>
-        <p:cNvPr id="1" name="Shape 92"/>
-        <p:cNvGrpSpPr/>
-        <p:nvPr/>
-      </p:nvGrpSpPr>
-      <p:grpSpPr>
-        <a:xfrm>
-          <a:off x="0" y="0"/>
-          <a:ext cx="0" cy="0"/>
-          <a:chOff x="0" y="0"/>
-          <a:chExt cx="0" cy="0"/>
-        </a:xfrm>
-      </p:grpSpPr>
-      <p:sp>
-        <p:nvSpPr>
-          <p:cNvPr id="93" name="Google Shape;93;p3:notes"/>
-          <p:cNvSpPr txBox="1">
-            <a:spLocks noGrp="1"/>
-          </p:cNvSpPr>
-          <p:nvPr>
-            <p:ph type="body" idx="1"/>
-          </p:nvPr>
-        </p:nvSpPr>
-        <p:spPr>
-          <a:xfrm>
-            <a:off x="685800" y="4343400"/>
-            <a:ext cx="5486400" cy="4114800"/>
-          </a:xfrm>
-          <a:prstGeom prst="rect">
-            <a:avLst/>
-          </a:prstGeom>
-        </p:spPr>
-        <p:txBody>
-          <a:bodyPr spcFirstLastPara="1" wrap="square" lIns="91425" tIns="91425" rIns="91425" bIns="91425" anchor="t" anchorCtr="0">
-            <a:noAutofit/>
-          </a:bodyPr>
-          <a:lstStyle/>
-          <a:p>
-            <a:pPr marL="0" lvl="0" indent="0" algn="l" rtl="0">
-              <a:spcBef>
-                <a:spcPts val="0"/>
-              </a:spcBef>
-              <a:spcAft>
-                <a:spcPts val="0"/>
-              </a:spcAft>
-              <a:buNone/>
-            </a:pPr>
-            <a:endParaRPr/>
-          </a:p>
-        </p:txBody>
-      </p:sp>
-      <p:sp>
-        <p:nvSpPr>
-          <p:cNvPr id="94" name="Google Shape;94;p3:notes"/>
-          <p:cNvSpPr>
-            <a:spLocks noGrp="1" noRot="1" noChangeAspect="1"/>
-          </p:cNvSpPr>
-          <p:nvPr>
-            <p:ph type="sldImg" idx="2"/>
-          </p:nvPr>
-        </p:nvSpPr>
-        <p:spPr>
-          <a:xfrm>
-            <a:off x="381000" y="685800"/>
-            <a:ext cx="6096000" cy="3429000"/>
-          </a:xfrm>
-          <a:custGeom>
-            <a:avLst/>
-            <a:gdLst/>
-            <a:ahLst/>
-            <a:cxnLst/>
-            <a:rect l="l" t="t" r="r" b="b"/>
-            <a:pathLst>
-              <a:path w="120000" h="120000" extrusionOk="0">
-                <a:moveTo>
-                  <a:pt x="0" y="0"/>
-                </a:moveTo>
-                <a:lnTo>
-                  <a:pt x="120000" y="0"/>
-                </a:lnTo>
-                <a:lnTo>
-                  <a:pt x="120000" y="120000"/>
-                </a:lnTo>
-                <a:lnTo>
-                  <a:pt x="0" y="120000"/>
-                </a:lnTo>
-                <a:close/>
-              </a:path>
-            </a:pathLst>
-          </a:custGeom>
-        </p:spPr>
-      </p:sp>
-    </p:spTree>
-    <p:extLst>
-      <p:ext uri="{BB962C8B-B14F-4D97-AF65-F5344CB8AC3E}">
-        <p14:creationId xmlns:p14="http://schemas.microsoft.com/office/powerpoint/2010/main" val="1796064178"/>
       </p:ext>
     </p:extLst>
   </p:cSld>
@@ -1370,6 +1363,115 @@
   <p:cSld>
     <p:spTree>
       <p:nvGrpSpPr>
+        <p:cNvPr id="1" name="Shape 92"/>
+        <p:cNvGrpSpPr/>
+        <p:nvPr/>
+      </p:nvGrpSpPr>
+      <p:grpSpPr>
+        <a:xfrm>
+          <a:off x="0" y="0"/>
+          <a:ext cx="0" cy="0"/>
+          <a:chOff x="0" y="0"/>
+          <a:chExt cx="0" cy="0"/>
+        </a:xfrm>
+      </p:grpSpPr>
+      <p:sp>
+        <p:nvSpPr>
+          <p:cNvPr id="93" name="Google Shape;93;p3:notes"/>
+          <p:cNvSpPr txBox="1">
+            <a:spLocks noGrp="1"/>
+          </p:cNvSpPr>
+          <p:nvPr>
+            <p:ph type="body" idx="1"/>
+          </p:nvPr>
+        </p:nvSpPr>
+        <p:spPr>
+          <a:xfrm>
+            <a:off x="685800" y="4343400"/>
+            <a:ext cx="5486400" cy="4114800"/>
+          </a:xfrm>
+          <a:prstGeom prst="rect">
+            <a:avLst/>
+          </a:prstGeom>
+        </p:spPr>
+        <p:txBody>
+          <a:bodyPr spcFirstLastPara="1" wrap="square" lIns="91425" tIns="91425" rIns="91425" bIns="91425" anchor="t" anchorCtr="0">
+            <a:noAutofit/>
+          </a:bodyPr>
+          <a:lstStyle/>
+          <a:p>
+            <a:pPr marL="0" lvl="0" indent="0" algn="l" rtl="0">
+              <a:spcBef>
+                <a:spcPts val="0"/>
+              </a:spcBef>
+              <a:spcAft>
+                <a:spcPts val="0"/>
+              </a:spcAft>
+              <a:buNone/>
+            </a:pPr>
+            <a:endParaRPr/>
+          </a:p>
+        </p:txBody>
+      </p:sp>
+      <p:sp>
+        <p:nvSpPr>
+          <p:cNvPr id="94" name="Google Shape;94;p3:notes"/>
+          <p:cNvSpPr>
+            <a:spLocks noGrp="1" noRot="1" noChangeAspect="1"/>
+          </p:cNvSpPr>
+          <p:nvPr>
+            <p:ph type="sldImg" idx="2"/>
+          </p:nvPr>
+        </p:nvSpPr>
+        <p:spPr>
+          <a:xfrm>
+            <a:off x="381000" y="685800"/>
+            <a:ext cx="6096000" cy="3429000"/>
+          </a:xfrm>
+          <a:custGeom>
+            <a:avLst/>
+            <a:gdLst/>
+            <a:ahLst/>
+            <a:cxnLst/>
+            <a:rect l="l" t="t" r="r" b="b"/>
+            <a:pathLst>
+              <a:path w="120000" h="120000" extrusionOk="0">
+                <a:moveTo>
+                  <a:pt x="0" y="0"/>
+                </a:moveTo>
+                <a:lnTo>
+                  <a:pt x="120000" y="0"/>
+                </a:lnTo>
+                <a:lnTo>
+                  <a:pt x="120000" y="120000"/>
+                </a:lnTo>
+                <a:lnTo>
+                  <a:pt x="0" y="120000"/>
+                </a:lnTo>
+                <a:close/>
+              </a:path>
+            </a:pathLst>
+          </a:custGeom>
+        </p:spPr>
+      </p:sp>
+    </p:spTree>
+    <p:extLst>
+      <p:ext uri="{BB962C8B-B14F-4D97-AF65-F5344CB8AC3E}">
+        <p14:creationId xmlns:p14="http://schemas.microsoft.com/office/powerpoint/2010/main" val="1796064178"/>
+      </p:ext>
+    </p:extLst>
+  </p:cSld>
+  <p:clrMapOvr>
+    <a:masterClrMapping/>
+  </p:clrMapOvr>
+</p:notes>
+</file>
+
+<file path=ppt/notesSlides/notesSlide15.xml><?xml version="1.0" encoding="utf-8"?>
+<p:notes xmlns:a="http://schemas.openxmlformats.org/drawingml/2006/main" xmlns:r="http://schemas.openxmlformats.org/officeDocument/2006/relationships" xmlns:p="http://schemas.openxmlformats.org/presentationml/2006/main" showMasterSp="0" showMasterPhAnim="0">
+  <p:cSld>
+    <p:spTree>
+      <p:nvGrpSpPr>
         <p:cNvPr id="1" name="Shape 170"/>
         <p:cNvGrpSpPr/>
         <p:nvPr/>
@@ -1469,7 +1571,7 @@
 </p:notes>
 </file>
 
-<file path=ppt/notesSlides/notesSlide15.xml><?xml version="1.0" encoding="utf-8"?>
+<file path=ppt/notesSlides/notesSlide16.xml><?xml version="1.0" encoding="utf-8"?>
 <p:notes xmlns:a="http://schemas.openxmlformats.org/drawingml/2006/main" xmlns:r="http://schemas.openxmlformats.org/officeDocument/2006/relationships" xmlns:p="http://schemas.openxmlformats.org/presentationml/2006/main" showMasterSp="0" showMasterPhAnim="0">
   <p:cSld>
     <p:spTree>
@@ -1573,7 +1675,7 @@
 </p:notes>
 </file>
 
-<file path=ppt/notesSlides/notesSlide16.xml><?xml version="1.0" encoding="utf-8"?>
+<file path=ppt/notesSlides/notesSlide17.xml><?xml version="1.0" encoding="utf-8"?>
 <p:notes xmlns:a="http://schemas.openxmlformats.org/drawingml/2006/main" xmlns:r="http://schemas.openxmlformats.org/officeDocument/2006/relationships" xmlns:p="http://schemas.openxmlformats.org/presentationml/2006/main" showMasterSp="0" showMasterPhAnim="0">
   <p:cSld>
     <p:spTree>
@@ -1677,7 +1779,7 @@
 </p:notes>
 </file>
 
-<file path=ppt/notesSlides/notesSlide17.xml><?xml version="1.0" encoding="utf-8"?>
+<file path=ppt/notesSlides/notesSlide2.xml><?xml version="1.0" encoding="utf-8"?>
 <p:notes xmlns:a="http://schemas.openxmlformats.org/drawingml/2006/main" xmlns:r="http://schemas.openxmlformats.org/officeDocument/2006/relationships" xmlns:p="http://schemas.openxmlformats.org/presentationml/2006/main" showMasterSp="0" showMasterPhAnim="0">
   <p:cSld>
     <p:spTree>
@@ -1781,7 +1883,7 @@
 </p:notes>
 </file>
 
-<file path=ppt/notesSlides/notesSlide2.xml><?xml version="1.0" encoding="utf-8"?>
+<file path=ppt/notesSlides/notesSlide3.xml><?xml version="1.0" encoding="utf-8"?>
 <p:notes xmlns:a="http://schemas.openxmlformats.org/drawingml/2006/main" xmlns:r="http://schemas.openxmlformats.org/officeDocument/2006/relationships" xmlns:p="http://schemas.openxmlformats.org/presentationml/2006/main" showMasterSp="0" showMasterPhAnim="0">
   <p:cSld>
     <p:spTree>
@@ -1885,7 +1987,7 @@
 </p:notes>
 </file>
 
-<file path=ppt/notesSlides/notesSlide3.xml><?xml version="1.0" encoding="utf-8"?>
+<file path=ppt/notesSlides/notesSlide4.xml><?xml version="1.0" encoding="utf-8"?>
 <p:notes xmlns:a="http://schemas.openxmlformats.org/drawingml/2006/main" xmlns:r="http://schemas.openxmlformats.org/officeDocument/2006/relationships" xmlns:p="http://schemas.openxmlformats.org/presentationml/2006/main" showMasterSp="0" showMasterPhAnim="0">
   <p:cSld>
     <p:spTree>
@@ -1989,7 +2091,7 @@
 </p:notes>
 </file>
 
-<file path=ppt/notesSlides/notesSlide4.xml><?xml version="1.0" encoding="utf-8"?>
+<file path=ppt/notesSlides/notesSlide5.xml><?xml version="1.0" encoding="utf-8"?>
 <p:notes xmlns:a="http://schemas.openxmlformats.org/drawingml/2006/main" xmlns:r="http://schemas.openxmlformats.org/officeDocument/2006/relationships" xmlns:p="http://schemas.openxmlformats.org/presentationml/2006/main" showMasterSp="0" showMasterPhAnim="0">
   <p:cSld>
     <p:spTree>
@@ -2093,7 +2195,7 @@
 </p:notes>
 </file>
 
-<file path=ppt/notesSlides/notesSlide5.xml><?xml version="1.0" encoding="utf-8"?>
+<file path=ppt/notesSlides/notesSlide6.xml><?xml version="1.0" encoding="utf-8"?>
 <p:notes xmlns:a="http://schemas.openxmlformats.org/drawingml/2006/main" xmlns:r="http://schemas.openxmlformats.org/officeDocument/2006/relationships" xmlns:p="http://schemas.openxmlformats.org/presentationml/2006/main" showMasterSp="0" showMasterPhAnim="0">
   <p:cSld>
     <p:spTree>
@@ -2197,7 +2299,7 @@
 </p:notes>
 </file>
 
-<file path=ppt/notesSlides/notesSlide6.xml><?xml version="1.0" encoding="utf-8"?>
+<file path=ppt/notesSlides/notesSlide7.xml><?xml version="1.0" encoding="utf-8"?>
 <p:notes xmlns:a="http://schemas.openxmlformats.org/drawingml/2006/main" xmlns:r="http://schemas.openxmlformats.org/officeDocument/2006/relationships" xmlns:p="http://schemas.openxmlformats.org/presentationml/2006/main" showMasterSp="0" showMasterPhAnim="0">
   <p:cSld>
     <p:spTree>
@@ -2306,7 +2408,7 @@
 </p:notes>
 </file>
 
-<file path=ppt/notesSlides/notesSlide7.xml><?xml version="1.0" encoding="utf-8"?>
+<file path=ppt/notesSlides/notesSlide8.xml><?xml version="1.0" encoding="utf-8"?>
 <p:notes xmlns:a="http://schemas.openxmlformats.org/drawingml/2006/main" xmlns:r="http://schemas.openxmlformats.org/officeDocument/2006/relationships" xmlns:p="http://schemas.openxmlformats.org/presentationml/2006/main" showMasterSp="0" showMasterPhAnim="0">
   <p:cSld>
     <p:spTree>
@@ -2410,7 +2512,7 @@
 </p:notes>
 </file>
 
-<file path=ppt/notesSlides/notesSlide8.xml><?xml version="1.0" encoding="utf-8"?>
+<file path=ppt/notesSlides/notesSlide9.xml><?xml version="1.0" encoding="utf-8"?>
 <p:notes xmlns:a="http://schemas.openxmlformats.org/drawingml/2006/main" xmlns:r="http://schemas.openxmlformats.org/officeDocument/2006/relationships" xmlns:p="http://schemas.openxmlformats.org/presentationml/2006/main" showMasterSp="0" showMasterPhAnim="0">
   <p:cSld>
     <p:spTree>
@@ -2510,115 +2612,6 @@
     <p:extLst>
       <p:ext uri="{BB962C8B-B14F-4D97-AF65-F5344CB8AC3E}">
         <p14:creationId xmlns:p14="http://schemas.microsoft.com/office/powerpoint/2010/main" val="744880146"/>
-      </p:ext>
-    </p:extLst>
-  </p:cSld>
-  <p:clrMapOvr>
-    <a:masterClrMapping/>
-  </p:clrMapOvr>
-</p:notes>
-</file>
-
-<file path=ppt/notesSlides/notesSlide9.xml><?xml version="1.0" encoding="utf-8"?>
-<p:notes xmlns:a="http://schemas.openxmlformats.org/drawingml/2006/main" xmlns:r="http://schemas.openxmlformats.org/officeDocument/2006/relationships" xmlns:p="http://schemas.openxmlformats.org/presentationml/2006/main" showMasterSp="0" showMasterPhAnim="0">
-  <p:cSld>
-    <p:spTree>
-      <p:nvGrpSpPr>
-        <p:cNvPr id="1" name="Shape 96"/>
-        <p:cNvGrpSpPr/>
-        <p:nvPr/>
-      </p:nvGrpSpPr>
-      <p:grpSpPr>
-        <a:xfrm>
-          <a:off x="0" y="0"/>
-          <a:ext cx="0" cy="0"/>
-          <a:chOff x="0" y="0"/>
-          <a:chExt cx="0" cy="0"/>
-        </a:xfrm>
-      </p:grpSpPr>
-      <p:sp>
-        <p:nvSpPr>
-          <p:cNvPr id="97" name="Google Shape;97;p3:notes"/>
-          <p:cNvSpPr txBox="1">
-            <a:spLocks noGrp="1"/>
-          </p:cNvSpPr>
-          <p:nvPr>
-            <p:ph type="body" idx="1"/>
-          </p:nvPr>
-        </p:nvSpPr>
-        <p:spPr>
-          <a:xfrm>
-            <a:off x="914400" y="4343400"/>
-            <a:ext cx="5029200" cy="4114800"/>
-          </a:xfrm>
-          <a:prstGeom prst="rect">
-            <a:avLst/>
-          </a:prstGeom>
-        </p:spPr>
-        <p:txBody>
-          <a:bodyPr spcFirstLastPara="1" wrap="square" lIns="91425" tIns="45700" rIns="91425" bIns="45700" anchor="t" anchorCtr="0">
-            <a:noAutofit/>
-          </a:bodyPr>
-          <a:lstStyle/>
-          <a:p>
-            <a:pPr marL="0" lvl="0" indent="0" algn="l" rtl="0">
-              <a:spcBef>
-                <a:spcPts val="0"/>
-              </a:spcBef>
-              <a:spcAft>
-                <a:spcPts val="0"/>
-              </a:spcAft>
-              <a:buNone/>
-            </a:pPr>
-            <a:endParaRPr dirty="0"/>
-          </a:p>
-        </p:txBody>
-      </p:sp>
-      <p:sp>
-        <p:nvSpPr>
-          <p:cNvPr id="98" name="Google Shape;98;p3:notes"/>
-          <p:cNvSpPr>
-            <a:spLocks noGrp="1" noRot="1" noChangeAspect="1"/>
-          </p:cNvSpPr>
-          <p:nvPr>
-            <p:ph type="sldImg" idx="2"/>
-          </p:nvPr>
-        </p:nvSpPr>
-        <p:spPr>
-          <a:xfrm>
-            <a:off x="381000" y="685800"/>
-            <a:ext cx="6096000" cy="3429000"/>
-          </a:xfrm>
-          <a:custGeom>
-            <a:avLst/>
-            <a:gdLst/>
-            <a:ahLst/>
-            <a:cxnLst/>
-            <a:rect l="l" t="t" r="r" b="b"/>
-            <a:pathLst>
-              <a:path w="120000" h="120000" extrusionOk="0">
-                <a:moveTo>
-                  <a:pt x="0" y="0"/>
-                </a:moveTo>
-                <a:lnTo>
-                  <a:pt x="120000" y="0"/>
-                </a:lnTo>
-                <a:lnTo>
-                  <a:pt x="120000" y="120000"/>
-                </a:lnTo>
-                <a:lnTo>
-                  <a:pt x="0" y="120000"/>
-                </a:lnTo>
-                <a:close/>
-              </a:path>
-            </a:pathLst>
-          </a:custGeom>
-        </p:spPr>
-      </p:sp>
-    </p:spTree>
-    <p:extLst>
-      <p:ext uri="{BB962C8B-B14F-4D97-AF65-F5344CB8AC3E}">
-        <p14:creationId xmlns:p14="http://schemas.microsoft.com/office/powerpoint/2010/main" val="31036007"/>
       </p:ext>
     </p:extLst>
   </p:cSld>
@@ -4653,7 +4646,7 @@
           <a:p>
             <a:fld id="{34073DC1-AB27-4363-9845-555972D7C4F0}" type="datetimeFigureOut">
               <a:rPr lang="en-US" smtClean="0"/>
-              <a:t>7/6/23</a:t>
+              <a:t>7/5/24</a:t>
             </a:fld>
             <a:endParaRPr lang="en-US"/>
           </a:p>
@@ -11083,7 +11076,7 @@
           <a:p>
             <a:r>
               <a:rPr lang="en-US" dirty="0"/>
-              <a:t>Code/Astro 2023</a:t>
+              <a:t>Code/Astro 2024</a:t>
             </a:r>
           </a:p>
         </p:txBody>
@@ -11097,6 +11090,184 @@
 </file>
 
 <file path=ppt/slides/slide10.xml><?xml version="1.0" encoding="utf-8"?>
+<p:sld xmlns:a="http://schemas.openxmlformats.org/drawingml/2006/main" xmlns:r="http://schemas.openxmlformats.org/officeDocument/2006/relationships" xmlns:p="http://schemas.openxmlformats.org/presentationml/2006/main">
+  <p:cSld>
+    <p:spTree>
+      <p:nvGrpSpPr>
+        <p:cNvPr id="1" name="Shape 99"/>
+        <p:cNvGrpSpPr/>
+        <p:nvPr/>
+      </p:nvGrpSpPr>
+      <p:grpSpPr>
+        <a:xfrm>
+          <a:off x="0" y="0"/>
+          <a:ext cx="0" cy="0"/>
+          <a:chOff x="0" y="0"/>
+          <a:chExt cx="0" cy="0"/>
+        </a:xfrm>
+      </p:grpSpPr>
+      <p:sp>
+        <p:nvSpPr>
+          <p:cNvPr id="100" name="Google Shape;100;p3"/>
+          <p:cNvSpPr txBox="1">
+            <a:spLocks noGrp="1"/>
+          </p:cNvSpPr>
+          <p:nvPr>
+            <p:ph type="title"/>
+          </p:nvPr>
+        </p:nvSpPr>
+        <p:spPr>
+          <a:xfrm>
+            <a:off x="1689100" y="355600"/>
+            <a:ext cx="21005800" cy="2286000"/>
+          </a:xfrm>
+          <a:prstGeom prst="rect">
+            <a:avLst/>
+          </a:prstGeom>
+          <a:noFill/>
+          <a:ln>
+            <a:noFill/>
+          </a:ln>
+        </p:spPr>
+        <p:txBody>
+          <a:bodyPr spcFirstLastPara="1" wrap="square" lIns="50800" tIns="50800" rIns="50800" bIns="50800" anchor="ctr" anchorCtr="0">
+            <a:normAutofit/>
+          </a:bodyPr>
+          <a:lstStyle/>
+          <a:p>
+            <a:pPr marL="0" marR="0" lvl="0" indent="0" algn="ctr" rtl="0">
+              <a:lnSpc>
+                <a:spcPct val="100000"/>
+              </a:lnSpc>
+              <a:spcBef>
+                <a:spcPts val="0"/>
+              </a:spcBef>
+              <a:spcAft>
+                <a:spcPts val="0"/>
+              </a:spcAft>
+              <a:buClr>
+                <a:srgbClr val="000000"/>
+              </a:buClr>
+              <a:buSzPts val="8848"/>
+              <a:buFont typeface="Helvetica Neue"/>
+              <a:buNone/>
+            </a:pPr>
+            <a:r>
+              <a:rPr lang="en-US" sz="8000" dirty="0"/>
+              <a:t>Demo: </a:t>
+            </a:r>
+            <a:r>
+              <a:rPr lang="en-US" sz="8000" dirty="0" err="1"/>
+              <a:t>Gitflow</a:t>
+            </a:r>
+            <a:endParaRPr sz="8000" dirty="0"/>
+          </a:p>
+        </p:txBody>
+      </p:sp>
+      <p:sp>
+        <p:nvSpPr>
+          <p:cNvPr id="101" name="Google Shape;101;p3"/>
+          <p:cNvSpPr txBox="1">
+            <a:spLocks noGrp="1"/>
+          </p:cNvSpPr>
+          <p:nvPr>
+            <p:ph type="body" idx="1"/>
+          </p:nvPr>
+        </p:nvSpPr>
+        <p:spPr>
+          <a:xfrm>
+            <a:off x="1689100" y="2641600"/>
+            <a:ext cx="21005800" cy="9494982"/>
+          </a:xfrm>
+          <a:prstGeom prst="rect">
+            <a:avLst/>
+          </a:prstGeom>
+          <a:noFill/>
+          <a:ln>
+            <a:noFill/>
+          </a:ln>
+        </p:spPr>
+        <p:txBody>
+          <a:bodyPr spcFirstLastPara="1" wrap="square" lIns="50800" tIns="50800" rIns="50800" bIns="50800" anchor="ctr" anchorCtr="0">
+            <a:normAutofit/>
+          </a:bodyPr>
+          <a:lstStyle/>
+          <a:p>
+            <a:pPr marL="0" lvl="0" indent="0" algn="l" rtl="0">
+              <a:lnSpc>
+                <a:spcPct val="100000"/>
+              </a:lnSpc>
+              <a:spcBef>
+                <a:spcPts val="0"/>
+              </a:spcBef>
+              <a:spcAft>
+                <a:spcPts val="0"/>
+              </a:spcAft>
+              <a:buClr>
+                <a:srgbClr val="000000"/>
+              </a:buClr>
+              <a:buSzPts val="6000"/>
+              <a:buNone/>
+            </a:pPr>
+            <a:r>
+              <a:rPr lang="en-US" sz="5800" dirty="0"/>
+              <a:t>In this demo, you will learn how to:</a:t>
+            </a:r>
+            <a:endParaRPr lang="en-US" sz="4800" dirty="0"/>
+          </a:p>
+          <a:p>
+            <a:pPr marL="1092200" lvl="1" indent="-635000"/>
+            <a:r>
+              <a:rPr lang="en-US" dirty="0"/>
+              <a:t>Raise an issue in a repository.</a:t>
+            </a:r>
+          </a:p>
+          <a:p>
+            <a:pPr marL="1092200" lvl="1" indent="-635000"/>
+            <a:r>
+              <a:rPr lang="en-US" dirty="0"/>
+              <a:t>Create and manipulate multiple branches within a git repo (main, develop, feature)</a:t>
+            </a:r>
+            <a:endParaRPr dirty="0"/>
+          </a:p>
+          <a:p>
+            <a:pPr marL="1092200" lvl="1" indent="-635000"/>
+            <a:r>
+              <a:rPr lang="en-US" dirty="0"/>
+              <a:t>How to use these branches in a “standard” git workflow</a:t>
+            </a:r>
+          </a:p>
+          <a:p>
+            <a:pPr marL="1092200" lvl="1" indent="-635000"/>
+            <a:r>
+              <a:rPr lang="en-US" dirty="0"/>
+              <a:t>Submit a pull request on </a:t>
+            </a:r>
+            <a:r>
+              <a:rPr lang="en-US" dirty="0" err="1"/>
+              <a:t>Github</a:t>
+            </a:r>
+            <a:r>
+              <a:rPr lang="en-US" dirty="0"/>
+              <a:t> to merge two branches</a:t>
+            </a:r>
+          </a:p>
+        </p:txBody>
+      </p:sp>
+    </p:spTree>
+    <p:extLst>
+      <p:ext uri="{BB962C8B-B14F-4D97-AF65-F5344CB8AC3E}">
+        <p14:creationId xmlns:p14="http://schemas.microsoft.com/office/powerpoint/2010/main" val="503865505"/>
+      </p:ext>
+    </p:extLst>
+  </p:cSld>
+  <p:clrMapOvr>
+    <a:masterClrMapping/>
+  </p:clrMapOvr>
+</p:sld>
+</file>
+
+<file path=ppt/slides/slide11.xml><?xml version="1.0" encoding="utf-8"?>
 <p:sld xmlns:a="http://schemas.openxmlformats.org/drawingml/2006/main" xmlns:r="http://schemas.openxmlformats.org/officeDocument/2006/relationships" xmlns:p="http://schemas.openxmlformats.org/presentationml/2006/main">
   <p:cSld>
     <p:spTree>
@@ -11211,7 +11382,7 @@
             </a:pPr>
             <a:r>
               <a:rPr lang="en-US" sz="4560" dirty="0"/>
-              <a:t>Pull latest code from develop branch.</a:t>
+              <a:t>Pull latest code from develop/main branch.</a:t>
             </a:r>
             <a:endParaRPr dirty="0"/>
           </a:p>
@@ -11231,7 +11402,7 @@
             </a:pPr>
             <a:r>
               <a:rPr lang="en-US" sz="4560" dirty="0"/>
-              <a:t>Create feature branch from develop branch.</a:t>
+              <a:t>Create feature branch from develop/main branch.</a:t>
             </a:r>
             <a:endParaRPr sz="4560" dirty="0"/>
           </a:p>
@@ -11270,7 +11441,7 @@
             </a:pPr>
             <a:r>
               <a:rPr lang="en-US" sz="4560" dirty="0"/>
-              <a:t>Submit pull request on GitHub &amp; merge feature into develop.</a:t>
+              <a:t>Submit pull request on GitHub &amp; merge feature into develop/main.</a:t>
             </a:r>
             <a:endParaRPr sz="4560" dirty="0"/>
           </a:p>
@@ -11290,7 +11461,7 @@
             </a:pPr>
             <a:r>
               <a:rPr lang="en-US" sz="4560" dirty="0"/>
-              <a:t>Repeat until enough features have been merged into develop, then make a pull request from develop -&gt; main.</a:t>
+              <a:t>(Repeat until enough features have been merged into develop, then make a pull request from develop -&gt; main.)</a:t>
             </a:r>
             <a:endParaRPr sz="4560" dirty="0"/>
           </a:p>
@@ -11304,7 +11475,7 @@
 </p:sld>
 </file>
 
-<file path=ppt/slides/slide11.xml><?xml version="1.0" encoding="utf-8"?>
+<file path=ppt/slides/slide12.xml><?xml version="1.0" encoding="utf-8"?>
 <p:sld xmlns:a="http://schemas.openxmlformats.org/drawingml/2006/main" xmlns:r="http://schemas.openxmlformats.org/officeDocument/2006/relationships" xmlns:p="http://schemas.openxmlformats.org/presentationml/2006/main">
   <p:cSld>
     <p:spTree>
@@ -11741,7 +11912,317 @@
 </p:sld>
 </file>
 
-<file path=ppt/slides/slide12.xml><?xml version="1.0" encoding="utf-8"?>
+<file path=ppt/slides/slide13.xml><?xml version="1.0" encoding="utf-8"?>
+<p:sld xmlns:a="http://schemas.openxmlformats.org/drawingml/2006/main" xmlns:r="http://schemas.openxmlformats.org/officeDocument/2006/relationships" xmlns:p="http://schemas.openxmlformats.org/presentationml/2006/main">
+  <p:cSld>
+    <p:spTree>
+      <p:nvGrpSpPr>
+        <p:cNvPr id="1" name="Shape 106"/>
+        <p:cNvGrpSpPr/>
+        <p:nvPr/>
+      </p:nvGrpSpPr>
+      <p:grpSpPr>
+        <a:xfrm>
+          <a:off x="0" y="0"/>
+          <a:ext cx="0" cy="0"/>
+          <a:chOff x="0" y="0"/>
+          <a:chExt cx="0" cy="0"/>
+        </a:xfrm>
+      </p:grpSpPr>
+      <p:sp>
+        <p:nvSpPr>
+          <p:cNvPr id="107" name="Google Shape;107;g1347d530a7d_1_0"/>
+          <p:cNvSpPr txBox="1">
+            <a:spLocks noGrp="1"/>
+          </p:cNvSpPr>
+          <p:nvPr>
+            <p:ph type="title"/>
+          </p:nvPr>
+        </p:nvSpPr>
+        <p:spPr>
+          <a:xfrm>
+            <a:off x="1689100" y="355600"/>
+            <a:ext cx="21005700" cy="2286000"/>
+          </a:xfrm>
+          <a:prstGeom prst="rect">
+            <a:avLst/>
+          </a:prstGeom>
+        </p:spPr>
+        <p:txBody>
+          <a:bodyPr spcFirstLastPara="1" wrap="square" lIns="50800" tIns="50800" rIns="50800" bIns="50800" anchor="ctr" anchorCtr="0">
+            <a:normAutofit/>
+          </a:bodyPr>
+          <a:lstStyle/>
+          <a:p>
+            <a:pPr marL="0" lvl="0" indent="0" algn="ctr" rtl="0">
+              <a:spcBef>
+                <a:spcPts val="0"/>
+              </a:spcBef>
+              <a:spcAft>
+                <a:spcPts val="0"/>
+              </a:spcAft>
+              <a:buNone/>
+            </a:pPr>
+            <a:r>
+              <a:rPr lang="en-US"/>
+              <a:t>Class-sourced Vocabulary List</a:t>
+            </a:r>
+            <a:endParaRPr/>
+          </a:p>
+        </p:txBody>
+      </p:sp>
+      <p:sp>
+        <p:nvSpPr>
+          <p:cNvPr id="108" name="Google Shape;108;g1347d530a7d_1_0"/>
+          <p:cNvSpPr txBox="1">
+            <a:spLocks noGrp="1"/>
+          </p:cNvSpPr>
+          <p:nvPr>
+            <p:ph type="body" idx="1"/>
+          </p:nvPr>
+        </p:nvSpPr>
+        <p:spPr>
+          <a:xfrm>
+            <a:off x="1689150" y="2641600"/>
+            <a:ext cx="21005700" cy="9296400"/>
+          </a:xfrm>
+          <a:prstGeom prst="rect">
+            <a:avLst/>
+          </a:prstGeom>
+        </p:spPr>
+        <p:txBody>
+          <a:bodyPr spcFirstLastPara="1" wrap="square" lIns="50800" tIns="50800" rIns="50800" bIns="50800" anchor="ctr" anchorCtr="0">
+            <a:normAutofit fontScale="92500"/>
+          </a:bodyPr>
+          <a:lstStyle/>
+          <a:p>
+            <a:pPr marL="457200" lvl="0" indent="-609600" algn="l" rtl="0">
+              <a:spcBef>
+                <a:spcPts val="5900"/>
+              </a:spcBef>
+              <a:spcAft>
+                <a:spcPts val="0"/>
+              </a:spcAft>
+              <a:buSzPts val="6000"/>
+              <a:buChar char="•"/>
+            </a:pPr>
+            <a:r>
+              <a:rPr lang="en-US" dirty="0"/>
+              <a:t>Git: version control system (mercurial)</a:t>
+            </a:r>
+            <a:endParaRPr dirty="0"/>
+          </a:p>
+          <a:p>
+            <a:pPr marL="457200" lvl="0" indent="-609600" algn="l" rtl="0">
+              <a:spcBef>
+                <a:spcPts val="0"/>
+              </a:spcBef>
+              <a:spcAft>
+                <a:spcPts val="0"/>
+              </a:spcAft>
+              <a:buSzPts val="6000"/>
+              <a:buChar char="•"/>
+            </a:pPr>
+            <a:r>
+              <a:rPr lang="en-US" dirty="0"/>
+              <a:t>GitHub: one choice for remote host for source-control projects (also see Gitlab/bitbucket</a:t>
+            </a:r>
+            <a:endParaRPr dirty="0"/>
+          </a:p>
+          <a:p>
+            <a:pPr marL="457200" lvl="0" indent="-609600" algn="l" rtl="0">
+              <a:spcBef>
+                <a:spcPts val="0"/>
+              </a:spcBef>
+              <a:spcAft>
+                <a:spcPts val="0"/>
+              </a:spcAft>
+              <a:buClr>
+                <a:schemeClr val="dk1"/>
+              </a:buClr>
+              <a:buSzPts val="6000"/>
+              <a:buChar char="•"/>
+            </a:pPr>
+            <a:r>
+              <a:rPr lang="en-US" dirty="0">
+                <a:solidFill>
+                  <a:schemeClr val="dk1"/>
+                </a:solidFill>
+              </a:rPr>
+              <a:t>source control: act of keeping track of history of code</a:t>
+            </a:r>
+            <a:endParaRPr dirty="0"/>
+          </a:p>
+          <a:p>
+            <a:pPr marL="457200" lvl="0" indent="-609600" algn="l" rtl="0">
+              <a:spcBef>
+                <a:spcPts val="0"/>
+              </a:spcBef>
+              <a:spcAft>
+                <a:spcPts val="0"/>
+              </a:spcAft>
+              <a:buSzPts val="6000"/>
+              <a:buChar char="•"/>
+            </a:pPr>
+            <a:r>
+              <a:rPr lang="en-US" dirty="0"/>
+              <a:t>repo (short for “repository”): version-controlled project, keeps track of changes</a:t>
+            </a:r>
+            <a:endParaRPr dirty="0"/>
+          </a:p>
+          <a:p>
+            <a:pPr marL="457200" lvl="0" indent="-609600" algn="l" rtl="0">
+              <a:spcBef>
+                <a:spcPts val="0"/>
+              </a:spcBef>
+              <a:spcAft>
+                <a:spcPts val="0"/>
+              </a:spcAft>
+              <a:buSzPts val="6000"/>
+              <a:buChar char="•"/>
+            </a:pPr>
+            <a:r>
+              <a:rPr lang="en-US" dirty="0"/>
+              <a:t>pull request: way to notify developers of particular changes, and stages the changes in one branch to be pulled into another</a:t>
+            </a:r>
+            <a:endParaRPr dirty="0"/>
+          </a:p>
+          <a:p>
+            <a:pPr marL="457200" lvl="0" indent="-609600" algn="l" rtl="0">
+              <a:spcBef>
+                <a:spcPts val="0"/>
+              </a:spcBef>
+              <a:spcAft>
+                <a:spcPts val="0"/>
+              </a:spcAft>
+              <a:buClr>
+                <a:schemeClr val="dk1"/>
+              </a:buClr>
+              <a:buSzPts val="6000"/>
+              <a:buChar char="•"/>
+            </a:pPr>
+            <a:r>
+              <a:rPr lang="en-US" dirty="0">
+                <a:solidFill>
+                  <a:schemeClr val="dk1"/>
+                </a:solidFill>
+              </a:rPr>
+              <a:t>commit: a change that adds a new “note” to current branch, like an object that holds information about who made commit, changes involved</a:t>
+            </a:r>
+            <a:endParaRPr dirty="0"/>
+          </a:p>
+          <a:p>
+            <a:pPr marL="457200" lvl="0" indent="-609600" algn="l" rtl="0">
+              <a:spcBef>
+                <a:spcPts val="0"/>
+              </a:spcBef>
+              <a:spcAft>
+                <a:spcPts val="0"/>
+              </a:spcAft>
+              <a:buSzPts val="6000"/>
+              <a:buChar char="•"/>
+            </a:pPr>
+            <a:r>
+              <a:rPr lang="en-US" dirty="0"/>
+              <a:t>branch: way to add new feature to code, might have  changes added relative to main/other branches</a:t>
+            </a:r>
+            <a:endParaRPr dirty="0"/>
+          </a:p>
+          <a:p>
+            <a:pPr marL="457200" lvl="0" indent="-609600" algn="l" rtl="0">
+              <a:spcBef>
+                <a:spcPts val="0"/>
+              </a:spcBef>
+              <a:spcAft>
+                <a:spcPts val="0"/>
+              </a:spcAft>
+              <a:buSzPts val="6000"/>
+              <a:buChar char="•"/>
+            </a:pPr>
+            <a:r>
+              <a:rPr lang="en-US" dirty="0"/>
+              <a:t>clone: local repo copy linked to remote </a:t>
+            </a:r>
+            <a:endParaRPr dirty="0"/>
+          </a:p>
+        </p:txBody>
+      </p:sp>
+      <p:sp>
+        <p:nvSpPr>
+          <p:cNvPr id="110" name="Google Shape;110;g1347d530a7d_1_0"/>
+          <p:cNvSpPr txBox="1"/>
+          <p:nvPr/>
+        </p:nvSpPr>
+        <p:spPr>
+          <a:xfrm>
+            <a:off x="12934475" y="11234600"/>
+            <a:ext cx="11254200" cy="2401200"/>
+          </a:xfrm>
+          <a:prstGeom prst="rect">
+            <a:avLst/>
+          </a:prstGeom>
+          <a:noFill/>
+          <a:ln w="9525" cap="flat" cmpd="sng">
+            <a:solidFill>
+              <a:schemeClr val="dk1"/>
+            </a:solidFill>
+            <a:prstDash val="solid"/>
+            <a:round/>
+            <a:headEnd type="none" w="sm" len="sm"/>
+            <a:tailEnd type="none" w="sm" len="sm"/>
+          </a:ln>
+        </p:spPr>
+        <p:txBody>
+          <a:bodyPr spcFirstLastPara="1" wrap="square" lIns="91425" tIns="91425" rIns="91425" bIns="91425" anchor="t" anchorCtr="0">
+            <a:spAutoFit/>
+          </a:bodyPr>
+          <a:lstStyle/>
+          <a:p>
+            <a:pPr marL="0" lvl="0" indent="0" algn="l" rtl="0">
+              <a:spcBef>
+                <a:spcPts val="0"/>
+              </a:spcBef>
+              <a:spcAft>
+                <a:spcPts val="0"/>
+              </a:spcAft>
+              <a:buNone/>
+            </a:pPr>
+            <a:r>
+              <a:rPr lang="en-US" sz="3600" u="sng">
+                <a:latin typeface="Helvetica Neue"/>
+                <a:ea typeface="Helvetica Neue"/>
+                <a:cs typeface="Helvetica Neue"/>
+                <a:sym typeface="Helvetica Neue"/>
+              </a:rPr>
+              <a:t>Code/Astro vocab list</a:t>
+            </a:r>
+            <a:r>
+              <a:rPr lang="en-US" sz="3600">
+                <a:latin typeface="Helvetica Neue"/>
+                <a:ea typeface="Helvetica Neue"/>
+                <a:cs typeface="Helvetica Neue"/>
+                <a:sym typeface="Helvetica Neue"/>
+              </a:rPr>
+              <a:t>: https://docs.google.com/document/d/1HuzcZbUOdDht9Q2Y5RB7d7THucwVZrZAPkskCw9u9XE/edit?usp=sharing</a:t>
+            </a:r>
+            <a:endParaRPr sz="3600">
+              <a:latin typeface="Helvetica Neue"/>
+              <a:ea typeface="Helvetica Neue"/>
+              <a:cs typeface="Helvetica Neue"/>
+              <a:sym typeface="Helvetica Neue"/>
+            </a:endParaRPr>
+          </a:p>
+        </p:txBody>
+      </p:sp>
+    </p:spTree>
+  </p:cSld>
+  <p:clrMapOvr>
+    <a:masterClrMapping/>
+  </p:clrMapOvr>
+</p:sld>
+</file>
+
+<file path=ppt/slides/slide14.xml><?xml version="1.0" encoding="utf-8"?>
 <p:sld xmlns:a="http://schemas.openxmlformats.org/drawingml/2006/main" xmlns:r="http://schemas.openxmlformats.org/officeDocument/2006/relationships" xmlns:p="http://schemas.openxmlformats.org/presentationml/2006/main">
   <p:cSld>
     <p:spTree>
@@ -12020,7 +12501,7 @@
 </p:sld>
 </file>
 
-<file path=ppt/slides/slide13.xml><?xml version="1.0" encoding="utf-8"?>
+<file path=ppt/slides/slide15.xml><?xml version="1.0" encoding="utf-8"?>
 <p:sld xmlns:a="http://schemas.openxmlformats.org/drawingml/2006/main" xmlns:r="http://schemas.openxmlformats.org/officeDocument/2006/relationships" xmlns:p="http://schemas.openxmlformats.org/presentationml/2006/main">
   <p:cSld>
     <p:spTree>
@@ -12085,317 +12566,7 @@
 </p:sld>
 </file>
 
-<file path=ppt/slides/slide14.xml><?xml version="1.0" encoding="utf-8"?>
-<p:sld xmlns:a="http://schemas.openxmlformats.org/drawingml/2006/main" xmlns:r="http://schemas.openxmlformats.org/officeDocument/2006/relationships" xmlns:p="http://schemas.openxmlformats.org/presentationml/2006/main">
-  <p:cSld>
-    <p:spTree>
-      <p:nvGrpSpPr>
-        <p:cNvPr id="1" name="Shape 106"/>
-        <p:cNvGrpSpPr/>
-        <p:nvPr/>
-      </p:nvGrpSpPr>
-      <p:grpSpPr>
-        <a:xfrm>
-          <a:off x="0" y="0"/>
-          <a:ext cx="0" cy="0"/>
-          <a:chOff x="0" y="0"/>
-          <a:chExt cx="0" cy="0"/>
-        </a:xfrm>
-      </p:grpSpPr>
-      <p:sp>
-        <p:nvSpPr>
-          <p:cNvPr id="107" name="Google Shape;107;g1347d530a7d_1_0"/>
-          <p:cNvSpPr txBox="1">
-            <a:spLocks noGrp="1"/>
-          </p:cNvSpPr>
-          <p:nvPr>
-            <p:ph type="title"/>
-          </p:nvPr>
-        </p:nvSpPr>
-        <p:spPr>
-          <a:xfrm>
-            <a:off x="1689100" y="355600"/>
-            <a:ext cx="21005700" cy="2286000"/>
-          </a:xfrm>
-          <a:prstGeom prst="rect">
-            <a:avLst/>
-          </a:prstGeom>
-        </p:spPr>
-        <p:txBody>
-          <a:bodyPr spcFirstLastPara="1" wrap="square" lIns="50800" tIns="50800" rIns="50800" bIns="50800" anchor="ctr" anchorCtr="0">
-            <a:normAutofit/>
-          </a:bodyPr>
-          <a:lstStyle/>
-          <a:p>
-            <a:pPr marL="0" lvl="0" indent="0" algn="ctr" rtl="0">
-              <a:spcBef>
-                <a:spcPts val="0"/>
-              </a:spcBef>
-              <a:spcAft>
-                <a:spcPts val="0"/>
-              </a:spcAft>
-              <a:buNone/>
-            </a:pPr>
-            <a:r>
-              <a:rPr lang="en-US"/>
-              <a:t>Class-sourced Vocabulary List</a:t>
-            </a:r>
-            <a:endParaRPr/>
-          </a:p>
-        </p:txBody>
-      </p:sp>
-      <p:sp>
-        <p:nvSpPr>
-          <p:cNvPr id="108" name="Google Shape;108;g1347d530a7d_1_0"/>
-          <p:cNvSpPr txBox="1">
-            <a:spLocks noGrp="1"/>
-          </p:cNvSpPr>
-          <p:nvPr>
-            <p:ph type="body" idx="1"/>
-          </p:nvPr>
-        </p:nvSpPr>
-        <p:spPr>
-          <a:xfrm>
-            <a:off x="1689150" y="2641600"/>
-            <a:ext cx="21005700" cy="9296400"/>
-          </a:xfrm>
-          <a:prstGeom prst="rect">
-            <a:avLst/>
-          </a:prstGeom>
-        </p:spPr>
-        <p:txBody>
-          <a:bodyPr spcFirstLastPara="1" wrap="square" lIns="50800" tIns="50800" rIns="50800" bIns="50800" anchor="ctr" anchorCtr="0">
-            <a:normAutofit fontScale="92500"/>
-          </a:bodyPr>
-          <a:lstStyle/>
-          <a:p>
-            <a:pPr marL="457200" lvl="0" indent="-609600" algn="l" rtl="0">
-              <a:spcBef>
-                <a:spcPts val="5900"/>
-              </a:spcBef>
-              <a:spcAft>
-                <a:spcPts val="0"/>
-              </a:spcAft>
-              <a:buSzPts val="6000"/>
-              <a:buChar char="•"/>
-            </a:pPr>
-            <a:r>
-              <a:rPr lang="en-US"/>
-              <a:t>Git: version control system (mercurial)</a:t>
-            </a:r>
-            <a:endParaRPr/>
-          </a:p>
-          <a:p>
-            <a:pPr marL="457200" lvl="0" indent="-609600" algn="l" rtl="0">
-              <a:spcBef>
-                <a:spcPts val="0"/>
-              </a:spcBef>
-              <a:spcAft>
-                <a:spcPts val="0"/>
-              </a:spcAft>
-              <a:buSzPts val="6000"/>
-              <a:buChar char="•"/>
-            </a:pPr>
-            <a:r>
-              <a:rPr lang="en-US"/>
-              <a:t>GitHub: one choice for remote host for source-control projects (also see Gitlab/bitbucket</a:t>
-            </a:r>
-            <a:endParaRPr/>
-          </a:p>
-          <a:p>
-            <a:pPr marL="457200" lvl="0" indent="-609600" algn="l" rtl="0">
-              <a:spcBef>
-                <a:spcPts val="0"/>
-              </a:spcBef>
-              <a:spcAft>
-                <a:spcPts val="0"/>
-              </a:spcAft>
-              <a:buClr>
-                <a:schemeClr val="dk1"/>
-              </a:buClr>
-              <a:buSzPts val="6000"/>
-              <a:buChar char="•"/>
-            </a:pPr>
-            <a:r>
-              <a:rPr lang="en-US">
-                <a:solidFill>
-                  <a:schemeClr val="dk1"/>
-                </a:solidFill>
-              </a:rPr>
-              <a:t>source control: act of keeping track of history of code</a:t>
-            </a:r>
-            <a:endParaRPr/>
-          </a:p>
-          <a:p>
-            <a:pPr marL="457200" lvl="0" indent="-609600" algn="l" rtl="0">
-              <a:spcBef>
-                <a:spcPts val="0"/>
-              </a:spcBef>
-              <a:spcAft>
-                <a:spcPts val="0"/>
-              </a:spcAft>
-              <a:buSzPts val="6000"/>
-              <a:buChar char="•"/>
-            </a:pPr>
-            <a:r>
-              <a:rPr lang="en-US"/>
-              <a:t>repo (short for “repository”): version-controlled project, keeps track of changes</a:t>
-            </a:r>
-            <a:endParaRPr/>
-          </a:p>
-          <a:p>
-            <a:pPr marL="457200" lvl="0" indent="-609600" algn="l" rtl="0">
-              <a:spcBef>
-                <a:spcPts val="0"/>
-              </a:spcBef>
-              <a:spcAft>
-                <a:spcPts val="0"/>
-              </a:spcAft>
-              <a:buSzPts val="6000"/>
-              <a:buChar char="•"/>
-            </a:pPr>
-            <a:r>
-              <a:rPr lang="en-US"/>
-              <a:t>pull request: way to notify developers of particular changes, and stages the changes in one branch to be pulled into another</a:t>
-            </a:r>
-            <a:endParaRPr/>
-          </a:p>
-          <a:p>
-            <a:pPr marL="457200" lvl="0" indent="-609600" algn="l" rtl="0">
-              <a:spcBef>
-                <a:spcPts val="0"/>
-              </a:spcBef>
-              <a:spcAft>
-                <a:spcPts val="0"/>
-              </a:spcAft>
-              <a:buClr>
-                <a:schemeClr val="dk1"/>
-              </a:buClr>
-              <a:buSzPts val="6000"/>
-              <a:buChar char="•"/>
-            </a:pPr>
-            <a:r>
-              <a:rPr lang="en-US">
-                <a:solidFill>
-                  <a:schemeClr val="dk1"/>
-                </a:solidFill>
-              </a:rPr>
-              <a:t>commit: a change that adds a new “note” to current branch, like an object that holds iformatio about who made commit, changes involved</a:t>
-            </a:r>
-            <a:endParaRPr/>
-          </a:p>
-          <a:p>
-            <a:pPr marL="457200" lvl="0" indent="-609600" algn="l" rtl="0">
-              <a:spcBef>
-                <a:spcPts val="0"/>
-              </a:spcBef>
-              <a:spcAft>
-                <a:spcPts val="0"/>
-              </a:spcAft>
-              <a:buSzPts val="6000"/>
-              <a:buChar char="•"/>
-            </a:pPr>
-            <a:r>
-              <a:rPr lang="en-US"/>
-              <a:t>branch: way to add new feature to code, might have  changes added relative to main/other branchs</a:t>
-            </a:r>
-            <a:endParaRPr/>
-          </a:p>
-          <a:p>
-            <a:pPr marL="457200" lvl="0" indent="-609600" algn="l" rtl="0">
-              <a:spcBef>
-                <a:spcPts val="0"/>
-              </a:spcBef>
-              <a:spcAft>
-                <a:spcPts val="0"/>
-              </a:spcAft>
-              <a:buSzPts val="6000"/>
-              <a:buChar char="•"/>
-            </a:pPr>
-            <a:r>
-              <a:rPr lang="en-US"/>
-              <a:t>clone: local repo copy linked to remote </a:t>
-            </a:r>
-            <a:endParaRPr/>
-          </a:p>
-        </p:txBody>
-      </p:sp>
-      <p:sp>
-        <p:nvSpPr>
-          <p:cNvPr id="110" name="Google Shape;110;g1347d530a7d_1_0"/>
-          <p:cNvSpPr txBox="1"/>
-          <p:nvPr/>
-        </p:nvSpPr>
-        <p:spPr>
-          <a:xfrm>
-            <a:off x="12934475" y="11234600"/>
-            <a:ext cx="11254200" cy="2401200"/>
-          </a:xfrm>
-          <a:prstGeom prst="rect">
-            <a:avLst/>
-          </a:prstGeom>
-          <a:noFill/>
-          <a:ln w="9525" cap="flat" cmpd="sng">
-            <a:solidFill>
-              <a:schemeClr val="dk1"/>
-            </a:solidFill>
-            <a:prstDash val="solid"/>
-            <a:round/>
-            <a:headEnd type="none" w="sm" len="sm"/>
-            <a:tailEnd type="none" w="sm" len="sm"/>
-          </a:ln>
-        </p:spPr>
-        <p:txBody>
-          <a:bodyPr spcFirstLastPara="1" wrap="square" lIns="91425" tIns="91425" rIns="91425" bIns="91425" anchor="t" anchorCtr="0">
-            <a:spAutoFit/>
-          </a:bodyPr>
-          <a:lstStyle/>
-          <a:p>
-            <a:pPr marL="0" lvl="0" indent="0" algn="l" rtl="0">
-              <a:spcBef>
-                <a:spcPts val="0"/>
-              </a:spcBef>
-              <a:spcAft>
-                <a:spcPts val="0"/>
-              </a:spcAft>
-              <a:buNone/>
-            </a:pPr>
-            <a:r>
-              <a:rPr lang="en-US" sz="3600" u="sng">
-                <a:latin typeface="Helvetica Neue"/>
-                <a:ea typeface="Helvetica Neue"/>
-                <a:cs typeface="Helvetica Neue"/>
-                <a:sym typeface="Helvetica Neue"/>
-              </a:rPr>
-              <a:t>Code/Astro vocab list</a:t>
-            </a:r>
-            <a:r>
-              <a:rPr lang="en-US" sz="3600">
-                <a:latin typeface="Helvetica Neue"/>
-                <a:ea typeface="Helvetica Neue"/>
-                <a:cs typeface="Helvetica Neue"/>
-                <a:sym typeface="Helvetica Neue"/>
-              </a:rPr>
-              <a:t>: https://docs.google.com/document/d/1HuzcZbUOdDht9Q2Y5RB7d7THucwVZrZAPkskCw9u9XE/edit?usp=sharing</a:t>
-            </a:r>
-            <a:endParaRPr sz="3600">
-              <a:latin typeface="Helvetica Neue"/>
-              <a:ea typeface="Helvetica Neue"/>
-              <a:cs typeface="Helvetica Neue"/>
-              <a:sym typeface="Helvetica Neue"/>
-            </a:endParaRPr>
-          </a:p>
-        </p:txBody>
-      </p:sp>
-    </p:spTree>
-  </p:cSld>
-  <p:clrMapOvr>
-    <a:masterClrMapping/>
-  </p:clrMapOvr>
-</p:sld>
-</file>
-
-<file path=ppt/slides/slide15.xml><?xml version="1.0" encoding="utf-8"?>
+<file path=ppt/slides/slide16.xml><?xml version="1.0" encoding="utf-8"?>
 <p:sld xmlns:a="http://schemas.openxmlformats.org/drawingml/2006/main" xmlns:r="http://schemas.openxmlformats.org/officeDocument/2006/relationships" xmlns:p="http://schemas.openxmlformats.org/presentationml/2006/main">
   <p:cSld>
     <p:spTree>
@@ -12509,7 +12680,7 @@
 </p:sld>
 </file>
 
-<file path=ppt/slides/slide16.xml><?xml version="1.0" encoding="utf-8"?>
+<file path=ppt/slides/slide17.xml><?xml version="1.0" encoding="utf-8"?>
 <p:sld xmlns:a="http://schemas.openxmlformats.org/drawingml/2006/main" xmlns:r="http://schemas.openxmlformats.org/officeDocument/2006/relationships" xmlns:p="http://schemas.openxmlformats.org/presentationml/2006/main">
   <p:cSld>
     <p:spTree>
@@ -12773,7 +12944,7 @@
 </p:sld>
 </file>
 
-<file path=ppt/slides/slide17.xml><?xml version="1.0" encoding="utf-8"?>
+<file path=ppt/slides/slide18.xml><?xml version="1.0" encoding="utf-8"?>
 <p:sld xmlns:a="http://schemas.openxmlformats.org/drawingml/2006/main" xmlns:r="http://schemas.openxmlformats.org/officeDocument/2006/relationships" xmlns:p="http://schemas.openxmlformats.org/presentationml/2006/main">
   <p:cSld>
     <p:spTree>
@@ -13037,7 +13208,7 @@
 </p:sld>
 </file>
 
-<file path=ppt/slides/slide18.xml><?xml version="1.0" encoding="utf-8"?>
+<file path=ppt/slides/slide2.xml><?xml version="1.0" encoding="utf-8"?>
 <p:sld xmlns:a="http://schemas.openxmlformats.org/drawingml/2006/main" xmlns:r="http://schemas.openxmlformats.org/officeDocument/2006/relationships" xmlns:p="http://schemas.openxmlformats.org/presentationml/2006/main">
   <p:cSld>
     <p:spTree>
@@ -13251,7 +13422,7 @@
 </p:sld>
 </file>
 
-<file path=ppt/slides/slide2.xml><?xml version="1.0" encoding="utf-8"?>
+<file path=ppt/slides/slide3.xml><?xml version="1.0" encoding="utf-8"?>
 <p:sld xmlns:a="http://schemas.openxmlformats.org/drawingml/2006/main" xmlns:r="http://schemas.openxmlformats.org/officeDocument/2006/relationships" xmlns:p="http://schemas.openxmlformats.org/presentationml/2006/main">
   <p:cSld>
     <p:spTree>
@@ -13376,7 +13547,7 @@
 </p:sld>
 </file>
 
-<file path=ppt/slides/slide3.xml><?xml version="1.0" encoding="utf-8"?>
+<file path=ppt/slides/slide4.xml><?xml version="1.0" encoding="utf-8"?>
 <p:sld xmlns:a="http://schemas.openxmlformats.org/drawingml/2006/main" xmlns:r="http://schemas.openxmlformats.org/officeDocument/2006/relationships" xmlns:p="http://schemas.openxmlformats.org/presentationml/2006/main">
   <p:cSld>
     <p:spTree>
@@ -13585,7 +13756,7 @@
 </p:sld>
 </file>
 
-<file path=ppt/slides/slide4.xml><?xml version="1.0" encoding="utf-8"?>
+<file path=ppt/slides/slide5.xml><?xml version="1.0" encoding="utf-8"?>
 <p:sld xmlns:a="http://schemas.openxmlformats.org/drawingml/2006/main" xmlns:r="http://schemas.openxmlformats.org/officeDocument/2006/relationships" xmlns:p="http://schemas.openxmlformats.org/presentationml/2006/main">
   <p:cSld>
     <p:spTree>
@@ -13843,7 +14014,7 @@
 </p:sld>
 </file>
 
-<file path=ppt/slides/slide5.xml><?xml version="1.0" encoding="utf-8"?>
+<file path=ppt/slides/slide6.xml><?xml version="1.0" encoding="utf-8"?>
 <p:sld xmlns:a="http://schemas.openxmlformats.org/drawingml/2006/main" xmlns:r="http://schemas.openxmlformats.org/officeDocument/2006/relationships" xmlns:p="http://schemas.openxmlformats.org/presentationml/2006/main">
   <p:cSld>
     <p:spTree>
@@ -14393,7 +14564,7 @@
 </p:sld>
 </file>
 
-<file path=ppt/slides/slide6.xml><?xml version="1.0" encoding="utf-8"?>
+<file path=ppt/slides/slide7.xml><?xml version="1.0" encoding="utf-8"?>
 <p:sld xmlns:a="http://schemas.openxmlformats.org/drawingml/2006/main" xmlns:r="http://schemas.openxmlformats.org/officeDocument/2006/relationships" xmlns:p="http://schemas.openxmlformats.org/presentationml/2006/main">
   <p:cSld>
     <p:spTree>
@@ -15375,7 +15546,7 @@
 </p:sld>
 </file>
 
-<file path=ppt/slides/slide7.xml><?xml version="1.0" encoding="utf-8"?>
+<file path=ppt/slides/slide8.xml><?xml version="1.0" encoding="utf-8"?>
 <p:sld xmlns:a="http://schemas.openxmlformats.org/drawingml/2006/main" xmlns:r="http://schemas.openxmlformats.org/officeDocument/2006/relationships" xmlns:p="http://schemas.openxmlformats.org/presentationml/2006/main">
   <p:cSld>
     <p:spTree>
@@ -16550,7 +16721,7 @@
 </p:sld>
 </file>
 
-<file path=ppt/slides/slide8.xml><?xml version="1.0" encoding="utf-8"?>
+<file path=ppt/slides/slide9.xml><?xml version="1.0" encoding="utf-8"?>
 <p:sld xmlns:a="http://schemas.openxmlformats.org/drawingml/2006/main" xmlns:r="http://schemas.openxmlformats.org/officeDocument/2006/relationships" xmlns:p="http://schemas.openxmlformats.org/presentationml/2006/main">
   <p:cSld>
     <p:spTree>
@@ -17482,190 +17653,6 @@
 </p:sld>
 </file>
 
-<file path=ppt/slides/slide9.xml><?xml version="1.0" encoding="utf-8"?>
-<p:sld xmlns:a="http://schemas.openxmlformats.org/drawingml/2006/main" xmlns:r="http://schemas.openxmlformats.org/officeDocument/2006/relationships" xmlns:p="http://schemas.openxmlformats.org/presentationml/2006/main">
-  <p:cSld>
-    <p:spTree>
-      <p:nvGrpSpPr>
-        <p:cNvPr id="1" name="Shape 99"/>
-        <p:cNvGrpSpPr/>
-        <p:nvPr/>
-      </p:nvGrpSpPr>
-      <p:grpSpPr>
-        <a:xfrm>
-          <a:off x="0" y="0"/>
-          <a:ext cx="0" cy="0"/>
-          <a:chOff x="0" y="0"/>
-          <a:chExt cx="0" cy="0"/>
-        </a:xfrm>
-      </p:grpSpPr>
-      <p:sp>
-        <p:nvSpPr>
-          <p:cNvPr id="100" name="Google Shape;100;p3"/>
-          <p:cNvSpPr txBox="1">
-            <a:spLocks noGrp="1"/>
-          </p:cNvSpPr>
-          <p:nvPr>
-            <p:ph type="title"/>
-          </p:nvPr>
-        </p:nvSpPr>
-        <p:spPr>
-          <a:xfrm>
-            <a:off x="1689100" y="355600"/>
-            <a:ext cx="21005800" cy="2286000"/>
-          </a:xfrm>
-          <a:prstGeom prst="rect">
-            <a:avLst/>
-          </a:prstGeom>
-          <a:noFill/>
-          <a:ln>
-            <a:noFill/>
-          </a:ln>
-        </p:spPr>
-        <p:txBody>
-          <a:bodyPr spcFirstLastPara="1" wrap="square" lIns="50800" tIns="50800" rIns="50800" bIns="50800" anchor="ctr" anchorCtr="0">
-            <a:normAutofit/>
-          </a:bodyPr>
-          <a:lstStyle/>
-          <a:p>
-            <a:pPr marL="0" marR="0" lvl="0" indent="0" algn="ctr" rtl="0">
-              <a:lnSpc>
-                <a:spcPct val="100000"/>
-              </a:lnSpc>
-              <a:spcBef>
-                <a:spcPts val="0"/>
-              </a:spcBef>
-              <a:spcAft>
-                <a:spcPts val="0"/>
-              </a:spcAft>
-              <a:buClr>
-                <a:srgbClr val="000000"/>
-              </a:buClr>
-              <a:buSzPts val="8848"/>
-              <a:buFont typeface="Helvetica Neue"/>
-              <a:buNone/>
-            </a:pPr>
-            <a:r>
-              <a:rPr lang="en-US" sz="8000" dirty="0"/>
-              <a:t>Demo: </a:t>
-            </a:r>
-            <a:r>
-              <a:rPr lang="en-US" sz="8000" dirty="0" err="1"/>
-              <a:t>Gitflow</a:t>
-            </a:r>
-            <a:endParaRPr sz="8000" dirty="0"/>
-          </a:p>
-        </p:txBody>
-      </p:sp>
-      <p:sp>
-        <p:nvSpPr>
-          <p:cNvPr id="101" name="Google Shape;101;p3"/>
-          <p:cNvSpPr txBox="1">
-            <a:spLocks noGrp="1"/>
-          </p:cNvSpPr>
-          <p:nvPr>
-            <p:ph type="body" idx="1"/>
-          </p:nvPr>
-        </p:nvSpPr>
-        <p:spPr>
-          <a:xfrm>
-            <a:off x="1689100" y="2641600"/>
-            <a:ext cx="21005800" cy="9494982"/>
-          </a:xfrm>
-          <a:prstGeom prst="rect">
-            <a:avLst/>
-          </a:prstGeom>
-          <a:noFill/>
-          <a:ln>
-            <a:noFill/>
-          </a:ln>
-        </p:spPr>
-        <p:txBody>
-          <a:bodyPr spcFirstLastPara="1" wrap="square" lIns="50800" tIns="50800" rIns="50800" bIns="50800" anchor="ctr" anchorCtr="0">
-            <a:normAutofit fontScale="92500" lnSpcReduction="10000"/>
-          </a:bodyPr>
-          <a:lstStyle/>
-          <a:p>
-            <a:pPr marL="0" lvl="0" indent="0" algn="l" rtl="0">
-              <a:lnSpc>
-                <a:spcPct val="100000"/>
-              </a:lnSpc>
-              <a:spcBef>
-                <a:spcPts val="0"/>
-              </a:spcBef>
-              <a:spcAft>
-                <a:spcPts val="0"/>
-              </a:spcAft>
-              <a:buClr>
-                <a:srgbClr val="000000"/>
-              </a:buClr>
-              <a:buSzPts val="6000"/>
-              <a:buNone/>
-            </a:pPr>
-            <a:r>
-              <a:rPr lang="en-US" sz="5800" dirty="0"/>
-              <a:t>In this demo, you will learn how to:</a:t>
-            </a:r>
-            <a:endParaRPr lang="en-US" sz="4800" dirty="0"/>
-          </a:p>
-          <a:p>
-            <a:pPr marL="1092200" lvl="1" indent="-635000"/>
-            <a:r>
-              <a:rPr lang="en-US" dirty="0"/>
-              <a:t>Create and manipulate multiple branches within a git repo (main, develop, feature)</a:t>
-            </a:r>
-            <a:endParaRPr dirty="0"/>
-          </a:p>
-          <a:p>
-            <a:pPr marL="1092200" lvl="1" indent="-635000"/>
-            <a:r>
-              <a:rPr lang="en-US" dirty="0"/>
-              <a:t>How to use these branches in a “standard” git workflow</a:t>
-            </a:r>
-          </a:p>
-          <a:p>
-            <a:pPr marL="1092200" lvl="1" indent="-635000"/>
-            <a:r>
-              <a:rPr lang="en-US" dirty="0"/>
-              <a:t>Submit a pull request on </a:t>
-            </a:r>
-            <a:r>
-              <a:rPr lang="en-US" dirty="0" err="1"/>
-              <a:t>Github</a:t>
-            </a:r>
-            <a:r>
-              <a:rPr lang="en-US" dirty="0"/>
-              <a:t> to merge two branches</a:t>
-            </a:r>
-          </a:p>
-          <a:p>
-            <a:pPr marL="1092200" lvl="1" indent="-635000"/>
-            <a:endParaRPr lang="en-US" dirty="0"/>
-          </a:p>
-          <a:p>
-            <a:pPr marL="0" indent="0">
-              <a:buNone/>
-            </a:pPr>
-            <a:r>
-              <a:rPr lang="en-US" sz="5800" dirty="0"/>
-              <a:t>Try to type along with me as we walk through the demo. However, don’t worry if you get stuck!</a:t>
-            </a:r>
-          </a:p>
-        </p:txBody>
-      </p:sp>
-    </p:spTree>
-    <p:extLst>
-      <p:ext uri="{BB962C8B-B14F-4D97-AF65-F5344CB8AC3E}">
-        <p14:creationId xmlns:p14="http://schemas.microsoft.com/office/powerpoint/2010/main" val="503865505"/>
-      </p:ext>
-    </p:extLst>
-  </p:cSld>
-  <p:clrMapOvr>
-    <a:masterClrMapping/>
-  </p:clrMapOvr>
-</p:sld>
-</file>
-
 <file path=ppt/theme/theme1.xml><?xml version="1.0" encoding="utf-8"?>
 <a:theme xmlns:a="http://schemas.openxmlformats.org/drawingml/2006/main" name="White">
   <a:themeElements>

</xml_diff>

<commit_message>
gitflow updates for 2024
</commit_message>
<xml_diff>
--- a/Day1/gitflow.pptx
+++ b/Day1/gitflow.pptx
@@ -5,7 +5,7 @@
     <p:sldMasterId id="2147483648" r:id="rId1"/>
   </p:sldMasterIdLst>
   <p:notesMasterIdLst>
-    <p:notesMasterId r:id="rId20"/>
+    <p:notesMasterId r:id="rId17"/>
   </p:notesMasterIdLst>
   <p:sldIdLst>
     <p:sldId id="256" r:id="rId2"/>
@@ -17,32 +17,29 @@
     <p:sldId id="290" r:id="rId8"/>
     <p:sldId id="272" r:id="rId9"/>
     <p:sldId id="292" r:id="rId10"/>
-    <p:sldId id="293" r:id="rId11"/>
-    <p:sldId id="274" r:id="rId12"/>
-    <p:sldId id="291" r:id="rId13"/>
-    <p:sldId id="262" r:id="rId14"/>
-    <p:sldId id="294" r:id="rId15"/>
-    <p:sldId id="289" r:id="rId16"/>
-    <p:sldId id="269" r:id="rId17"/>
-    <p:sldId id="270" r:id="rId18"/>
-    <p:sldId id="271" r:id="rId19"/>
+    <p:sldId id="295" r:id="rId11"/>
+    <p:sldId id="293" r:id="rId12"/>
+    <p:sldId id="274" r:id="rId13"/>
+    <p:sldId id="291" r:id="rId14"/>
+    <p:sldId id="262" r:id="rId15"/>
+    <p:sldId id="294" r:id="rId16"/>
   </p:sldIdLst>
   <p:sldSz cx="24384000" cy="13716000"/>
   <p:notesSz cx="6858000" cy="9144000"/>
   <p:embeddedFontLst>
     <p:embeddedFont>
       <p:font typeface="Helvetica Neue" panose="02000503000000020004" pitchFamily="2" charset="0"/>
-      <p:regular r:id="rId21"/>
-      <p:bold r:id="rId22"/>
-      <p:italic r:id="rId23"/>
-      <p:boldItalic r:id="rId24"/>
+      <p:regular r:id="rId18"/>
+      <p:bold r:id="rId19"/>
+      <p:italic r:id="rId20"/>
+      <p:boldItalic r:id="rId21"/>
     </p:embeddedFont>
     <p:embeddedFont>
       <p:font typeface="Helvetica Neue Light" panose="02000403000000020004" pitchFamily="2" charset="0"/>
-      <p:regular r:id="rId25"/>
-      <p:bold r:id="rId26"/>
-      <p:italic r:id="rId27"/>
-      <p:boldItalic r:id="rId28"/>
+      <p:regular r:id="rId22"/>
+      <p:bold r:id="rId23"/>
+      <p:italic r:id="rId24"/>
+      <p:boldItalic r:id="rId25"/>
     </p:embeddedFont>
   </p:embeddedFontLst>
   <p:defaultTextStyle>
@@ -901,6 +898,115 @@
   <p:cSld>
     <p:spTree>
       <p:nvGrpSpPr>
+        <p:cNvPr id="1" name="Shape 193"/>
+        <p:cNvGrpSpPr/>
+        <p:nvPr/>
+      </p:nvGrpSpPr>
+      <p:grpSpPr>
+        <a:xfrm>
+          <a:off x="0" y="0"/>
+          <a:ext cx="0" cy="0"/>
+          <a:chOff x="0" y="0"/>
+          <a:chExt cx="0" cy="0"/>
+        </a:xfrm>
+      </p:grpSpPr>
+      <p:sp>
+        <p:nvSpPr>
+          <p:cNvPr id="194" name="Google Shape;194;p13:notes"/>
+          <p:cNvSpPr txBox="1">
+            <a:spLocks noGrp="1"/>
+          </p:cNvSpPr>
+          <p:nvPr>
+            <p:ph type="body" idx="1"/>
+          </p:nvPr>
+        </p:nvSpPr>
+        <p:spPr>
+          <a:xfrm>
+            <a:off x="914400" y="4343400"/>
+            <a:ext cx="5029200" cy="4114800"/>
+          </a:xfrm>
+          <a:prstGeom prst="rect">
+            <a:avLst/>
+          </a:prstGeom>
+        </p:spPr>
+        <p:txBody>
+          <a:bodyPr spcFirstLastPara="1" wrap="square" lIns="91425" tIns="45700" rIns="91425" bIns="45700" anchor="t" anchorCtr="0">
+            <a:noAutofit/>
+          </a:bodyPr>
+          <a:lstStyle/>
+          <a:p>
+            <a:pPr marL="0" lvl="0" indent="0" algn="l" rtl="0">
+              <a:spcBef>
+                <a:spcPts val="0"/>
+              </a:spcBef>
+              <a:spcAft>
+                <a:spcPts val="0"/>
+              </a:spcAft>
+              <a:buNone/>
+            </a:pPr>
+            <a:endParaRPr/>
+          </a:p>
+        </p:txBody>
+      </p:sp>
+      <p:sp>
+        <p:nvSpPr>
+          <p:cNvPr id="195" name="Google Shape;195;p13:notes"/>
+          <p:cNvSpPr>
+            <a:spLocks noGrp="1" noRot="1" noChangeAspect="1"/>
+          </p:cNvSpPr>
+          <p:nvPr>
+            <p:ph type="sldImg" idx="2"/>
+          </p:nvPr>
+        </p:nvSpPr>
+        <p:spPr>
+          <a:xfrm>
+            <a:off x="381000" y="685800"/>
+            <a:ext cx="6096000" cy="3429000"/>
+          </a:xfrm>
+          <a:custGeom>
+            <a:avLst/>
+            <a:gdLst/>
+            <a:ahLst/>
+            <a:cxnLst/>
+            <a:rect l="l" t="t" r="r" b="b"/>
+            <a:pathLst>
+              <a:path w="120000" h="120000" extrusionOk="0">
+                <a:moveTo>
+                  <a:pt x="0" y="0"/>
+                </a:moveTo>
+                <a:lnTo>
+                  <a:pt x="120000" y="0"/>
+                </a:lnTo>
+                <a:lnTo>
+                  <a:pt x="120000" y="120000"/>
+                </a:lnTo>
+                <a:lnTo>
+                  <a:pt x="0" y="120000"/>
+                </a:lnTo>
+                <a:close/>
+              </a:path>
+            </a:pathLst>
+          </a:custGeom>
+        </p:spPr>
+      </p:sp>
+    </p:spTree>
+    <p:extLst>
+      <p:ext uri="{BB962C8B-B14F-4D97-AF65-F5344CB8AC3E}">
+        <p14:creationId xmlns:p14="http://schemas.microsoft.com/office/powerpoint/2010/main" val="498390696"/>
+      </p:ext>
+    </p:extLst>
+  </p:cSld>
+  <p:clrMapOvr>
+    <a:masterClrMapping/>
+  </p:clrMapOvr>
+</p:notes>
+</file>
+
+<file path=ppt/notesSlides/notesSlide11.xml><?xml version="1.0" encoding="utf-8"?>
+<p:notes xmlns:a="http://schemas.openxmlformats.org/drawingml/2006/main" xmlns:r="http://schemas.openxmlformats.org/officeDocument/2006/relationships" xmlns:p="http://schemas.openxmlformats.org/presentationml/2006/main" showMasterSp="0" showMasterPhAnim="0">
+  <p:cSld>
+    <p:spTree>
+      <p:nvGrpSpPr>
         <p:cNvPr id="1" name="Shape 96"/>
         <p:cNvGrpSpPr/>
         <p:nvPr/>
@@ -946,6 +1052,115 @@
                 <a:spcPts val="0"/>
               </a:spcAft>
               <a:buNone/>
+            </a:pPr>
+            <a:r>
+              <a:rPr lang="en-US" dirty="0"/>
+              <a:t>Demo tasks:</a:t>
+            </a:r>
+          </a:p>
+          <a:p>
+            <a:pPr marL="342900" lvl="0" indent="-342900" algn="l" rtl="0">
+              <a:spcBef>
+                <a:spcPts val="0"/>
+              </a:spcBef>
+              <a:spcAft>
+                <a:spcPts val="0"/>
+              </a:spcAft>
+              <a:buFontTx/>
+              <a:buChar char="-"/>
+            </a:pPr>
+            <a:r>
+              <a:rPr lang="en-US" dirty="0"/>
+              <a:t>Raise an issue in the </a:t>
+            </a:r>
+            <a:r>
+              <a:rPr lang="en-US" dirty="0" err="1"/>
+              <a:t>codeastro</a:t>
+            </a:r>
+            <a:r>
+              <a:rPr lang="en-US" dirty="0"/>
+              <a:t> repository</a:t>
+            </a:r>
+          </a:p>
+          <a:p>
+            <a:pPr marL="342900" lvl="0" indent="-342900" algn="l" rtl="0">
+              <a:spcBef>
+                <a:spcPts val="0"/>
+              </a:spcBef>
+              <a:spcAft>
+                <a:spcPts val="0"/>
+              </a:spcAft>
+              <a:buFontTx/>
+              <a:buChar char="-"/>
+            </a:pPr>
+            <a:r>
+              <a:rPr lang="en-US" dirty="0"/>
+              <a:t>Create a new repository from </a:t>
+            </a:r>
+            <a:r>
+              <a:rPr lang="en-US" dirty="0" err="1"/>
+              <a:t>github</a:t>
+            </a:r>
+            <a:endParaRPr lang="en-US" dirty="0"/>
+          </a:p>
+          <a:p>
+            <a:pPr marL="342900" lvl="0" indent="-342900" algn="l" rtl="0">
+              <a:spcBef>
+                <a:spcPts val="0"/>
+              </a:spcBef>
+              <a:spcAft>
+                <a:spcPts val="0"/>
+              </a:spcAft>
+              <a:buFontTx/>
+              <a:buChar char="-"/>
+            </a:pPr>
+            <a:r>
+              <a:rPr lang="en-US" dirty="0"/>
+              <a:t>Create main, develop, feature1, and feature2 branches</a:t>
+            </a:r>
+          </a:p>
+          <a:p>
+            <a:pPr marL="342900" lvl="0" indent="-342900" algn="l" rtl="0">
+              <a:spcBef>
+                <a:spcPts val="0"/>
+              </a:spcBef>
+              <a:spcAft>
+                <a:spcPts val="0"/>
+              </a:spcAft>
+              <a:buFontTx/>
+              <a:buChar char="-"/>
+            </a:pPr>
+            <a:r>
+              <a:rPr lang="en-US" dirty="0"/>
+              <a:t>Create PRs for feature1 and feature2 to develop</a:t>
+            </a:r>
+          </a:p>
+          <a:p>
+            <a:pPr marL="342900" lvl="0" indent="-342900" algn="l" rtl="0">
+              <a:spcBef>
+                <a:spcPts val="0"/>
+              </a:spcBef>
+              <a:spcAft>
+                <a:spcPts val="0"/>
+              </a:spcAft>
+              <a:buFontTx/>
+              <a:buChar char="-"/>
+            </a:pPr>
+            <a:r>
+              <a:rPr lang="en-US" dirty="0"/>
+              <a:t>Merge the PRs</a:t>
+            </a:r>
+          </a:p>
+          <a:p>
+            <a:pPr marL="342900" lvl="0" indent="-342900" algn="l" rtl="0">
+              <a:spcBef>
+                <a:spcPts val="0"/>
+              </a:spcBef>
+              <a:spcAft>
+                <a:spcPts val="0"/>
+              </a:spcAft>
+              <a:buFontTx/>
+              <a:buChar char="-"/>
             </a:pPr>
             <a:endParaRPr dirty="0"/>
           </a:p>
@@ -1005,7 +1220,7 @@
 </p:notes>
 </file>
 
-<file path=ppt/notesSlides/notesSlide11.xml><?xml version="1.0" encoding="utf-8"?>
+<file path=ppt/notesSlides/notesSlide12.xml><?xml version="1.0" encoding="utf-8"?>
 <p:notes xmlns:a="http://schemas.openxmlformats.org/drawingml/2006/main" xmlns:r="http://schemas.openxmlformats.org/officeDocument/2006/relationships" xmlns:p="http://schemas.openxmlformats.org/presentationml/2006/main" showMasterSp="0" showMasterPhAnim="0">
   <p:cSld>
     <p:spTree>
@@ -1109,7 +1324,7 @@
 </p:notes>
 </file>
 
-<file path=ppt/notesSlides/notesSlide12.xml><?xml version="1.0" encoding="utf-8"?>
+<file path=ppt/notesSlides/notesSlide13.xml><?xml version="1.0" encoding="utf-8"?>
 <p:notes xmlns:a="http://schemas.openxmlformats.org/drawingml/2006/main" xmlns:r="http://schemas.openxmlformats.org/officeDocument/2006/relationships" xmlns:p="http://schemas.openxmlformats.org/presentationml/2006/main" showMasterSp="0" showMasterPhAnim="0">
   <p:cSld>
     <p:spTree>
@@ -1218,7 +1433,7 @@
 </p:notes>
 </file>
 
-<file path=ppt/notesSlides/notesSlide13.xml><?xml version="1.0" encoding="utf-8"?>
+<file path=ppt/notesSlides/notesSlide14.xml><?xml version="1.0" encoding="utf-8"?>
 <p:notes xmlns:a="http://schemas.openxmlformats.org/drawingml/2006/main" xmlns:r="http://schemas.openxmlformats.org/officeDocument/2006/relationships" xmlns:p="http://schemas.openxmlformats.org/presentationml/2006/main" showMasterSp="0" showMasterPhAnim="0">
   <p:cSld>
     <p:spTree>
@@ -1311,10 +1526,10 @@
               <a:buNone/>
             </a:pPr>
             <a:r>
-              <a:rPr lang="en-US"/>
+              <a:rPr lang="en-US" dirty="0"/>
               <a:t>on zoom: use stack. </a:t>
             </a:r>
-            <a:endParaRPr/>
+            <a:endParaRPr dirty="0"/>
           </a:p>
           <a:p>
             <a:pPr marL="0" lvl="0" indent="0" algn="l" rtl="0">
@@ -1327,10 +1542,10 @@
               <a:buNone/>
             </a:pPr>
             <a:r>
-              <a:rPr lang="en-US"/>
+              <a:rPr lang="en-US" dirty="0"/>
               <a:t>IRL: raise hand. </a:t>
             </a:r>
-            <a:endParaRPr/>
+            <a:endParaRPr dirty="0"/>
           </a:p>
           <a:p>
             <a:pPr marL="0" lvl="0" indent="0" algn="l" rtl="0">
@@ -1343,10 +1558,22 @@
               <a:buNone/>
             </a:pPr>
             <a:r>
-              <a:rPr lang="en-US"/>
-              <a:t>Alternate btwn zoom &amp; irl</a:t>
+              <a:rPr lang="en-US" dirty="0"/>
+              <a:t>Alternate </a:t>
             </a:r>
-            <a:endParaRPr/>
+            <a:r>
+              <a:rPr lang="en-US" dirty="0" err="1"/>
+              <a:t>btwn</a:t>
+            </a:r>
+            <a:r>
+              <a:rPr lang="en-US" dirty="0"/>
+              <a:t> zoom &amp; </a:t>
+            </a:r>
+            <a:r>
+              <a:rPr lang="en-US" dirty="0" err="1"/>
+              <a:t>irl</a:t>
+            </a:r>
+            <a:endParaRPr dirty="0"/>
           </a:p>
         </p:txBody>
       </p:sp>
@@ -1358,7 +1585,7 @@
 </p:notes>
 </file>
 
-<file path=ppt/notesSlides/notesSlide14.xml><?xml version="1.0" encoding="utf-8"?>
+<file path=ppt/notesSlides/notesSlide15.xml><?xml version="1.0" encoding="utf-8"?>
 <p:notes xmlns:a="http://schemas.openxmlformats.org/drawingml/2006/main" xmlns:r="http://schemas.openxmlformats.org/officeDocument/2006/relationships" xmlns:p="http://schemas.openxmlformats.org/presentationml/2006/main" showMasterSp="0" showMasterPhAnim="0">
   <p:cSld>
     <p:spTree>
@@ -1460,318 +1687,6 @@
         <p14:creationId xmlns:p14="http://schemas.microsoft.com/office/powerpoint/2010/main" val="1796064178"/>
       </p:ext>
     </p:extLst>
-  </p:cSld>
-  <p:clrMapOvr>
-    <a:masterClrMapping/>
-  </p:clrMapOvr>
-</p:notes>
-</file>
-
-<file path=ppt/notesSlides/notesSlide15.xml><?xml version="1.0" encoding="utf-8"?>
-<p:notes xmlns:a="http://schemas.openxmlformats.org/drawingml/2006/main" xmlns:r="http://schemas.openxmlformats.org/officeDocument/2006/relationships" xmlns:p="http://schemas.openxmlformats.org/presentationml/2006/main" showMasterSp="0" showMasterPhAnim="0">
-  <p:cSld>
-    <p:spTree>
-      <p:nvGrpSpPr>
-        <p:cNvPr id="1" name="Shape 170"/>
-        <p:cNvGrpSpPr/>
-        <p:nvPr/>
-      </p:nvGrpSpPr>
-      <p:grpSpPr>
-        <a:xfrm>
-          <a:off x="0" y="0"/>
-          <a:ext cx="0" cy="0"/>
-          <a:chOff x="0" y="0"/>
-          <a:chExt cx="0" cy="0"/>
-        </a:xfrm>
-      </p:grpSpPr>
-      <p:sp>
-        <p:nvSpPr>
-          <p:cNvPr id="171" name="Google Shape;171;p10:notes"/>
-          <p:cNvSpPr txBox="1">
-            <a:spLocks noGrp="1"/>
-          </p:cNvSpPr>
-          <p:nvPr>
-            <p:ph type="body" idx="1"/>
-          </p:nvPr>
-        </p:nvSpPr>
-        <p:spPr>
-          <a:xfrm>
-            <a:off x="914400" y="4343400"/>
-            <a:ext cx="5029200" cy="4114800"/>
-          </a:xfrm>
-          <a:prstGeom prst="rect">
-            <a:avLst/>
-          </a:prstGeom>
-        </p:spPr>
-        <p:txBody>
-          <a:bodyPr spcFirstLastPara="1" wrap="square" lIns="91425" tIns="45700" rIns="91425" bIns="45700" anchor="t" anchorCtr="0">
-            <a:noAutofit/>
-          </a:bodyPr>
-          <a:lstStyle/>
-          <a:p>
-            <a:pPr marL="0" lvl="0" indent="0" algn="l" rtl="0">
-              <a:spcBef>
-                <a:spcPts val="0"/>
-              </a:spcBef>
-              <a:spcAft>
-                <a:spcPts val="0"/>
-              </a:spcAft>
-              <a:buNone/>
-            </a:pPr>
-            <a:endParaRPr/>
-          </a:p>
-        </p:txBody>
-      </p:sp>
-      <p:sp>
-        <p:nvSpPr>
-          <p:cNvPr id="172" name="Google Shape;172;p10:notes"/>
-          <p:cNvSpPr>
-            <a:spLocks noGrp="1" noRot="1" noChangeAspect="1"/>
-          </p:cNvSpPr>
-          <p:nvPr>
-            <p:ph type="sldImg" idx="2"/>
-          </p:nvPr>
-        </p:nvSpPr>
-        <p:spPr>
-          <a:xfrm>
-            <a:off x="381000" y="685800"/>
-            <a:ext cx="6096000" cy="3429000"/>
-          </a:xfrm>
-          <a:custGeom>
-            <a:avLst/>
-            <a:gdLst/>
-            <a:ahLst/>
-            <a:cxnLst/>
-            <a:rect l="l" t="t" r="r" b="b"/>
-            <a:pathLst>
-              <a:path w="120000" h="120000" extrusionOk="0">
-                <a:moveTo>
-                  <a:pt x="0" y="0"/>
-                </a:moveTo>
-                <a:lnTo>
-                  <a:pt x="120000" y="0"/>
-                </a:lnTo>
-                <a:lnTo>
-                  <a:pt x="120000" y="120000"/>
-                </a:lnTo>
-                <a:lnTo>
-                  <a:pt x="0" y="120000"/>
-                </a:lnTo>
-                <a:close/>
-              </a:path>
-            </a:pathLst>
-          </a:custGeom>
-        </p:spPr>
-      </p:sp>
-    </p:spTree>
-  </p:cSld>
-  <p:clrMapOvr>
-    <a:masterClrMapping/>
-  </p:clrMapOvr>
-</p:notes>
-</file>
-
-<file path=ppt/notesSlides/notesSlide16.xml><?xml version="1.0" encoding="utf-8"?>
-<p:notes xmlns:a="http://schemas.openxmlformats.org/drawingml/2006/main" xmlns:r="http://schemas.openxmlformats.org/officeDocument/2006/relationships" xmlns:p="http://schemas.openxmlformats.org/presentationml/2006/main" showMasterSp="0" showMasterPhAnim="0">
-  <p:cSld>
-    <p:spTree>
-      <p:nvGrpSpPr>
-        <p:cNvPr id="1" name="Shape 177"/>
-        <p:cNvGrpSpPr/>
-        <p:nvPr/>
-      </p:nvGrpSpPr>
-      <p:grpSpPr>
-        <a:xfrm>
-          <a:off x="0" y="0"/>
-          <a:ext cx="0" cy="0"/>
-          <a:chOff x="0" y="0"/>
-          <a:chExt cx="0" cy="0"/>
-        </a:xfrm>
-      </p:grpSpPr>
-      <p:sp>
-        <p:nvSpPr>
-          <p:cNvPr id="178" name="Google Shape;178;p11:notes"/>
-          <p:cNvSpPr txBox="1">
-            <a:spLocks noGrp="1"/>
-          </p:cNvSpPr>
-          <p:nvPr>
-            <p:ph type="body" idx="1"/>
-          </p:nvPr>
-        </p:nvSpPr>
-        <p:spPr>
-          <a:xfrm>
-            <a:off x="914400" y="4343400"/>
-            <a:ext cx="5029200" cy="4114800"/>
-          </a:xfrm>
-          <a:prstGeom prst="rect">
-            <a:avLst/>
-          </a:prstGeom>
-        </p:spPr>
-        <p:txBody>
-          <a:bodyPr spcFirstLastPara="1" wrap="square" lIns="91425" tIns="45700" rIns="91425" bIns="45700" anchor="t" anchorCtr="0">
-            <a:noAutofit/>
-          </a:bodyPr>
-          <a:lstStyle/>
-          <a:p>
-            <a:pPr marL="0" lvl="0" indent="0" algn="l" rtl="0">
-              <a:spcBef>
-                <a:spcPts val="0"/>
-              </a:spcBef>
-              <a:spcAft>
-                <a:spcPts val="0"/>
-              </a:spcAft>
-              <a:buNone/>
-            </a:pPr>
-            <a:endParaRPr/>
-          </a:p>
-        </p:txBody>
-      </p:sp>
-      <p:sp>
-        <p:nvSpPr>
-          <p:cNvPr id="179" name="Google Shape;179;p11:notes"/>
-          <p:cNvSpPr>
-            <a:spLocks noGrp="1" noRot="1" noChangeAspect="1"/>
-          </p:cNvSpPr>
-          <p:nvPr>
-            <p:ph type="sldImg" idx="2"/>
-          </p:nvPr>
-        </p:nvSpPr>
-        <p:spPr>
-          <a:xfrm>
-            <a:off x="381000" y="685800"/>
-            <a:ext cx="6096000" cy="3429000"/>
-          </a:xfrm>
-          <a:custGeom>
-            <a:avLst/>
-            <a:gdLst/>
-            <a:ahLst/>
-            <a:cxnLst/>
-            <a:rect l="l" t="t" r="r" b="b"/>
-            <a:pathLst>
-              <a:path w="120000" h="120000" extrusionOk="0">
-                <a:moveTo>
-                  <a:pt x="0" y="0"/>
-                </a:moveTo>
-                <a:lnTo>
-                  <a:pt x="120000" y="0"/>
-                </a:lnTo>
-                <a:lnTo>
-                  <a:pt x="120000" y="120000"/>
-                </a:lnTo>
-                <a:lnTo>
-                  <a:pt x="0" y="120000"/>
-                </a:lnTo>
-                <a:close/>
-              </a:path>
-            </a:pathLst>
-          </a:custGeom>
-        </p:spPr>
-      </p:sp>
-    </p:spTree>
-  </p:cSld>
-  <p:clrMapOvr>
-    <a:masterClrMapping/>
-  </p:clrMapOvr>
-</p:notes>
-</file>
-
-<file path=ppt/notesSlides/notesSlide17.xml><?xml version="1.0" encoding="utf-8"?>
-<p:notes xmlns:a="http://schemas.openxmlformats.org/drawingml/2006/main" xmlns:r="http://schemas.openxmlformats.org/officeDocument/2006/relationships" xmlns:p="http://schemas.openxmlformats.org/presentationml/2006/main" showMasterSp="0" showMasterPhAnim="0">
-  <p:cSld>
-    <p:spTree>
-      <p:nvGrpSpPr>
-        <p:cNvPr id="1" name="Shape 185"/>
-        <p:cNvGrpSpPr/>
-        <p:nvPr/>
-      </p:nvGrpSpPr>
-      <p:grpSpPr>
-        <a:xfrm>
-          <a:off x="0" y="0"/>
-          <a:ext cx="0" cy="0"/>
-          <a:chOff x="0" y="0"/>
-          <a:chExt cx="0" cy="0"/>
-        </a:xfrm>
-      </p:grpSpPr>
-      <p:sp>
-        <p:nvSpPr>
-          <p:cNvPr id="186" name="Google Shape;186;p12:notes"/>
-          <p:cNvSpPr txBox="1">
-            <a:spLocks noGrp="1"/>
-          </p:cNvSpPr>
-          <p:nvPr>
-            <p:ph type="body" idx="1"/>
-          </p:nvPr>
-        </p:nvSpPr>
-        <p:spPr>
-          <a:xfrm>
-            <a:off x="914400" y="4343400"/>
-            <a:ext cx="5029200" cy="4114800"/>
-          </a:xfrm>
-          <a:prstGeom prst="rect">
-            <a:avLst/>
-          </a:prstGeom>
-        </p:spPr>
-        <p:txBody>
-          <a:bodyPr spcFirstLastPara="1" wrap="square" lIns="91425" tIns="45700" rIns="91425" bIns="45700" anchor="t" anchorCtr="0">
-            <a:noAutofit/>
-          </a:bodyPr>
-          <a:lstStyle/>
-          <a:p>
-            <a:pPr marL="0" lvl="0" indent="0" algn="l" rtl="0">
-              <a:spcBef>
-                <a:spcPts val="0"/>
-              </a:spcBef>
-              <a:spcAft>
-                <a:spcPts val="0"/>
-              </a:spcAft>
-              <a:buNone/>
-            </a:pPr>
-            <a:endParaRPr/>
-          </a:p>
-        </p:txBody>
-      </p:sp>
-      <p:sp>
-        <p:nvSpPr>
-          <p:cNvPr id="187" name="Google Shape;187;p12:notes"/>
-          <p:cNvSpPr>
-            <a:spLocks noGrp="1" noRot="1" noChangeAspect="1"/>
-          </p:cNvSpPr>
-          <p:nvPr>
-            <p:ph type="sldImg" idx="2"/>
-          </p:nvPr>
-        </p:nvSpPr>
-        <p:spPr>
-          <a:xfrm>
-            <a:off x="381000" y="685800"/>
-            <a:ext cx="6096000" cy="3429000"/>
-          </a:xfrm>
-          <a:custGeom>
-            <a:avLst/>
-            <a:gdLst/>
-            <a:ahLst/>
-            <a:cxnLst/>
-            <a:rect l="l" t="t" r="r" b="b"/>
-            <a:pathLst>
-              <a:path w="120000" h="120000" extrusionOk="0">
-                <a:moveTo>
-                  <a:pt x="0" y="0"/>
-                </a:moveTo>
-                <a:lnTo>
-                  <a:pt x="120000" y="0"/>
-                </a:lnTo>
-                <a:lnTo>
-                  <a:pt x="120000" y="120000"/>
-                </a:lnTo>
-                <a:lnTo>
-                  <a:pt x="0" y="120000"/>
-                </a:lnTo>
-                <a:close/>
-              </a:path>
-            </a:pathLst>
-          </a:custGeom>
-        </p:spPr>
-      </p:sp>
-    </p:spTree>
   </p:cSld>
   <p:clrMapOvr>
     <a:masterClrMapping/>
@@ -10788,10 +10703,14 @@
           <a:lstStyle/>
           <a:p>
             <a:r>
-              <a:rPr lang="en-US" dirty="0" err="1"/>
+              <a:rPr lang="en-US" dirty="0" err="1">
+                <a:latin typeface="+mn-lt"/>
+              </a:rPr>
               <a:t>Gitflow</a:t>
             </a:r>
-            <a:endParaRPr lang="en-US" dirty="0"/>
+            <a:endParaRPr lang="en-US" dirty="0">
+              <a:latin typeface="+mn-lt"/>
+            </a:endParaRPr>
           </a:p>
         </p:txBody>
       </p:sp>
@@ -11075,7 +10994,9 @@
           </a:lstStyle>
           <a:p>
             <a:r>
-              <a:rPr lang="en-US" dirty="0"/>
+              <a:rPr lang="en-US" dirty="0">
+                <a:latin typeface="+mn-lt"/>
+              </a:rPr>
               <a:t>Code/Astro 2024</a:t>
             </a:r>
           </a:p>
@@ -11090,6 +11011,945 @@
 </file>
 
 <file path=ppt/slides/slide10.xml><?xml version="1.0" encoding="utf-8"?>
+<p:sld xmlns:a="http://schemas.openxmlformats.org/drawingml/2006/main" xmlns:r="http://schemas.openxmlformats.org/officeDocument/2006/relationships" xmlns:p="http://schemas.openxmlformats.org/presentationml/2006/main">
+  <p:cSld>
+    <p:spTree>
+      <p:nvGrpSpPr>
+        <p:cNvPr id="1" name="Shape 196"/>
+        <p:cNvGrpSpPr/>
+        <p:nvPr/>
+      </p:nvGrpSpPr>
+      <p:grpSpPr>
+        <a:xfrm>
+          <a:off x="0" y="0"/>
+          <a:ext cx="0" cy="0"/>
+          <a:chOff x="0" y="0"/>
+          <a:chExt cx="0" cy="0"/>
+        </a:xfrm>
+      </p:grpSpPr>
+      <p:pic>
+        <p:nvPicPr>
+          <p:cNvPr id="197" name="Google Shape;197;p13" descr="Screenshot 2020-06-05 12.22.34.png"/>
+          <p:cNvPicPr preferRelativeResize="0"/>
+          <p:nvPr/>
+        </p:nvPicPr>
+        <p:blipFill rotWithShape="1">
+          <a:blip r:embed="rId3">
+            <a:alphaModFix/>
+          </a:blip>
+          <a:srcRect b="11825"/>
+          <a:stretch/>
+        </p:blipFill>
+        <p:spPr>
+          <a:xfrm>
+            <a:off x="2566743" y="2541399"/>
+            <a:ext cx="19250514" cy="9765931"/>
+          </a:xfrm>
+          <a:prstGeom prst="rect">
+            <a:avLst/>
+          </a:prstGeom>
+          <a:noFill/>
+          <a:ln>
+            <a:noFill/>
+          </a:ln>
+        </p:spPr>
+      </p:pic>
+      <p:sp>
+        <p:nvSpPr>
+          <p:cNvPr id="198" name="Google Shape;198;p13"/>
+          <p:cNvSpPr txBox="1">
+            <a:spLocks noGrp="1"/>
+          </p:cNvSpPr>
+          <p:nvPr>
+            <p:ph type="title"/>
+          </p:nvPr>
+        </p:nvSpPr>
+        <p:spPr>
+          <a:xfrm>
+            <a:off x="1689100" y="355600"/>
+            <a:ext cx="21005800" cy="2286000"/>
+          </a:xfrm>
+          <a:prstGeom prst="rect">
+            <a:avLst/>
+          </a:prstGeom>
+          <a:noFill/>
+          <a:ln>
+            <a:noFill/>
+          </a:ln>
+        </p:spPr>
+        <p:txBody>
+          <a:bodyPr spcFirstLastPara="1" wrap="square" lIns="50800" tIns="50800" rIns="50800" bIns="50800" anchor="ctr" anchorCtr="0">
+            <a:normAutofit/>
+          </a:bodyPr>
+          <a:lstStyle/>
+          <a:p>
+            <a:pPr marL="0" lvl="0" indent="0" algn="ctr" rtl="0">
+              <a:lnSpc>
+                <a:spcPct val="100000"/>
+              </a:lnSpc>
+              <a:spcBef>
+                <a:spcPts val="0"/>
+              </a:spcBef>
+              <a:spcAft>
+                <a:spcPts val="0"/>
+              </a:spcAft>
+              <a:buClr>
+                <a:srgbClr val="000000"/>
+              </a:buClr>
+              <a:buSzPts val="11200"/>
+              <a:buFont typeface="Helvetica Neue"/>
+              <a:buNone/>
+            </a:pPr>
+            <a:r>
+              <a:rPr lang="en-US" sz="7200" b="0" i="0" u="none" strike="noStrike" cap="none" dirty="0">
+                <a:solidFill>
+                  <a:srgbClr val="000000"/>
+                </a:solidFill>
+                <a:latin typeface="+mn-lt"/>
+                <a:ea typeface="Helvetica Neue"/>
+                <a:cs typeface="Helvetica Neue"/>
+                <a:sym typeface="Helvetica Neue"/>
+              </a:rPr>
+              <a:t>4. Merge into main</a:t>
+            </a:r>
+            <a:endParaRPr sz="7200" dirty="0">
+              <a:latin typeface="+mn-lt"/>
+            </a:endParaRPr>
+          </a:p>
+        </p:txBody>
+      </p:sp>
+      <p:sp>
+        <p:nvSpPr>
+          <p:cNvPr id="199" name="Google Shape;199;p13"/>
+          <p:cNvSpPr/>
+          <p:nvPr/>
+        </p:nvSpPr>
+        <p:spPr>
+          <a:xfrm>
+            <a:off x="14670332" y="10583134"/>
+            <a:ext cx="7146925" cy="1719842"/>
+          </a:xfrm>
+          <a:prstGeom prst="rect">
+            <a:avLst/>
+          </a:prstGeom>
+          <a:solidFill>
+            <a:srgbClr val="F5F5F5"/>
+          </a:solidFill>
+          <a:ln>
+            <a:noFill/>
+          </a:ln>
+        </p:spPr>
+        <p:txBody>
+          <a:bodyPr spcFirstLastPara="1" wrap="square" lIns="0" tIns="0" rIns="0" bIns="0" anchor="ctr" anchorCtr="0">
+            <a:noAutofit/>
+          </a:bodyPr>
+          <a:lstStyle/>
+          <a:p>
+            <a:pPr marL="0" marR="0" lvl="0" indent="0" algn="ctr" rtl="0">
+              <a:lnSpc>
+                <a:spcPct val="100000"/>
+              </a:lnSpc>
+              <a:spcBef>
+                <a:spcPts val="0"/>
+              </a:spcBef>
+              <a:spcAft>
+                <a:spcPts val="0"/>
+              </a:spcAft>
+              <a:buClr>
+                <a:srgbClr val="FFFFFF"/>
+              </a:buClr>
+              <a:buSzPts val="3200"/>
+              <a:buFont typeface="Helvetica Neue"/>
+              <a:buNone/>
+            </a:pPr>
+            <a:endParaRPr sz="3200" b="0" i="0" u="none" strike="noStrike" cap="none">
+              <a:solidFill>
+                <a:srgbClr val="FFFFFF"/>
+              </a:solidFill>
+              <a:latin typeface="Helvetica Neue"/>
+              <a:ea typeface="Helvetica Neue"/>
+              <a:cs typeface="Helvetica Neue"/>
+              <a:sym typeface="Helvetica Neue"/>
+            </a:endParaRPr>
+          </a:p>
+        </p:txBody>
+      </p:sp>
+      <p:sp>
+        <p:nvSpPr>
+          <p:cNvPr id="200" name="Google Shape;200;p13"/>
+          <p:cNvSpPr/>
+          <p:nvPr/>
+        </p:nvSpPr>
+        <p:spPr>
+          <a:xfrm>
+            <a:off x="8956802" y="5734935"/>
+            <a:ext cx="2729938" cy="2246130"/>
+          </a:xfrm>
+          <a:prstGeom prst="rect">
+            <a:avLst/>
+          </a:prstGeom>
+          <a:solidFill>
+            <a:srgbClr val="F5F5F5"/>
+          </a:solidFill>
+          <a:ln>
+            <a:noFill/>
+          </a:ln>
+        </p:spPr>
+        <p:txBody>
+          <a:bodyPr spcFirstLastPara="1" wrap="square" lIns="0" tIns="0" rIns="0" bIns="0" anchor="ctr" anchorCtr="0">
+            <a:noAutofit/>
+          </a:bodyPr>
+          <a:lstStyle/>
+          <a:p>
+            <a:pPr marL="0" marR="0" lvl="0" indent="0" algn="ctr" rtl="0">
+              <a:lnSpc>
+                <a:spcPct val="100000"/>
+              </a:lnSpc>
+              <a:spcBef>
+                <a:spcPts val="0"/>
+              </a:spcBef>
+              <a:spcAft>
+                <a:spcPts val="0"/>
+              </a:spcAft>
+              <a:buClr>
+                <a:srgbClr val="FFFFFF"/>
+              </a:buClr>
+              <a:buSzPts val="3200"/>
+              <a:buFont typeface="Helvetica Neue"/>
+              <a:buNone/>
+            </a:pPr>
+            <a:endParaRPr sz="3200" b="0" i="0" u="none" strike="noStrike" cap="none">
+              <a:solidFill>
+                <a:srgbClr val="FFFFFF"/>
+              </a:solidFill>
+              <a:latin typeface="Helvetica Neue"/>
+              <a:ea typeface="Helvetica Neue"/>
+              <a:cs typeface="Helvetica Neue"/>
+              <a:sym typeface="Helvetica Neue"/>
+            </a:endParaRPr>
+          </a:p>
+        </p:txBody>
+      </p:sp>
+      <p:sp>
+        <p:nvSpPr>
+          <p:cNvPr id="203" name="Google Shape;203;p13"/>
+          <p:cNvSpPr txBox="1"/>
+          <p:nvPr/>
+        </p:nvSpPr>
+        <p:spPr>
+          <a:xfrm>
+            <a:off x="3506109" y="3215894"/>
+            <a:ext cx="1264921" cy="548134"/>
+          </a:xfrm>
+          <a:prstGeom prst="rect">
+            <a:avLst/>
+          </a:prstGeom>
+          <a:solidFill>
+            <a:srgbClr val="B3E3FF"/>
+          </a:solidFill>
+          <a:ln>
+            <a:noFill/>
+          </a:ln>
+        </p:spPr>
+        <p:txBody>
+          <a:bodyPr spcFirstLastPara="1" wrap="square" lIns="50800" tIns="50800" rIns="50800" bIns="50800" anchor="ctr" anchorCtr="0">
+            <a:spAutoFit/>
+          </a:bodyPr>
+          <a:lstStyle/>
+          <a:p>
+            <a:pPr marL="0" marR="0" lvl="0" indent="0" algn="ctr" rtl="0">
+              <a:lnSpc>
+                <a:spcPct val="100000"/>
+              </a:lnSpc>
+              <a:spcBef>
+                <a:spcPts val="0"/>
+              </a:spcBef>
+              <a:spcAft>
+                <a:spcPts val="0"/>
+              </a:spcAft>
+              <a:buClr>
+                <a:srgbClr val="000000"/>
+              </a:buClr>
+              <a:buSzPts val="3000"/>
+              <a:buFont typeface="Helvetica Neue"/>
+              <a:buNone/>
+            </a:pPr>
+            <a:r>
+              <a:rPr lang="en-US" sz="3000" b="0" i="0" u="none" strike="noStrike" cap="none" dirty="0">
+                <a:solidFill>
+                  <a:srgbClr val="000000"/>
+                </a:solidFill>
+                <a:latin typeface="Helvetica Neue"/>
+                <a:ea typeface="Helvetica Neue"/>
+                <a:cs typeface="Helvetica Neue"/>
+                <a:sym typeface="Helvetica Neue"/>
+              </a:rPr>
+              <a:t>Main   </a:t>
+            </a:r>
+            <a:endParaRPr dirty="0"/>
+          </a:p>
+        </p:txBody>
+      </p:sp>
+      <p:sp>
+        <p:nvSpPr>
+          <p:cNvPr id="10" name="Rectangle 9">
+            <a:extLst>
+              <a:ext uri="{FF2B5EF4-FFF2-40B4-BE49-F238E27FC236}">
+                <a16:creationId xmlns:a16="http://schemas.microsoft.com/office/drawing/2014/main" id="{51F4AA09-C08B-5848-8FB7-C74D7A5FCF27}"/>
+              </a:ext>
+            </a:extLst>
+          </p:cNvPr>
+          <p:cNvSpPr/>
+          <p:nvPr/>
+        </p:nvSpPr>
+        <p:spPr>
+          <a:xfrm>
+            <a:off x="3029288" y="10428456"/>
+            <a:ext cx="5601761" cy="1874519"/>
+          </a:xfrm>
+          <a:prstGeom prst="rect">
+            <a:avLst/>
+          </a:prstGeom>
+          <a:solidFill>
+            <a:srgbClr val="F5F5F5"/>
+          </a:solidFill>
+          <a:ln>
+            <a:noFill/>
+          </a:ln>
+        </p:spPr>
+        <p:style>
+          <a:lnRef idx="2">
+            <a:schemeClr val="accent1">
+              <a:shade val="50000"/>
+            </a:schemeClr>
+          </a:lnRef>
+          <a:fillRef idx="1">
+            <a:schemeClr val="accent1"/>
+          </a:fillRef>
+          <a:effectRef idx="0">
+            <a:schemeClr val="accent1"/>
+          </a:effectRef>
+          <a:fontRef idx="minor">
+            <a:schemeClr val="lt1"/>
+          </a:fontRef>
+        </p:style>
+        <p:txBody>
+          <a:bodyPr rtlCol="0" anchor="ctr"/>
+          <a:lstStyle/>
+          <a:p>
+            <a:pPr algn="ctr"/>
+            <a:endParaRPr lang="en-US" dirty="0"/>
+          </a:p>
+        </p:txBody>
+      </p:sp>
+      <p:sp>
+        <p:nvSpPr>
+          <p:cNvPr id="11" name="Rectangle 10">
+            <a:extLst>
+              <a:ext uri="{FF2B5EF4-FFF2-40B4-BE49-F238E27FC236}">
+                <a16:creationId xmlns:a16="http://schemas.microsoft.com/office/drawing/2014/main" id="{8B1407B6-8D8F-F747-98F5-D43EB86F87CE}"/>
+              </a:ext>
+            </a:extLst>
+          </p:cNvPr>
+          <p:cNvSpPr/>
+          <p:nvPr/>
+        </p:nvSpPr>
+        <p:spPr>
+          <a:xfrm>
+            <a:off x="6806307" y="8896942"/>
+            <a:ext cx="1266745" cy="1829445"/>
+          </a:xfrm>
+          <a:prstGeom prst="rect">
+            <a:avLst/>
+          </a:prstGeom>
+          <a:solidFill>
+            <a:srgbClr val="F5F5F5"/>
+          </a:solidFill>
+          <a:ln>
+            <a:noFill/>
+          </a:ln>
+        </p:spPr>
+        <p:style>
+          <a:lnRef idx="2">
+            <a:schemeClr val="accent1">
+              <a:shade val="50000"/>
+            </a:schemeClr>
+          </a:lnRef>
+          <a:fillRef idx="1">
+            <a:schemeClr val="accent1"/>
+          </a:fillRef>
+          <a:effectRef idx="0">
+            <a:schemeClr val="accent1"/>
+          </a:effectRef>
+          <a:fontRef idx="minor">
+            <a:schemeClr val="lt1"/>
+          </a:fontRef>
+        </p:style>
+        <p:txBody>
+          <a:bodyPr rtlCol="0" anchor="ctr"/>
+          <a:lstStyle/>
+          <a:p>
+            <a:pPr algn="ctr"/>
+            <a:endParaRPr lang="en-US" dirty="0"/>
+          </a:p>
+        </p:txBody>
+      </p:sp>
+      <p:cxnSp>
+        <p:nvCxnSpPr>
+          <p:cNvPr id="12" name="Straight Connector 11">
+            <a:extLst>
+              <a:ext uri="{FF2B5EF4-FFF2-40B4-BE49-F238E27FC236}">
+                <a16:creationId xmlns:a16="http://schemas.microsoft.com/office/drawing/2014/main" id="{34A23E5E-0B14-7B4F-8E65-0E8DEAF3CF45}"/>
+              </a:ext>
+            </a:extLst>
+          </p:cNvPr>
+          <p:cNvCxnSpPr>
+            <a:cxnSpLocks/>
+          </p:cNvCxnSpPr>
+          <p:nvPr/>
+        </p:nvCxnSpPr>
+        <p:spPr>
+          <a:xfrm flipH="1">
+            <a:off x="6732165" y="9984662"/>
+            <a:ext cx="1800028" cy="0"/>
+          </a:xfrm>
+          <a:prstGeom prst="line">
+            <a:avLst/>
+          </a:prstGeom>
+          <a:ln w="107950">
+            <a:solidFill>
+              <a:srgbClr val="414141"/>
+            </a:solidFill>
+          </a:ln>
+        </p:spPr>
+        <p:style>
+          <a:lnRef idx="1">
+            <a:schemeClr val="accent1"/>
+          </a:lnRef>
+          <a:fillRef idx="0">
+            <a:schemeClr val="accent1"/>
+          </a:fillRef>
+          <a:effectRef idx="0">
+            <a:schemeClr val="accent1"/>
+          </a:effectRef>
+          <a:fontRef idx="minor">
+            <a:schemeClr val="tx1"/>
+          </a:fontRef>
+        </p:style>
+      </p:cxnSp>
+      <p:sp>
+        <p:nvSpPr>
+          <p:cNvPr id="13" name="Rectangle 12">
+            <a:extLst>
+              <a:ext uri="{FF2B5EF4-FFF2-40B4-BE49-F238E27FC236}">
+                <a16:creationId xmlns:a16="http://schemas.microsoft.com/office/drawing/2014/main" id="{06577297-76D3-FA47-8F9B-15AABC1AC8D9}"/>
+              </a:ext>
+            </a:extLst>
+          </p:cNvPr>
+          <p:cNvSpPr/>
+          <p:nvPr/>
+        </p:nvSpPr>
+        <p:spPr>
+          <a:xfrm>
+            <a:off x="9688398" y="7981065"/>
+            <a:ext cx="1266745" cy="1096386"/>
+          </a:xfrm>
+          <a:prstGeom prst="rect">
+            <a:avLst/>
+          </a:prstGeom>
+          <a:solidFill>
+            <a:srgbClr val="F5F5F5"/>
+          </a:solidFill>
+          <a:ln>
+            <a:noFill/>
+          </a:ln>
+        </p:spPr>
+        <p:style>
+          <a:lnRef idx="2">
+            <a:schemeClr val="accent1">
+              <a:shade val="50000"/>
+            </a:schemeClr>
+          </a:lnRef>
+          <a:fillRef idx="1">
+            <a:schemeClr val="accent1"/>
+          </a:fillRef>
+          <a:effectRef idx="0">
+            <a:schemeClr val="accent1"/>
+          </a:effectRef>
+          <a:fontRef idx="minor">
+            <a:schemeClr val="lt1"/>
+          </a:fontRef>
+        </p:style>
+        <p:txBody>
+          <a:bodyPr rtlCol="0" anchor="ctr"/>
+          <a:lstStyle/>
+          <a:p>
+            <a:pPr algn="ctr"/>
+            <a:endParaRPr lang="en-US" dirty="0"/>
+          </a:p>
+        </p:txBody>
+      </p:sp>
+      <p:cxnSp>
+        <p:nvCxnSpPr>
+          <p:cNvPr id="14" name="Straight Connector 13">
+            <a:extLst>
+              <a:ext uri="{FF2B5EF4-FFF2-40B4-BE49-F238E27FC236}">
+                <a16:creationId xmlns:a16="http://schemas.microsoft.com/office/drawing/2014/main" id="{4FD0EBA6-9D64-8747-8299-EF34C821E23F}"/>
+              </a:ext>
+            </a:extLst>
+          </p:cNvPr>
+          <p:cNvCxnSpPr>
+            <a:cxnSpLocks/>
+          </p:cNvCxnSpPr>
+          <p:nvPr/>
+        </p:nvCxnSpPr>
+        <p:spPr>
+          <a:xfrm flipH="1">
+            <a:off x="9446470" y="8512998"/>
+            <a:ext cx="1800028" cy="0"/>
+          </a:xfrm>
+          <a:prstGeom prst="line">
+            <a:avLst/>
+          </a:prstGeom>
+          <a:ln w="107950">
+            <a:solidFill>
+              <a:srgbClr val="414141"/>
+            </a:solidFill>
+          </a:ln>
+        </p:spPr>
+        <p:style>
+          <a:lnRef idx="1">
+            <a:schemeClr val="accent1"/>
+          </a:lnRef>
+          <a:fillRef idx="0">
+            <a:schemeClr val="accent1"/>
+          </a:fillRef>
+          <a:effectRef idx="0">
+            <a:schemeClr val="accent1"/>
+          </a:effectRef>
+          <a:fontRef idx="minor">
+            <a:schemeClr val="tx1"/>
+          </a:fontRef>
+        </p:style>
+      </p:cxnSp>
+      <p:sp>
+        <p:nvSpPr>
+          <p:cNvPr id="15" name="Rectangle 14">
+            <a:extLst>
+              <a:ext uri="{FF2B5EF4-FFF2-40B4-BE49-F238E27FC236}">
+                <a16:creationId xmlns:a16="http://schemas.microsoft.com/office/drawing/2014/main" id="{E2347BE9-0939-EC4C-A0CF-BCFCDB9219B6}"/>
+              </a:ext>
+            </a:extLst>
+          </p:cNvPr>
+          <p:cNvSpPr/>
+          <p:nvPr/>
+        </p:nvSpPr>
+        <p:spPr>
+          <a:xfrm>
+            <a:off x="9713669" y="9500617"/>
+            <a:ext cx="1266745" cy="1096386"/>
+          </a:xfrm>
+          <a:prstGeom prst="rect">
+            <a:avLst/>
+          </a:prstGeom>
+          <a:solidFill>
+            <a:srgbClr val="F5F5F5"/>
+          </a:solidFill>
+          <a:ln>
+            <a:noFill/>
+          </a:ln>
+        </p:spPr>
+        <p:style>
+          <a:lnRef idx="2">
+            <a:schemeClr val="accent1">
+              <a:shade val="50000"/>
+            </a:schemeClr>
+          </a:lnRef>
+          <a:fillRef idx="1">
+            <a:schemeClr val="accent1"/>
+          </a:fillRef>
+          <a:effectRef idx="0">
+            <a:schemeClr val="accent1"/>
+          </a:effectRef>
+          <a:fontRef idx="minor">
+            <a:schemeClr val="lt1"/>
+          </a:fontRef>
+        </p:style>
+        <p:txBody>
+          <a:bodyPr rtlCol="0" anchor="ctr"/>
+          <a:lstStyle/>
+          <a:p>
+            <a:pPr algn="ctr"/>
+            <a:endParaRPr lang="en-US" dirty="0"/>
+          </a:p>
+        </p:txBody>
+      </p:sp>
+      <p:cxnSp>
+        <p:nvCxnSpPr>
+          <p:cNvPr id="16" name="Straight Connector 15">
+            <a:extLst>
+              <a:ext uri="{FF2B5EF4-FFF2-40B4-BE49-F238E27FC236}">
+                <a16:creationId xmlns:a16="http://schemas.microsoft.com/office/drawing/2014/main" id="{8E619E55-491C-5F42-92DF-0EC0D778BCB4}"/>
+              </a:ext>
+            </a:extLst>
+          </p:cNvPr>
+          <p:cNvCxnSpPr>
+            <a:cxnSpLocks/>
+          </p:cNvCxnSpPr>
+          <p:nvPr/>
+        </p:nvCxnSpPr>
+        <p:spPr>
+          <a:xfrm flipH="1">
+            <a:off x="9500014" y="9954434"/>
+            <a:ext cx="1800028" cy="0"/>
+          </a:xfrm>
+          <a:prstGeom prst="line">
+            <a:avLst/>
+          </a:prstGeom>
+          <a:ln w="107950">
+            <a:solidFill>
+              <a:srgbClr val="414141"/>
+            </a:solidFill>
+          </a:ln>
+        </p:spPr>
+        <p:style>
+          <a:lnRef idx="1">
+            <a:schemeClr val="accent1"/>
+          </a:lnRef>
+          <a:fillRef idx="0">
+            <a:schemeClr val="accent1"/>
+          </a:fillRef>
+          <a:effectRef idx="0">
+            <a:schemeClr val="accent1"/>
+          </a:effectRef>
+          <a:fontRef idx="minor">
+            <a:schemeClr val="tx1"/>
+          </a:fontRef>
+        </p:style>
+      </p:cxnSp>
+      <p:sp>
+        <p:nvSpPr>
+          <p:cNvPr id="18" name="Rectangle 17">
+            <a:extLst>
+              <a:ext uri="{FF2B5EF4-FFF2-40B4-BE49-F238E27FC236}">
+                <a16:creationId xmlns:a16="http://schemas.microsoft.com/office/drawing/2014/main" id="{1E40074E-3C11-4F4E-B750-19551E3EE30C}"/>
+              </a:ext>
+            </a:extLst>
+          </p:cNvPr>
+          <p:cNvSpPr/>
+          <p:nvPr/>
+        </p:nvSpPr>
+        <p:spPr>
+          <a:xfrm>
+            <a:off x="11762970" y="10395371"/>
+            <a:ext cx="4646803" cy="1874519"/>
+          </a:xfrm>
+          <a:prstGeom prst="rect">
+            <a:avLst/>
+          </a:prstGeom>
+          <a:solidFill>
+            <a:srgbClr val="F5F5F5"/>
+          </a:solidFill>
+          <a:ln>
+            <a:noFill/>
+          </a:ln>
+        </p:spPr>
+        <p:style>
+          <a:lnRef idx="2">
+            <a:schemeClr val="accent1">
+              <a:shade val="50000"/>
+            </a:schemeClr>
+          </a:lnRef>
+          <a:fillRef idx="1">
+            <a:schemeClr val="accent1"/>
+          </a:fillRef>
+          <a:effectRef idx="0">
+            <a:schemeClr val="accent1"/>
+          </a:effectRef>
+          <a:fontRef idx="minor">
+            <a:schemeClr val="lt1"/>
+          </a:fontRef>
+        </p:style>
+        <p:txBody>
+          <a:bodyPr rtlCol="0" anchor="ctr"/>
+          <a:lstStyle/>
+          <a:p>
+            <a:pPr algn="ctr"/>
+            <a:endParaRPr lang="en-US" dirty="0"/>
+          </a:p>
+        </p:txBody>
+      </p:sp>
+      <p:sp>
+        <p:nvSpPr>
+          <p:cNvPr id="19" name="Rectangle 18">
+            <a:extLst>
+              <a:ext uri="{FF2B5EF4-FFF2-40B4-BE49-F238E27FC236}">
+                <a16:creationId xmlns:a16="http://schemas.microsoft.com/office/drawing/2014/main" id="{39F72549-CD58-DA47-B664-DA16198CEFEE}"/>
+              </a:ext>
+            </a:extLst>
+          </p:cNvPr>
+          <p:cNvSpPr/>
+          <p:nvPr/>
+        </p:nvSpPr>
+        <p:spPr>
+          <a:xfrm>
+            <a:off x="12088018" y="10028576"/>
+            <a:ext cx="1652349" cy="1874519"/>
+          </a:xfrm>
+          <a:prstGeom prst="rect">
+            <a:avLst/>
+          </a:prstGeom>
+          <a:solidFill>
+            <a:srgbClr val="F5F5F5"/>
+          </a:solidFill>
+          <a:ln>
+            <a:noFill/>
+          </a:ln>
+        </p:spPr>
+        <p:style>
+          <a:lnRef idx="2">
+            <a:schemeClr val="accent1">
+              <a:shade val="50000"/>
+            </a:schemeClr>
+          </a:lnRef>
+          <a:fillRef idx="1">
+            <a:schemeClr val="accent1"/>
+          </a:fillRef>
+          <a:effectRef idx="0">
+            <a:schemeClr val="accent1"/>
+          </a:effectRef>
+          <a:fontRef idx="minor">
+            <a:schemeClr val="lt1"/>
+          </a:fontRef>
+        </p:style>
+        <p:txBody>
+          <a:bodyPr rtlCol="0" anchor="ctr"/>
+          <a:lstStyle/>
+          <a:p>
+            <a:pPr algn="ctr"/>
+            <a:endParaRPr lang="en-US" dirty="0"/>
+          </a:p>
+        </p:txBody>
+      </p:sp>
+      <p:sp>
+        <p:nvSpPr>
+          <p:cNvPr id="25" name="Rectangle 24">
+            <a:extLst>
+              <a:ext uri="{FF2B5EF4-FFF2-40B4-BE49-F238E27FC236}">
+                <a16:creationId xmlns:a16="http://schemas.microsoft.com/office/drawing/2014/main" id="{530E4166-F09F-234C-B97D-A7F2252828B9}"/>
+              </a:ext>
+            </a:extLst>
+          </p:cNvPr>
+          <p:cNvSpPr/>
+          <p:nvPr/>
+        </p:nvSpPr>
+        <p:spPr>
+          <a:xfrm>
+            <a:off x="12086799" y="2735613"/>
+            <a:ext cx="3532909" cy="1508695"/>
+          </a:xfrm>
+          <a:prstGeom prst="rect">
+            <a:avLst/>
+          </a:prstGeom>
+          <a:solidFill>
+            <a:srgbClr val="F5F5F5"/>
+          </a:solidFill>
+          <a:ln>
+            <a:noFill/>
+          </a:ln>
+        </p:spPr>
+        <p:style>
+          <a:lnRef idx="2">
+            <a:schemeClr val="accent1">
+              <a:shade val="50000"/>
+            </a:schemeClr>
+          </a:lnRef>
+          <a:fillRef idx="1">
+            <a:schemeClr val="accent1"/>
+          </a:fillRef>
+          <a:effectRef idx="0">
+            <a:schemeClr val="accent1"/>
+          </a:effectRef>
+          <a:fontRef idx="minor">
+            <a:schemeClr val="lt1"/>
+          </a:fontRef>
+        </p:style>
+        <p:txBody>
+          <a:bodyPr rtlCol="0" anchor="ctr"/>
+          <a:lstStyle/>
+          <a:p>
+            <a:pPr algn="ctr"/>
+            <a:endParaRPr lang="en-US" dirty="0"/>
+          </a:p>
+        </p:txBody>
+      </p:sp>
+      <p:sp>
+        <p:nvSpPr>
+          <p:cNvPr id="2" name="Google Shape;101;p3">
+            <a:extLst>
+              <a:ext uri="{FF2B5EF4-FFF2-40B4-BE49-F238E27FC236}">
+                <a16:creationId xmlns:a16="http://schemas.microsoft.com/office/drawing/2014/main" id="{D97C0ACD-A8D7-3CBC-4EB0-999038BE8D54}"/>
+              </a:ext>
+            </a:extLst>
+          </p:cNvPr>
+          <p:cNvSpPr txBox="1">
+            <a:spLocks noGrp="1"/>
+          </p:cNvSpPr>
+          <p:nvPr>
+            <p:ph type="body" idx="1"/>
+          </p:nvPr>
+        </p:nvSpPr>
+        <p:spPr>
+          <a:xfrm>
+            <a:off x="2574357" y="2503958"/>
+            <a:ext cx="19242900" cy="9765931"/>
+          </a:xfrm>
+          <a:prstGeom prst="rect">
+            <a:avLst/>
+          </a:prstGeom>
+          <a:solidFill>
+            <a:schemeClr val="bg1">
+              <a:lumMod val="85000"/>
+              <a:alpha val="70364"/>
+            </a:schemeClr>
+          </a:solidFill>
+          <a:ln>
+            <a:noFill/>
+          </a:ln>
+        </p:spPr>
+        <p:txBody>
+          <a:bodyPr spcFirstLastPara="1" wrap="square" lIns="50800" tIns="50800" rIns="50800" bIns="50800" anchor="ctr" anchorCtr="0">
+            <a:normAutofit/>
+          </a:bodyPr>
+          <a:lstStyle/>
+          <a:p>
+            <a:pPr marL="635000" lvl="0" indent="-635000" algn="l" rtl="0">
+              <a:lnSpc>
+                <a:spcPct val="100000"/>
+              </a:lnSpc>
+              <a:spcBef>
+                <a:spcPts val="0"/>
+              </a:spcBef>
+              <a:spcAft>
+                <a:spcPts val="0"/>
+              </a:spcAft>
+              <a:buClr>
+                <a:srgbClr val="000000"/>
+              </a:buClr>
+              <a:buSzPts val="6000"/>
+              <a:buFont typeface="Helvetica Neue"/>
+              <a:buChar char="•"/>
+            </a:pPr>
+            <a:r>
+              <a:rPr lang="en-US" sz="4800" dirty="0">
+                <a:latin typeface="+mn-lt"/>
+              </a:rPr>
+              <a:t>Allows for multi-user development and testing</a:t>
+            </a:r>
+            <a:endParaRPr dirty="0">
+              <a:latin typeface="+mn-lt"/>
+            </a:endParaRPr>
+          </a:p>
+          <a:p>
+            <a:pPr marL="635000" lvl="0" indent="-635000" algn="l" rtl="0">
+              <a:lnSpc>
+                <a:spcPct val="100000"/>
+              </a:lnSpc>
+              <a:spcBef>
+                <a:spcPts val="5900"/>
+              </a:spcBef>
+              <a:spcAft>
+                <a:spcPts val="0"/>
+              </a:spcAft>
+              <a:buClr>
+                <a:srgbClr val="000000"/>
+              </a:buClr>
+              <a:buSzPts val="6000"/>
+              <a:buFont typeface="Helvetica Neue"/>
+              <a:buChar char="•"/>
+            </a:pPr>
+            <a:r>
+              <a:rPr lang="en-US" sz="4800" dirty="0">
+                <a:latin typeface="+mn-lt"/>
+              </a:rPr>
+              <a:t>“Protects” the main code</a:t>
+            </a:r>
+            <a:endParaRPr dirty="0">
+              <a:latin typeface="+mn-lt"/>
+            </a:endParaRPr>
+          </a:p>
+          <a:p>
+            <a:pPr marL="635000" lvl="0" indent="-635000" algn="l" rtl="0">
+              <a:lnSpc>
+                <a:spcPct val="100000"/>
+              </a:lnSpc>
+              <a:spcBef>
+                <a:spcPts val="5900"/>
+              </a:spcBef>
+              <a:spcAft>
+                <a:spcPts val="0"/>
+              </a:spcAft>
+              <a:buClr>
+                <a:srgbClr val="000000"/>
+              </a:buClr>
+              <a:buSzPts val="6000"/>
+              <a:buFont typeface="Helvetica Neue"/>
+              <a:buChar char="•"/>
+            </a:pPr>
+            <a:r>
+              <a:rPr lang="en-US" sz="4800" dirty="0">
+                <a:latin typeface="+mn-lt"/>
+              </a:rPr>
+              <a:t>Easy to go back to a stable point if something breaks</a:t>
+            </a:r>
+            <a:endParaRPr dirty="0">
+              <a:latin typeface="+mn-lt"/>
+            </a:endParaRPr>
+          </a:p>
+          <a:p>
+            <a:pPr marL="635000" lvl="0" indent="-635000" algn="l" rtl="0">
+              <a:lnSpc>
+                <a:spcPct val="100000"/>
+              </a:lnSpc>
+              <a:spcBef>
+                <a:spcPts val="5900"/>
+              </a:spcBef>
+              <a:spcAft>
+                <a:spcPts val="0"/>
+              </a:spcAft>
+              <a:buClr>
+                <a:srgbClr val="000000"/>
+              </a:buClr>
+              <a:buSzPts val="6000"/>
+              <a:buFont typeface="Helvetica Neue"/>
+              <a:buChar char="•"/>
+            </a:pPr>
+            <a:r>
+              <a:rPr lang="en-US" sz="4800" dirty="0">
+                <a:latin typeface="+mn-lt"/>
+              </a:rPr>
+              <a:t>Work is performed in parallel on one or more feature branches.</a:t>
+            </a:r>
+            <a:endParaRPr dirty="0">
+              <a:latin typeface="+mn-lt"/>
+            </a:endParaRPr>
+          </a:p>
+        </p:txBody>
+      </p:sp>
+    </p:spTree>
+    <p:extLst>
+      <p:ext uri="{BB962C8B-B14F-4D97-AF65-F5344CB8AC3E}">
+        <p14:creationId xmlns:p14="http://schemas.microsoft.com/office/powerpoint/2010/main" val="3273482059"/>
+      </p:ext>
+    </p:extLst>
+  </p:cSld>
+  <p:clrMapOvr>
+    <a:masterClrMapping/>
+  </p:clrMapOvr>
+</p:sld>
+</file>
+
+<file path=ppt/slides/slide11.xml><?xml version="1.0" encoding="utf-8"?>
 <p:sld xmlns:a="http://schemas.openxmlformats.org/drawingml/2006/main" xmlns:r="http://schemas.openxmlformats.org/officeDocument/2006/relationships" xmlns:p="http://schemas.openxmlformats.org/presentationml/2006/main">
   <p:cSld>
     <p:spTree>
@@ -11153,14 +12013,20 @@
               <a:buNone/>
             </a:pPr>
             <a:r>
-              <a:rPr lang="en-US" sz="8000" dirty="0"/>
+              <a:rPr lang="en-US" sz="8000" dirty="0">
+                <a:latin typeface="+mn-lt"/>
+              </a:rPr>
               <a:t>Demo: </a:t>
             </a:r>
             <a:r>
-              <a:rPr lang="en-US" sz="8000" dirty="0" err="1"/>
+              <a:rPr lang="en-US" sz="8000" dirty="0" err="1">
+                <a:latin typeface="+mn-lt"/>
+              </a:rPr>
               <a:t>Gitflow</a:t>
             </a:r>
-            <a:endParaRPr sz="8000" dirty="0"/>
+            <a:endParaRPr sz="8000" dirty="0">
+              <a:latin typeface="+mn-lt"/>
+            </a:endParaRPr>
           </a:p>
         </p:txBody>
       </p:sp>
@@ -11210,45 +12076,63 @@
               <a:buNone/>
             </a:pPr>
             <a:r>
-              <a:rPr lang="en-US" sz="5800" dirty="0"/>
+              <a:rPr lang="en-US" sz="5800" dirty="0">
+                <a:latin typeface="+mn-lt"/>
+              </a:rPr>
               <a:t>In this demo, you will learn how to:</a:t>
             </a:r>
-            <a:endParaRPr lang="en-US" sz="4800" dirty="0"/>
+            <a:endParaRPr lang="en-US" sz="4800" dirty="0">
+              <a:latin typeface="+mn-lt"/>
+            </a:endParaRPr>
           </a:p>
           <a:p>
             <a:pPr marL="1092200" lvl="1" indent="-635000"/>
             <a:r>
-              <a:rPr lang="en-US" dirty="0"/>
-              <a:t>Raise an issue in a repository.</a:t>
+              <a:rPr lang="en-US" dirty="0">
+                <a:latin typeface="+mn-lt"/>
+              </a:rPr>
+              <a:t>Raise an issue in a repository</a:t>
             </a:r>
           </a:p>
           <a:p>
             <a:pPr marL="1092200" lvl="1" indent="-635000"/>
             <a:r>
-              <a:rPr lang="en-US" dirty="0"/>
+              <a:rPr lang="en-US" dirty="0">
+                <a:latin typeface="+mn-lt"/>
+              </a:rPr>
               <a:t>Create and manipulate multiple branches within a git repo (main, develop, feature)</a:t>
             </a:r>
-            <a:endParaRPr dirty="0"/>
+            <a:endParaRPr dirty="0">
+              <a:latin typeface="+mn-lt"/>
+            </a:endParaRPr>
           </a:p>
           <a:p>
             <a:pPr marL="1092200" lvl="1" indent="-635000"/>
             <a:r>
-              <a:rPr lang="en-US" dirty="0"/>
+              <a:rPr lang="en-US" dirty="0">
+                <a:latin typeface="+mn-lt"/>
+              </a:rPr>
               <a:t>How to use these branches in a “standard” git workflow</a:t>
             </a:r>
           </a:p>
           <a:p>
             <a:pPr marL="1092200" lvl="1" indent="-635000"/>
             <a:r>
-              <a:rPr lang="en-US" dirty="0"/>
+              <a:rPr lang="en-US" dirty="0">
+                <a:latin typeface="+mn-lt"/>
+              </a:rPr>
               <a:t>Submit a pull request on </a:t>
             </a:r>
             <a:r>
-              <a:rPr lang="en-US" dirty="0" err="1"/>
+              <a:rPr lang="en-US" dirty="0" err="1">
+                <a:latin typeface="+mn-lt"/>
+              </a:rPr>
               <a:t>Github</a:t>
             </a:r>
             <a:r>
-              <a:rPr lang="en-US" dirty="0"/>
+              <a:rPr lang="en-US" dirty="0">
+                <a:latin typeface="+mn-lt"/>
+              </a:rPr>
               <a:t> to merge two branches</a:t>
             </a:r>
           </a:p>
@@ -11267,7 +12151,7 @@
 </p:sld>
 </file>
 
-<file path=ppt/slides/slide11.xml><?xml version="1.0" encoding="utf-8"?>
+<file path=ppt/slides/slide12.xml><?xml version="1.0" encoding="utf-8"?>
 <p:sld xmlns:a="http://schemas.openxmlformats.org/drawingml/2006/main" xmlns:r="http://schemas.openxmlformats.org/officeDocument/2006/relationships" xmlns:p="http://schemas.openxmlformats.org/presentationml/2006/main">
   <p:cSld>
     <p:spTree>
@@ -11331,10 +12215,14 @@
               <a:buNone/>
             </a:pPr>
             <a:r>
-              <a:rPr lang="en-US" sz="8000" dirty="0"/>
+              <a:rPr lang="en-US" sz="8000" dirty="0">
+                <a:latin typeface="+mn-lt"/>
+              </a:rPr>
               <a:t>Summary of process to add a feature</a:t>
             </a:r>
-            <a:endParaRPr sz="8000" dirty="0"/>
+            <a:endParaRPr sz="8000" dirty="0">
+              <a:latin typeface="+mn-lt"/>
+            </a:endParaRPr>
           </a:p>
         </p:txBody>
       </p:sp>
@@ -11381,10 +12269,11 @@
               <a:buAutoNum type="arabicPeriod"/>
             </a:pPr>
             <a:r>
-              <a:rPr lang="en-US" sz="4560" dirty="0"/>
+              <a:rPr lang="en-US" sz="4560" dirty="0">
+                <a:latin typeface="+mn-lt"/>
+              </a:rPr>
               <a:t>Pull latest code from develop/main branch.</a:t>
             </a:r>
-            <a:endParaRPr dirty="0"/>
           </a:p>
           <a:p>
             <a:pPr marL="457200" lvl="0" indent="-518160" algn="l" rtl="0">
@@ -11401,10 +12290,14 @@
               <a:buAutoNum type="arabicPeriod"/>
             </a:pPr>
             <a:r>
-              <a:rPr lang="en-US" sz="4560" dirty="0"/>
+              <a:rPr lang="en-US" sz="4560" dirty="0">
+                <a:latin typeface="+mn-lt"/>
+              </a:rPr>
               <a:t>Create feature branch from develop/main branch.</a:t>
             </a:r>
-            <a:endParaRPr sz="4560" dirty="0"/>
+            <a:endParaRPr sz="4560" dirty="0">
+              <a:latin typeface="+mn-lt"/>
+            </a:endParaRPr>
           </a:p>
           <a:p>
             <a:pPr marL="457200" lvl="0" indent="-518160" algn="l" rtl="0">
@@ -11421,7 +12314,9 @@
               <a:buAutoNum type="arabicPeriod"/>
             </a:pPr>
             <a:r>
-              <a:rPr lang="en-US" sz="4560" dirty="0"/>
+              <a:rPr lang="en-US" sz="4560" dirty="0">
+                <a:latin typeface="+mn-lt"/>
+              </a:rPr>
               <a:t>Make your changes, stage, commit, then push to feature branch</a:t>
             </a:r>
           </a:p>
@@ -11440,10 +12335,14 @@
               <a:buAutoNum type="arabicPeriod"/>
             </a:pPr>
             <a:r>
-              <a:rPr lang="en-US" sz="4560" dirty="0"/>
+              <a:rPr lang="en-US" sz="4560" dirty="0">
+                <a:latin typeface="+mn-lt"/>
+              </a:rPr>
               <a:t>Submit pull request on GitHub &amp; merge feature into develop/main.</a:t>
             </a:r>
-            <a:endParaRPr sz="4560" dirty="0"/>
+            <a:endParaRPr sz="4560" dirty="0">
+              <a:latin typeface="+mn-lt"/>
+            </a:endParaRPr>
           </a:p>
           <a:p>
             <a:pPr marL="457200" lvl="0" indent="-518160" algn="l" rtl="0">
@@ -11460,10 +12359,14 @@
               <a:buAutoNum type="arabicPeriod"/>
             </a:pPr>
             <a:r>
-              <a:rPr lang="en-US" sz="4560" dirty="0"/>
-              <a:t>(Repeat until enough features have been merged into develop, then make a pull request from develop -&gt; main.)</a:t>
+              <a:rPr lang="en-US" sz="4560" dirty="0">
+                <a:latin typeface="+mn-lt"/>
+              </a:rPr>
+              <a:t>&lt;&lt; Repeat until enough features have been merged into develop, then make a pull request from develop -&gt; main. &gt;&gt;</a:t>
             </a:r>
-            <a:endParaRPr sz="4560" dirty="0"/>
+            <a:endParaRPr sz="4560" dirty="0">
+              <a:latin typeface="+mn-lt"/>
+            </a:endParaRPr>
           </a:p>
         </p:txBody>
       </p:sp>
@@ -11475,7 +12378,7 @@
 </p:sld>
 </file>
 
-<file path=ppt/slides/slide12.xml><?xml version="1.0" encoding="utf-8"?>
+<file path=ppt/slides/slide13.xml><?xml version="1.0" encoding="utf-8"?>
 <p:sld xmlns:a="http://schemas.openxmlformats.org/drawingml/2006/main" xmlns:r="http://schemas.openxmlformats.org/officeDocument/2006/relationships" xmlns:p="http://schemas.openxmlformats.org/presentationml/2006/main">
   <p:cSld>
     <p:spTree>
@@ -11532,9 +12435,17 @@
             </a:pPr>
             <a:r>
               <a:rPr lang="en-US" sz="8000" dirty="0"/>
-              <a:t>Git Commands</a:t>
+              <a:t>Some Relevant Git </a:t>
             </a:r>
-            <a:endParaRPr dirty="0"/>
+            <a:r>
+              <a:rPr lang="en-US" sz="8000" dirty="0">
+                <a:latin typeface="+mn-lt"/>
+              </a:rPr>
+              <a:t>Commands</a:t>
+            </a:r>
+            <a:endParaRPr dirty="0">
+              <a:latin typeface="+mn-lt"/>
+            </a:endParaRPr>
           </a:p>
         </p:txBody>
       </p:sp>
@@ -11551,7 +12462,7 @@
         <p:spPr>
           <a:xfrm>
             <a:off x="1676399" y="3651250"/>
-            <a:ext cx="18876819" cy="8702676"/>
+            <a:ext cx="22326601" cy="8702676"/>
           </a:xfrm>
           <a:prstGeom prst="rect">
             <a:avLst/>
@@ -11563,7 +12474,7 @@
         </p:spPr>
         <p:txBody>
           <a:bodyPr spcFirstLastPara="1" wrap="square" lIns="182850" tIns="91400" rIns="182850" bIns="91400" anchor="t" anchorCtr="0">
-            <a:normAutofit/>
+            <a:normAutofit fontScale="92500" lnSpcReduction="10000"/>
           </a:bodyPr>
           <a:lstStyle/>
           <a:p>
@@ -11625,10 +12536,10 @@
               </a:rPr>
               <a:t>&gt; </a:t>
             </a:r>
-            <a:endParaRPr dirty="0"/>
-          </a:p>
-          <a:p>
-            <a:pPr indent="-457200">
+            <a:endParaRPr lang="en-US" sz="4500" dirty="0"/>
+          </a:p>
+          <a:p>
+            <a:pPr marL="0" indent="0">
               <a:lnSpc>
                 <a:spcPct val="90000"/>
               </a:lnSpc>
@@ -11639,19 +12550,41 @@
                 <a:schemeClr val="dk1"/>
               </a:buClr>
               <a:buSzPct val="100000"/>
+              <a:buNone/>
             </a:pPr>
             <a:r>
-              <a:rPr lang="en-US" sz="4500" dirty="0"/>
+              <a:rPr lang="en-US" sz="4500" dirty="0">
+                <a:latin typeface="+mn-lt"/>
+              </a:rPr>
               <a:t>Make a new branch off of &lt;</a:t>
             </a:r>
             <a:r>
-              <a:rPr lang="en-US" sz="4500" dirty="0" err="1"/>
+              <a:rPr lang="en-US" sz="4500" dirty="0" err="1">
+                <a:latin typeface="+mn-lt"/>
+              </a:rPr>
               <a:t>orig_branch</a:t>
             </a:r>
             <a:r>
-              <a:rPr lang="en-US" sz="4500" dirty="0"/>
+              <a:rPr lang="en-US" sz="4500" dirty="0">
+                <a:latin typeface="+mn-lt"/>
+              </a:rPr>
               <a:t>&gt; (default: main)</a:t>
             </a:r>
+          </a:p>
+          <a:p>
+            <a:pPr marL="0" indent="0">
+              <a:lnSpc>
+                <a:spcPct val="90000"/>
+              </a:lnSpc>
+              <a:spcBef>
+                <a:spcPts val="2000"/>
+              </a:spcBef>
+              <a:buClr>
+                <a:schemeClr val="dk1"/>
+              </a:buClr>
+              <a:buSzPct val="100000"/>
+              <a:buNone/>
+            </a:pPr>
             <a:endParaRPr sz="4500" dirty="0"/>
           </a:p>
           <a:p>
@@ -11679,7 +12612,7 @@
             </a:r>
           </a:p>
           <a:p>
-            <a:pPr indent="-457200">
+            <a:pPr marL="0" indent="0">
               <a:lnSpc>
                 <a:spcPct val="90000"/>
               </a:lnSpc>
@@ -11690,11 +12623,30 @@
                 <a:schemeClr val="dk1"/>
               </a:buClr>
               <a:buSzPct val="100000"/>
+              <a:buNone/>
             </a:pPr>
             <a:r>
-              <a:rPr lang="en-US" sz="4500" dirty="0"/>
+              <a:rPr lang="en-US" sz="4500" dirty="0">
+                <a:latin typeface="+mn-lt"/>
+              </a:rPr>
               <a:t>Switch to desired branch</a:t>
             </a:r>
+          </a:p>
+          <a:p>
+            <a:pPr marL="0" indent="0">
+              <a:lnSpc>
+                <a:spcPct val="90000"/>
+              </a:lnSpc>
+              <a:spcBef>
+                <a:spcPts val="2000"/>
+              </a:spcBef>
+              <a:buClr>
+                <a:schemeClr val="dk1"/>
+              </a:buClr>
+              <a:buSzPct val="100000"/>
+              <a:buNone/>
+            </a:pPr>
+            <a:endParaRPr lang="en-US" sz="4500" dirty="0"/>
           </a:p>
           <a:p>
             <a:pPr marL="0" indent="0">
@@ -11721,7 +12673,7 @@
             </a:r>
           </a:p>
           <a:p>
-            <a:pPr indent="-457200">
+            <a:pPr marL="0" indent="0">
               <a:lnSpc>
                 <a:spcPct val="90000"/>
               </a:lnSpc>
@@ -11732,14 +12684,17 @@
                 <a:schemeClr val="dk1"/>
               </a:buClr>
               <a:buSzPct val="100000"/>
+              <a:buNone/>
             </a:pPr>
             <a:r>
-              <a:rPr lang="en-US" sz="4500" dirty="0"/>
-              <a:t>List all the branches available on your local repo, highlighting the one you are currently on</a:t>
+              <a:rPr lang="en-US" sz="4500" dirty="0">
+                <a:latin typeface="+mn-lt"/>
+              </a:rPr>
+              <a:t>List all available branches, highlighting the one you are currently on</a:t>
             </a:r>
           </a:p>
           <a:p>
-            <a:pPr marL="685800" indent="-685800">
+            <a:pPr marL="0" indent="0">
               <a:lnSpc>
                 <a:spcPct val="90000"/>
               </a:lnSpc>
@@ -11750,8 +12705,23 @@
                 <a:schemeClr val="dk1"/>
               </a:buClr>
               <a:buSzPct val="100000"/>
-              <a:buFont typeface="Wingdings" pitchFamily="2" charset="2"/>
-              <a:buChar char="Ø"/>
+              <a:buNone/>
+            </a:pPr>
+            <a:endParaRPr lang="en-US" sz="4500" dirty="0"/>
+          </a:p>
+          <a:p>
+            <a:pPr marL="0" indent="0">
+              <a:lnSpc>
+                <a:spcPct val="90000"/>
+              </a:lnSpc>
+              <a:spcBef>
+                <a:spcPts val="2000"/>
+              </a:spcBef>
+              <a:buClr>
+                <a:schemeClr val="dk1"/>
+              </a:buClr>
+              <a:buSzPct val="100000"/>
+              <a:buNone/>
             </a:pPr>
             <a:r>
               <a:rPr lang="en-US" dirty="0">
@@ -11760,7 +12730,7 @@
                 <a:cs typeface="Courier New"/>
                 <a:sym typeface="Courier New"/>
               </a:rPr>
-              <a:t>git branch –d &lt;</a:t>
+              <a:t>&gt; git branch –d &lt;</a:t>
             </a:r>
             <a:r>
               <a:rPr lang="en-US" dirty="0" err="1">
@@ -11782,7 +12752,7 @@
             </a:r>
           </a:p>
           <a:p>
-            <a:pPr marL="685800" indent="-685800">
+            <a:pPr marL="0" indent="0">
               <a:lnSpc>
                 <a:spcPct val="90000"/>
               </a:lnSpc>
@@ -11793,9 +12763,12 @@
                 <a:schemeClr val="dk1"/>
               </a:buClr>
               <a:buSzPct val="100000"/>
+              <a:buNone/>
             </a:pPr>
             <a:r>
-              <a:rPr lang="en-US" sz="4500" dirty="0"/>
+              <a:rPr lang="en-US" sz="4500" dirty="0">
+                <a:latin typeface="+mn-lt"/>
+              </a:rPr>
               <a:t>Delete a branch from your local repo</a:t>
             </a:r>
           </a:p>
@@ -11866,8 +12839,8 @@
         </p:nvSpPr>
         <p:spPr>
           <a:xfrm>
-            <a:off x="3552403" y="12623800"/>
-            <a:ext cx="18012870" cy="738583"/>
+            <a:off x="3552403" y="12766675"/>
+            <a:ext cx="18012870" cy="677028"/>
           </a:xfrm>
           <a:prstGeom prst="rect">
             <a:avLst/>
@@ -11883,19 +12856,22 @@
           </a:bodyPr>
           <a:lstStyle/>
           <a:p>
+            <a:pPr algn="ctr"/>
             <a:r>
-              <a:rPr lang="en-US" sz="3600">
+              <a:rPr lang="en-US" sz="3200" dirty="0">
                 <a:solidFill>
                   <a:schemeClr val="dk1"/>
                 </a:solidFill>
-                <a:latin typeface="Calibri"/>
+                <a:latin typeface="+mn-lt"/>
                 <a:ea typeface="Calibri"/>
                 <a:cs typeface="Calibri"/>
                 <a:sym typeface="Calibri"/>
               </a:rPr>
-              <a:t>There are a lot of “Git Cheatsheets” online if you want a summary of more commands!</a:t>
+              <a:t>There are a lot of “Git cheat sheets” online if you want a summary of more commands!</a:t>
             </a:r>
-            <a:endParaRPr sz="2800"/>
+            <a:endParaRPr sz="2400" dirty="0">
+              <a:latin typeface="+mn-lt"/>
+            </a:endParaRPr>
           </a:p>
         </p:txBody>
       </p:sp>
@@ -11912,7 +12888,7 @@
 </p:sld>
 </file>
 
-<file path=ppt/slides/slide13.xml><?xml version="1.0" encoding="utf-8"?>
+<file path=ppt/slides/slide14.xml><?xml version="1.0" encoding="utf-8"?>
 <p:sld xmlns:a="http://schemas.openxmlformats.org/drawingml/2006/main" xmlns:r="http://schemas.openxmlformats.org/officeDocument/2006/relationships" xmlns:p="http://schemas.openxmlformats.org/presentationml/2006/main">
   <p:cSld>
     <p:spTree>
@@ -11964,10 +12940,14 @@
               <a:buNone/>
             </a:pPr>
             <a:r>
-              <a:rPr lang="en-US"/>
+              <a:rPr lang="en-US" dirty="0">
+                <a:latin typeface="+mn-lt"/>
+              </a:rPr>
               <a:t>Class-sourced Vocabulary List</a:t>
             </a:r>
-            <a:endParaRPr/>
+            <a:endParaRPr dirty="0">
+              <a:latin typeface="+mn-lt"/>
+            </a:endParaRPr>
           </a:p>
         </p:txBody>
       </p:sp>
@@ -11992,7 +12972,7 @@
         </p:spPr>
         <p:txBody>
           <a:bodyPr spcFirstLastPara="1" wrap="square" lIns="50800" tIns="50800" rIns="50800" bIns="50800" anchor="ctr" anchorCtr="0">
-            <a:normAutofit fontScale="92500"/>
+            <a:normAutofit fontScale="92500" lnSpcReduction="20000"/>
           </a:bodyPr>
           <a:lstStyle/>
           <a:p>
@@ -12007,15 +12987,16 @@
               <a:buChar char="•"/>
             </a:pPr>
             <a:r>
-              <a:rPr lang="en-US" dirty="0"/>
-              <a:t>Git: version control system (mercurial)</a:t>
+              <a:rPr lang="en-US" dirty="0">
+                <a:latin typeface="+mn-lt"/>
+              </a:rPr>
+              <a:t>Git: </a:t>
             </a:r>
-            <a:endParaRPr dirty="0"/>
           </a:p>
           <a:p>
             <a:pPr marL="457200" lvl="0" indent="-609600" algn="l" rtl="0">
               <a:spcBef>
-                <a:spcPts val="0"/>
+                <a:spcPts val="5900"/>
               </a:spcBef>
               <a:spcAft>
                 <a:spcPts val="0"/>
@@ -12024,22 +13005,20 @@
               <a:buChar char="•"/>
             </a:pPr>
             <a:r>
-              <a:rPr lang="en-US" dirty="0"/>
-              <a:t>GitHub: one choice for remote host for source-control projects (also see Gitlab/bitbucket</a:t>
+              <a:rPr lang="en-US" dirty="0">
+                <a:latin typeface="+mn-lt"/>
+              </a:rPr>
+              <a:t>GitHub: </a:t>
             </a:r>
-            <a:endParaRPr dirty="0"/>
           </a:p>
           <a:p>
             <a:pPr marL="457200" lvl="0" indent="-609600" algn="l" rtl="0">
               <a:spcBef>
-                <a:spcPts val="0"/>
-              </a:spcBef>
-              <a:spcAft>
-                <a:spcPts val="0"/>
-              </a:spcAft>
-              <a:buClr>
-                <a:schemeClr val="dk1"/>
-              </a:buClr>
+                <a:spcPts val="5900"/>
+              </a:spcBef>
+              <a:spcAft>
+                <a:spcPts val="0"/>
+              </a:spcAft>
               <a:buSzPts val="6000"/>
               <a:buChar char="•"/>
             </a:pPr>
@@ -12048,15 +13027,15 @@
                 <a:solidFill>
                   <a:schemeClr val="dk1"/>
                 </a:solidFill>
+                <a:latin typeface="+mn-lt"/>
               </a:rPr>
-              <a:t>source control: act of keeping track of history of code</a:t>
+              <a:t>source control: </a:t>
             </a:r>
-            <a:endParaRPr dirty="0"/>
           </a:p>
           <a:p>
             <a:pPr marL="457200" lvl="0" indent="-609600" algn="l" rtl="0">
               <a:spcBef>
-                <a:spcPts val="0"/>
+                <a:spcPts val="5900"/>
               </a:spcBef>
               <a:spcAft>
                 <a:spcPts val="0"/>
@@ -12065,39 +13044,20 @@
               <a:buChar char="•"/>
             </a:pPr>
             <a:r>
-              <a:rPr lang="en-US" dirty="0"/>
-              <a:t>repo (short for “repository”): version-controlled project, keeps track of changes</a:t>
+              <a:rPr lang="en-US" dirty="0">
+                <a:latin typeface="+mn-lt"/>
+              </a:rPr>
+              <a:t>repo (short for “repository”): </a:t>
             </a:r>
-            <a:endParaRPr dirty="0"/>
           </a:p>
           <a:p>
             <a:pPr marL="457200" lvl="0" indent="-609600" algn="l" rtl="0">
               <a:spcBef>
-                <a:spcPts val="0"/>
-              </a:spcBef>
-              <a:spcAft>
-                <a:spcPts val="0"/>
-              </a:spcAft>
-              <a:buSzPts val="6000"/>
-              <a:buChar char="•"/>
-            </a:pPr>
-            <a:r>
-              <a:rPr lang="en-US" dirty="0"/>
-              <a:t>pull request: way to notify developers of particular changes, and stages the changes in one branch to be pulled into another</a:t>
-            </a:r>
-            <a:endParaRPr dirty="0"/>
-          </a:p>
-          <a:p>
-            <a:pPr marL="457200" lvl="0" indent="-609600" algn="l" rtl="0">
-              <a:spcBef>
-                <a:spcPts val="0"/>
-              </a:spcBef>
-              <a:spcAft>
-                <a:spcPts val="0"/>
-              </a:spcAft>
-              <a:buClr>
-                <a:schemeClr val="dk1"/>
-              </a:buClr>
+                <a:spcPts val="5900"/>
+              </a:spcBef>
+              <a:spcAft>
+                <a:spcPts val="0"/>
+              </a:spcAft>
               <a:buSzPts val="6000"/>
               <a:buChar char="•"/>
             </a:pPr>
@@ -12106,15 +13066,15 @@
                 <a:solidFill>
                   <a:schemeClr val="dk1"/>
                 </a:solidFill>
+                <a:latin typeface="+mn-lt"/>
               </a:rPr>
-              <a:t>commit: a change that adds a new “note” to current branch, like an object that holds information about who made commit, changes involved</a:t>
+              <a:t>commit: </a:t>
             </a:r>
-            <a:endParaRPr dirty="0"/>
           </a:p>
           <a:p>
             <a:pPr marL="457200" lvl="0" indent="-609600" algn="l" rtl="0">
               <a:spcBef>
-                <a:spcPts val="0"/>
+                <a:spcPts val="5900"/>
               </a:spcBef>
               <a:spcAft>
                 <a:spcPts val="0"/>
@@ -12123,15 +13083,16 @@
               <a:buChar char="•"/>
             </a:pPr>
             <a:r>
-              <a:rPr lang="en-US" dirty="0"/>
-              <a:t>branch: way to add new feature to code, might have  changes added relative to main/other branches</a:t>
+              <a:rPr lang="en-US" dirty="0">
+                <a:latin typeface="+mn-lt"/>
+              </a:rPr>
+              <a:t>branch: </a:t>
             </a:r>
-            <a:endParaRPr dirty="0"/>
           </a:p>
           <a:p>
             <a:pPr marL="457200" lvl="0" indent="-609600" algn="l" rtl="0">
               <a:spcBef>
-                <a:spcPts val="0"/>
+                <a:spcPts val="5900"/>
               </a:spcBef>
               <a:spcAft>
                 <a:spcPts val="0"/>
@@ -12140,10 +13101,11 @@
               <a:buChar char="•"/>
             </a:pPr>
             <a:r>
-              <a:rPr lang="en-US" dirty="0"/>
-              <a:t>clone: local repo copy linked to remote </a:t>
+              <a:rPr lang="en-US" dirty="0">
+                <a:latin typeface="+mn-lt"/>
+              </a:rPr>
+              <a:t>clone:</a:t>
             </a:r>
-            <a:endParaRPr dirty="0"/>
           </a:p>
         </p:txBody>
       </p:sp>
@@ -12155,8 +13117,8 @@
         </p:nvSpPr>
         <p:spPr>
           <a:xfrm>
-            <a:off x="12934475" y="11234600"/>
-            <a:ext cx="11254200" cy="2401200"/>
+            <a:off x="19701035" y="12896087"/>
+            <a:ext cx="4667725" cy="738633"/>
           </a:xfrm>
           <a:prstGeom prst="rect">
             <a:avLst/>
@@ -12178,7 +13140,7 @@
           </a:bodyPr>
           <a:lstStyle/>
           <a:p>
-            <a:pPr marL="0" lvl="0" indent="0" algn="l" rtl="0">
+            <a:pPr marL="0" lvl="0" indent="0" algn="ctr" rtl="0">
               <a:spcBef>
                 <a:spcPts val="0"/>
               </a:spcBef>
@@ -12188,24 +13150,16 @@
               <a:buNone/>
             </a:pPr>
             <a:r>
-              <a:rPr lang="en-US" sz="3600" u="sng">
+              <a:rPr lang="en-US" sz="3600" u="sng" dirty="0">
                 <a:latin typeface="Helvetica Neue"/>
                 <a:ea typeface="Helvetica Neue"/>
                 <a:cs typeface="Helvetica Neue"/>
                 <a:sym typeface="Helvetica Neue"/>
+                <a:hlinkClick r:id="rId3"/>
               </a:rPr>
               <a:t>Code/Astro vocab list</a:t>
             </a:r>
-            <a:r>
-              <a:rPr lang="en-US" sz="3600">
-                <a:latin typeface="Helvetica Neue"/>
-                <a:ea typeface="Helvetica Neue"/>
-                <a:cs typeface="Helvetica Neue"/>
-                <a:sym typeface="Helvetica Neue"/>
-              </a:rPr>
-              <a:t>: https://docs.google.com/document/d/1HuzcZbUOdDht9Q2Y5RB7d7THucwVZrZAPkskCw9u9XE/edit?usp=sharing</a:t>
-            </a:r>
-            <a:endParaRPr sz="3600">
+            <a:endParaRPr sz="3600" dirty="0">
               <a:latin typeface="Helvetica Neue"/>
               <a:ea typeface="Helvetica Neue"/>
               <a:cs typeface="Helvetica Neue"/>
@@ -12222,7 +13176,7 @@
 </p:sld>
 </file>
 
-<file path=ppt/slides/slide14.xml><?xml version="1.0" encoding="utf-8"?>
+<file path=ppt/slides/slide15.xml><?xml version="1.0" encoding="utf-8"?>
 <p:sld xmlns:a="http://schemas.openxmlformats.org/drawingml/2006/main" xmlns:r="http://schemas.openxmlformats.org/officeDocument/2006/relationships" xmlns:p="http://schemas.openxmlformats.org/presentationml/2006/main">
   <p:cSld>
     <p:spTree>
@@ -12278,10 +13232,14 @@
               <a:buSzPts val="4000"/>
             </a:pPr>
             <a:r>
-              <a:rPr lang="en-US" sz="8000" dirty="0"/>
-              <a:t>Short “Homework” activity</a:t>
+              <a:rPr lang="en-US" sz="8000" dirty="0">
+                <a:latin typeface="+mn-lt"/>
+              </a:rPr>
+              <a:t>Activities [15 mins]</a:t>
             </a:r>
-            <a:endParaRPr dirty="0"/>
+            <a:endParaRPr dirty="0">
+              <a:latin typeface="+mn-lt"/>
+            </a:endParaRPr>
           </a:p>
         </p:txBody>
       </p:sp>
@@ -12297,8 +13255,8 @@
         </p:nvSpPr>
         <p:spPr>
           <a:xfrm>
-            <a:off x="1676399" y="3651250"/>
-            <a:ext cx="18876819" cy="8702676"/>
+            <a:off x="533399" y="2055813"/>
+            <a:ext cx="23850601" cy="11660187"/>
           </a:xfrm>
           <a:prstGeom prst="rect">
             <a:avLst/>
@@ -12310,7 +13268,7 @@
         </p:spPr>
         <p:txBody>
           <a:bodyPr spcFirstLastPara="1" wrap="square" lIns="182850" tIns="91400" rIns="182850" bIns="91400" anchor="t" anchorCtr="0">
-            <a:normAutofit/>
+            <a:normAutofit fontScale="92500" lnSpcReduction="10000"/>
           </a:bodyPr>
           <a:lstStyle/>
           <a:p>
@@ -12335,7 +13293,7 @@
             </a:endParaRPr>
           </a:p>
           <a:p>
-            <a:pPr indent="-457200">
+            <a:pPr marL="0" indent="0">
               <a:lnSpc>
                 <a:spcPct val="90000"/>
               </a:lnSpc>
@@ -12346,51 +13304,50 @@
                 <a:schemeClr val="dk1"/>
               </a:buClr>
               <a:buSzPct val="100000"/>
+              <a:buNone/>
+            </a:pPr>
+            <a:r>
+              <a:rPr lang="en-US" dirty="0">
+                <a:latin typeface="+mn-lt"/>
+              </a:rPr>
+              <a:t>1. Make sure you can “git pull” the most recent version of the </a:t>
+            </a:r>
+            <a:r>
+              <a:rPr lang="en-US" dirty="0" err="1">
+                <a:latin typeface="+mn-lt"/>
+              </a:rPr>
+              <a:t>codeastro</a:t>
+            </a:r>
+            <a:r>
+              <a:rPr lang="en-US" dirty="0">
+                <a:latin typeface="+mn-lt"/>
+              </a:rPr>
+              <a:t> repo (main branch)</a:t>
+            </a:r>
+          </a:p>
+          <a:p>
+            <a:pPr marL="0" indent="0">
+              <a:lnSpc>
+                <a:spcPct val="90000"/>
+              </a:lnSpc>
+              <a:spcBef>
+                <a:spcPts val="2000"/>
+              </a:spcBef>
+              <a:buClr>
+                <a:schemeClr val="dk1"/>
+              </a:buClr>
+              <a:buSzPct val="100000"/>
+              <a:buNone/>
             </a:pPr>
             <a:r>
               <a:rPr lang="en-US" dirty="0"/>
-              <a:t>Make sure you can “git pull” the most recent version of the </a:t>
+              <a:t>	</a:t>
             </a:r>
             <a:r>
-              <a:rPr lang="en-US" dirty="0" err="1"/>
-              <a:t>codeastro</a:t>
-            </a:r>
-            <a:r>
-              <a:rPr lang="en-US" dirty="0"/>
-              <a:t> repo (main branch)</a:t>
-            </a:r>
-          </a:p>
-          <a:p>
-            <a:pPr indent="-457200">
-              <a:lnSpc>
-                <a:spcPct val="90000"/>
-              </a:lnSpc>
-              <a:spcBef>
-                <a:spcPts val="2000"/>
-              </a:spcBef>
-              <a:buClr>
-                <a:schemeClr val="dk1"/>
-              </a:buClr>
-              <a:buSzPct val="100000"/>
-            </a:pPr>
-            <a:endParaRPr lang="en-US" dirty="0"/>
-          </a:p>
-          <a:p>
-            <a:pPr indent="-457200">
-              <a:lnSpc>
-                <a:spcPct val="90000"/>
-              </a:lnSpc>
-              <a:spcBef>
-                <a:spcPts val="2000"/>
-              </a:spcBef>
-              <a:buClr>
-                <a:schemeClr val="dk1"/>
-              </a:buClr>
-              <a:buSzPct val="100000"/>
-            </a:pPr>
-            <a:r>
-              <a:rPr lang="en-US" dirty="0"/>
-              <a:t>If you have local changes that you could like to save, you can do the following:</a:t>
+              <a:rPr lang="en-US" sz="4400" dirty="0">
+                <a:latin typeface="+mn-lt"/>
+              </a:rPr>
+              <a:t>If you have local changes that you would like to save, you can do the following:</a:t>
             </a:r>
           </a:p>
           <a:p>
@@ -12479,8 +13436,117 @@
               <a:buSzPct val="100000"/>
               <a:buNone/>
             </a:pPr>
+            <a:r>
+              <a:rPr lang="en-US" dirty="0">
+                <a:latin typeface="+mn-lt"/>
+                <a:ea typeface="Courier New"/>
+                <a:cs typeface="Courier New"/>
+                <a:sym typeface="Courier New"/>
+              </a:rPr>
+              <a:t>2. Within your project groups, create a repository (either a dummy repo or a repo for your project), and do the following:</a:t>
+            </a:r>
+          </a:p>
+          <a:p>
+            <a:pPr marL="685800" indent="-685800">
+              <a:lnSpc>
+                <a:spcPct val="90000"/>
+              </a:lnSpc>
+              <a:spcBef>
+                <a:spcPts val="2000"/>
+              </a:spcBef>
+              <a:buClr>
+                <a:schemeClr val="dk1"/>
+              </a:buClr>
+              <a:buSzPct val="100000"/>
+              <a:buFont typeface="Arial" panose="020B0604020202020204" pitchFamily="34" charset="0"/>
+              <a:buChar char="•"/>
+            </a:pPr>
+            <a:r>
+              <a:rPr lang="en-US" dirty="0">
+                <a:latin typeface="+mn-lt"/>
+                <a:ea typeface="Courier New"/>
+                <a:cs typeface="Courier New"/>
+                <a:sym typeface="Courier New"/>
+              </a:rPr>
+              <a:t>Create main, develop, and (at least) 2 feature branches.</a:t>
+            </a:r>
+          </a:p>
+          <a:p>
+            <a:pPr marL="685800" indent="-685800">
+              <a:lnSpc>
+                <a:spcPct val="90000"/>
+              </a:lnSpc>
+              <a:spcBef>
+                <a:spcPts val="2000"/>
+              </a:spcBef>
+              <a:buClr>
+                <a:schemeClr val="dk1"/>
+              </a:buClr>
+              <a:buSzPct val="100000"/>
+              <a:buFont typeface="Arial" panose="020B0604020202020204" pitchFamily="34" charset="0"/>
+              <a:buChar char="•"/>
+            </a:pPr>
+            <a:r>
+              <a:rPr lang="en-US" dirty="0">
+                <a:latin typeface="+mn-lt"/>
+                <a:ea typeface="Courier New"/>
+                <a:cs typeface="Courier New"/>
+                <a:sym typeface="Courier New"/>
+              </a:rPr>
+              <a:t>Raise an issue.</a:t>
+            </a:r>
+          </a:p>
+          <a:p>
+            <a:pPr marL="685800" indent="-685800">
+              <a:lnSpc>
+                <a:spcPct val="90000"/>
+              </a:lnSpc>
+              <a:spcBef>
+                <a:spcPts val="2000"/>
+              </a:spcBef>
+              <a:buClr>
+                <a:schemeClr val="dk1"/>
+              </a:buClr>
+              <a:buSzPct val="100000"/>
+              <a:buFont typeface="Arial" panose="020B0604020202020204" pitchFamily="34" charset="0"/>
+              <a:buChar char="•"/>
+            </a:pPr>
+            <a:r>
+              <a:rPr lang="en-US" dirty="0">
+                <a:latin typeface="+mn-lt"/>
+                <a:ea typeface="Courier New"/>
+                <a:cs typeface="Courier New"/>
+                <a:sym typeface="Courier New"/>
+              </a:rPr>
+              <a:t>Clone the repo to your machine, make changes on each of the feature branches, and open pull requests to merge them into main.</a:t>
+            </a:r>
+          </a:p>
+          <a:p>
+            <a:pPr marL="685800" indent="-685800">
+              <a:lnSpc>
+                <a:spcPct val="90000"/>
+              </a:lnSpc>
+              <a:spcBef>
+                <a:spcPts val="2000"/>
+              </a:spcBef>
+              <a:buClr>
+                <a:schemeClr val="dk1"/>
+              </a:buClr>
+              <a:buSzPct val="100000"/>
+              <a:buFont typeface="Arial" panose="020B0604020202020204" pitchFamily="34" charset="0"/>
+              <a:buChar char="•"/>
+            </a:pPr>
+            <a:r>
+              <a:rPr lang="en-US" dirty="0">
+                <a:latin typeface="+mn-lt"/>
+                <a:ea typeface="Courier New"/>
+                <a:cs typeface="Courier New"/>
+                <a:sym typeface="Courier New"/>
+              </a:rPr>
+              <a:t>Perform the merges.</a:t>
+            </a:r>
             <a:endParaRPr dirty="0">
-              <a:latin typeface="Courier New"/>
+              <a:latin typeface="+mn-lt"/>
               <a:ea typeface="Courier New"/>
               <a:cs typeface="Courier New"/>
               <a:sym typeface="Courier New"/>
@@ -12494,713 +13560,6 @@
         <p14:creationId xmlns:p14="http://schemas.microsoft.com/office/powerpoint/2010/main" val="2248961911"/>
       </p:ext>
     </p:extLst>
-  </p:cSld>
-  <p:clrMapOvr>
-    <a:masterClrMapping/>
-  </p:clrMapOvr>
-</p:sld>
-</file>
-
-<file path=ppt/slides/slide15.xml><?xml version="1.0" encoding="utf-8"?>
-<p:sld xmlns:a="http://schemas.openxmlformats.org/drawingml/2006/main" xmlns:r="http://schemas.openxmlformats.org/officeDocument/2006/relationships" xmlns:p="http://schemas.openxmlformats.org/presentationml/2006/main">
-  <p:cSld>
-    <p:spTree>
-      <p:nvGrpSpPr>
-        <p:cNvPr id="1" name=""/>
-        <p:cNvGrpSpPr/>
-        <p:nvPr/>
-      </p:nvGrpSpPr>
-      <p:grpSpPr>
-        <a:xfrm>
-          <a:off x="0" y="0"/>
-          <a:ext cx="0" cy="0"/>
-          <a:chOff x="0" y="0"/>
-          <a:chExt cx="0" cy="0"/>
-        </a:xfrm>
-      </p:grpSpPr>
-      <p:sp>
-        <p:nvSpPr>
-          <p:cNvPr id="3" name="Subtitle 2">
-            <a:extLst>
-              <a:ext uri="{FF2B5EF4-FFF2-40B4-BE49-F238E27FC236}">
-                <a16:creationId xmlns:a16="http://schemas.microsoft.com/office/drawing/2014/main" id="{6C5F78F2-9940-2C4A-BABD-92D65F58BC9F}"/>
-              </a:ext>
-            </a:extLst>
-          </p:cNvPr>
-          <p:cNvSpPr>
-            <a:spLocks noGrp="1"/>
-          </p:cNvSpPr>
-          <p:nvPr>
-            <p:ph type="subTitle" idx="1"/>
-          </p:nvPr>
-        </p:nvSpPr>
-        <p:spPr>
-          <a:xfrm>
-            <a:off x="3048000" y="6036757"/>
-            <a:ext cx="18288000" cy="1181166"/>
-          </a:xfrm>
-        </p:spPr>
-        <p:txBody>
-          <a:bodyPr>
-            <a:noAutofit/>
-          </a:bodyPr>
-          <a:lstStyle/>
-          <a:p>
-            <a:r>
-              <a:rPr lang="en-US" sz="8800" dirty="0"/>
-              <a:t>Extra Slides</a:t>
-            </a:r>
-          </a:p>
-        </p:txBody>
-      </p:sp>
-    </p:spTree>
-    <p:extLst>
-      <p:ext uri="{BB962C8B-B14F-4D97-AF65-F5344CB8AC3E}">
-        <p14:creationId xmlns:p14="http://schemas.microsoft.com/office/powerpoint/2010/main" val="4201141682"/>
-      </p:ext>
-    </p:extLst>
-  </p:cSld>
-  <p:clrMapOvr>
-    <a:masterClrMapping/>
-  </p:clrMapOvr>
-</p:sld>
-</file>
-
-<file path=ppt/slides/slide16.xml><?xml version="1.0" encoding="utf-8"?>
-<p:sld xmlns:a="http://schemas.openxmlformats.org/drawingml/2006/main" xmlns:r="http://schemas.openxmlformats.org/officeDocument/2006/relationships" xmlns:p="http://schemas.openxmlformats.org/presentationml/2006/main">
-  <p:cSld>
-    <p:spTree>
-      <p:nvGrpSpPr>
-        <p:cNvPr id="1" name="Shape 173"/>
-        <p:cNvGrpSpPr/>
-        <p:nvPr/>
-      </p:nvGrpSpPr>
-      <p:grpSpPr>
-        <a:xfrm>
-          <a:off x="0" y="0"/>
-          <a:ext cx="0" cy="0"/>
-          <a:chOff x="0" y="0"/>
-          <a:chExt cx="0" cy="0"/>
-        </a:xfrm>
-      </p:grpSpPr>
-      <p:sp>
-        <p:nvSpPr>
-          <p:cNvPr id="174" name="Google Shape;174;p10"/>
-          <p:cNvSpPr txBox="1">
-            <a:spLocks noGrp="1"/>
-          </p:cNvSpPr>
-          <p:nvPr>
-            <p:ph type="title"/>
-          </p:nvPr>
-        </p:nvSpPr>
-        <p:spPr>
-          <a:xfrm>
-            <a:off x="1689100" y="355600"/>
-            <a:ext cx="21005800" cy="2286000"/>
-          </a:xfrm>
-          <a:prstGeom prst="rect">
-            <a:avLst/>
-          </a:prstGeom>
-          <a:noFill/>
-          <a:ln>
-            <a:noFill/>
-          </a:ln>
-        </p:spPr>
-        <p:txBody>
-          <a:bodyPr spcFirstLastPara="1" wrap="square" lIns="50800" tIns="50800" rIns="50800" bIns="50800" anchor="ctr" anchorCtr="0">
-            <a:normAutofit/>
-          </a:bodyPr>
-          <a:lstStyle/>
-          <a:p>
-            <a:pPr marL="0" lvl="0" indent="0" algn="ctr" rtl="0">
-              <a:lnSpc>
-                <a:spcPct val="100000"/>
-              </a:lnSpc>
-              <a:spcBef>
-                <a:spcPts val="0"/>
-              </a:spcBef>
-              <a:spcAft>
-                <a:spcPts val="0"/>
-              </a:spcAft>
-              <a:buClr>
-                <a:srgbClr val="000000"/>
-              </a:buClr>
-              <a:buSzPts val="11200"/>
-              <a:buFont typeface="Helvetica Neue"/>
-              <a:buNone/>
-            </a:pPr>
-            <a:r>
-              <a:rPr lang="en-US" sz="8000" b="0" i="0" u="none" strike="noStrike" cap="none" dirty="0">
-                <a:solidFill>
-                  <a:srgbClr val="000000"/>
-                </a:solidFill>
-                <a:latin typeface="Helvetica Neue"/>
-                <a:ea typeface="Helvetica Neue"/>
-                <a:cs typeface="Helvetica Neue"/>
-                <a:sym typeface="Helvetica Neue"/>
-              </a:rPr>
-              <a:t>Feature done: Pull Request</a:t>
-            </a:r>
-            <a:endParaRPr sz="8000" dirty="0"/>
-          </a:p>
-        </p:txBody>
-      </p:sp>
-      <p:pic>
-        <p:nvPicPr>
-          <p:cNvPr id="175" name="Google Shape;175;p10" descr="Screen Shot 2020-06-05 at 12.42.44 PM.png"/>
-          <p:cNvPicPr preferRelativeResize="0"/>
-          <p:nvPr/>
-        </p:nvPicPr>
-        <p:blipFill rotWithShape="1">
-          <a:blip r:embed="rId3">
-            <a:alphaModFix/>
-          </a:blip>
-          <a:srcRect/>
-          <a:stretch/>
-        </p:blipFill>
-        <p:spPr>
-          <a:xfrm>
-            <a:off x="2914669" y="3092919"/>
-            <a:ext cx="18554662" cy="10244108"/>
-          </a:xfrm>
-          <a:prstGeom prst="rect">
-            <a:avLst/>
-          </a:prstGeom>
-          <a:noFill/>
-          <a:ln>
-            <a:noFill/>
-          </a:ln>
-        </p:spPr>
-      </p:pic>
-    </p:spTree>
-  </p:cSld>
-  <p:clrMapOvr>
-    <a:masterClrMapping/>
-  </p:clrMapOvr>
-</p:sld>
-</file>
-
-<file path=ppt/slides/slide17.xml><?xml version="1.0" encoding="utf-8"?>
-<p:sld xmlns:a="http://schemas.openxmlformats.org/drawingml/2006/main" xmlns:r="http://schemas.openxmlformats.org/officeDocument/2006/relationships" xmlns:p="http://schemas.openxmlformats.org/presentationml/2006/main">
-  <p:cSld>
-    <p:spTree>
-      <p:nvGrpSpPr>
-        <p:cNvPr id="1" name="Shape 180"/>
-        <p:cNvGrpSpPr/>
-        <p:nvPr/>
-      </p:nvGrpSpPr>
-      <p:grpSpPr>
-        <a:xfrm>
-          <a:off x="0" y="0"/>
-          <a:ext cx="0" cy="0"/>
-          <a:chOff x="0" y="0"/>
-          <a:chExt cx="0" cy="0"/>
-        </a:xfrm>
-      </p:grpSpPr>
-      <p:sp>
-        <p:nvSpPr>
-          <p:cNvPr id="181" name="Google Shape;181;p11"/>
-          <p:cNvSpPr txBox="1">
-            <a:spLocks noGrp="1"/>
-          </p:cNvSpPr>
-          <p:nvPr>
-            <p:ph type="title"/>
-          </p:nvPr>
-        </p:nvSpPr>
-        <p:spPr>
-          <a:xfrm>
-            <a:off x="1689100" y="355600"/>
-            <a:ext cx="21005800" cy="2286000"/>
-          </a:xfrm>
-          <a:prstGeom prst="rect">
-            <a:avLst/>
-          </a:prstGeom>
-          <a:noFill/>
-          <a:ln>
-            <a:noFill/>
-          </a:ln>
-        </p:spPr>
-        <p:txBody>
-          <a:bodyPr spcFirstLastPara="1" wrap="square" lIns="50800" tIns="50800" rIns="50800" bIns="50800" anchor="ctr" anchorCtr="0">
-            <a:normAutofit/>
-          </a:bodyPr>
-          <a:lstStyle/>
-          <a:p>
-            <a:pPr marL="0" lvl="0" indent="0" algn="ctr" rtl="0">
-              <a:lnSpc>
-                <a:spcPct val="100000"/>
-              </a:lnSpc>
-              <a:spcBef>
-                <a:spcPts val="0"/>
-              </a:spcBef>
-              <a:spcAft>
-                <a:spcPts val="0"/>
-              </a:spcAft>
-              <a:buClr>
-                <a:srgbClr val="000000"/>
-              </a:buClr>
-              <a:buSzPts val="11200"/>
-              <a:buFont typeface="Helvetica Neue"/>
-              <a:buNone/>
-            </a:pPr>
-            <a:r>
-              <a:rPr lang="en-US" sz="8000" b="0" i="0" u="none" strike="noStrike" cap="none" dirty="0">
-                <a:solidFill>
-                  <a:srgbClr val="000000"/>
-                </a:solidFill>
-                <a:latin typeface="Helvetica Neue"/>
-                <a:ea typeface="Helvetica Neue"/>
-                <a:cs typeface="Helvetica Neue"/>
-                <a:sym typeface="Helvetica Neue"/>
-              </a:rPr>
-              <a:t>Feature done: Pull Request</a:t>
-            </a:r>
-            <a:endParaRPr sz="8000" dirty="0"/>
-          </a:p>
-        </p:txBody>
-      </p:sp>
-      <p:sp>
-        <p:nvSpPr>
-          <p:cNvPr id="182" name="Google Shape;182;p11"/>
-          <p:cNvSpPr txBox="1">
-            <a:spLocks noGrp="1"/>
-          </p:cNvSpPr>
-          <p:nvPr>
-            <p:ph type="body" idx="1"/>
-          </p:nvPr>
-        </p:nvSpPr>
-        <p:spPr>
-          <a:xfrm>
-            <a:off x="14305322" y="3294162"/>
-            <a:ext cx="9606841" cy="9450063"/>
-          </a:xfrm>
-          <a:prstGeom prst="rect">
-            <a:avLst/>
-          </a:prstGeom>
-          <a:noFill/>
-          <a:ln>
-            <a:noFill/>
-          </a:ln>
-        </p:spPr>
-        <p:txBody>
-          <a:bodyPr spcFirstLastPara="1" wrap="square" lIns="50800" tIns="50800" rIns="50800" bIns="50800" anchor="ctr" anchorCtr="0">
-            <a:normAutofit lnSpcReduction="10000"/>
-          </a:bodyPr>
-          <a:lstStyle/>
-          <a:p>
-            <a:pPr marL="615950" lvl="0" indent="-615950" algn="l" rtl="0">
-              <a:lnSpc>
-                <a:spcPct val="100000"/>
-              </a:lnSpc>
-              <a:spcBef>
-                <a:spcPts val="0"/>
-              </a:spcBef>
-              <a:spcAft>
-                <a:spcPts val="0"/>
-              </a:spcAft>
-              <a:buClr>
-                <a:srgbClr val="000000"/>
-              </a:buClr>
-              <a:buSzPts val="5820"/>
-              <a:buFont typeface="Helvetica Neue"/>
-              <a:buChar char="•"/>
-            </a:pPr>
-            <a:r>
-              <a:rPr lang="en-US" sz="4656"/>
-              <a:t>Differences between your feature branch and develop will be highlighted</a:t>
-            </a:r>
-            <a:endParaRPr/>
-          </a:p>
-          <a:p>
-            <a:pPr marL="615950" lvl="0" indent="-615950" algn="l" rtl="0">
-              <a:lnSpc>
-                <a:spcPct val="100000"/>
-              </a:lnSpc>
-              <a:spcBef>
-                <a:spcPts val="5700"/>
-              </a:spcBef>
-              <a:spcAft>
-                <a:spcPts val="0"/>
-              </a:spcAft>
-              <a:buClr>
-                <a:srgbClr val="000000"/>
-              </a:buClr>
-              <a:buSzPts val="5820"/>
-              <a:buFont typeface="Helvetica Neue"/>
-              <a:buChar char="•"/>
-            </a:pPr>
-            <a:r>
-              <a:rPr lang="en-US" sz="4656"/>
-              <a:t>Be descriptive with your changes</a:t>
-            </a:r>
-            <a:endParaRPr/>
-          </a:p>
-          <a:p>
-            <a:pPr marL="615950" lvl="0" indent="-615950" algn="l" rtl="0">
-              <a:lnSpc>
-                <a:spcPct val="100000"/>
-              </a:lnSpc>
-              <a:spcBef>
-                <a:spcPts val="5700"/>
-              </a:spcBef>
-              <a:spcAft>
-                <a:spcPts val="0"/>
-              </a:spcAft>
-              <a:buClr>
-                <a:srgbClr val="000000"/>
-              </a:buClr>
-              <a:buSzPts val="5820"/>
-              <a:buFont typeface="Helvetica Neue"/>
-              <a:buChar char="•"/>
-            </a:pPr>
-            <a:r>
-              <a:rPr lang="en-US" sz="4656"/>
-              <a:t>Usually an admin or senior developer will review and merge into develop after approval</a:t>
-            </a:r>
-            <a:endParaRPr/>
-          </a:p>
-          <a:p>
-            <a:pPr marL="615950" lvl="0" indent="-615950" algn="l" rtl="0">
-              <a:lnSpc>
-                <a:spcPct val="100000"/>
-              </a:lnSpc>
-              <a:spcBef>
-                <a:spcPts val="5700"/>
-              </a:spcBef>
-              <a:spcAft>
-                <a:spcPts val="0"/>
-              </a:spcAft>
-              <a:buClr>
-                <a:srgbClr val="000000"/>
-              </a:buClr>
-              <a:buSzPts val="5820"/>
-              <a:buFont typeface="Helvetica Neue"/>
-              <a:buChar char="•"/>
-            </a:pPr>
-            <a:r>
-              <a:rPr lang="en-US" sz="4656"/>
-              <a:t>Automated checks may also run</a:t>
-            </a:r>
-            <a:endParaRPr/>
-          </a:p>
-          <a:p>
-            <a:pPr marL="615950" lvl="0" indent="-615950" algn="l" rtl="0">
-              <a:lnSpc>
-                <a:spcPct val="100000"/>
-              </a:lnSpc>
-              <a:spcBef>
-                <a:spcPts val="5700"/>
-              </a:spcBef>
-              <a:spcAft>
-                <a:spcPts val="0"/>
-              </a:spcAft>
-              <a:buClr>
-                <a:srgbClr val="000000"/>
-              </a:buClr>
-              <a:buSzPts val="5820"/>
-              <a:buFont typeface="Helvetica Neue"/>
-              <a:buChar char="•"/>
-            </a:pPr>
-            <a:r>
-              <a:rPr lang="en-US" sz="4656"/>
-              <a:t>Delete feature branch after merge</a:t>
-            </a:r>
-            <a:endParaRPr/>
-          </a:p>
-        </p:txBody>
-      </p:sp>
-      <p:pic>
-        <p:nvPicPr>
-          <p:cNvPr id="183" name="Google Shape;183;p11" descr="Screen Shot 2020-06-05 at 12.49.29 PM.png"/>
-          <p:cNvPicPr preferRelativeResize="0"/>
-          <p:nvPr/>
-        </p:nvPicPr>
-        <p:blipFill rotWithShape="1">
-          <a:blip r:embed="rId3">
-            <a:alphaModFix/>
-          </a:blip>
-          <a:srcRect/>
-          <a:stretch/>
-        </p:blipFill>
-        <p:spPr>
-          <a:xfrm>
-            <a:off x="584845" y="2446423"/>
-            <a:ext cx="13423627" cy="10601154"/>
-          </a:xfrm>
-          <a:prstGeom prst="rect">
-            <a:avLst/>
-          </a:prstGeom>
-          <a:noFill/>
-          <a:ln>
-            <a:noFill/>
-          </a:ln>
-        </p:spPr>
-      </p:pic>
-    </p:spTree>
-  </p:cSld>
-  <p:clrMapOvr>
-    <a:masterClrMapping/>
-  </p:clrMapOvr>
-</p:sld>
-</file>
-
-<file path=ppt/slides/slide18.xml><?xml version="1.0" encoding="utf-8"?>
-<p:sld xmlns:a="http://schemas.openxmlformats.org/drawingml/2006/main" xmlns:r="http://schemas.openxmlformats.org/officeDocument/2006/relationships" xmlns:p="http://schemas.openxmlformats.org/presentationml/2006/main">
-  <p:cSld>
-    <p:spTree>
-      <p:nvGrpSpPr>
-        <p:cNvPr id="1" name="Shape 188"/>
-        <p:cNvGrpSpPr/>
-        <p:nvPr/>
-      </p:nvGrpSpPr>
-      <p:grpSpPr>
-        <a:xfrm>
-          <a:off x="0" y="0"/>
-          <a:ext cx="0" cy="0"/>
-          <a:chOff x="0" y="0"/>
-          <a:chExt cx="0" cy="0"/>
-        </a:xfrm>
-      </p:grpSpPr>
-      <p:sp>
-        <p:nvSpPr>
-          <p:cNvPr id="189" name="Google Shape;189;p12"/>
-          <p:cNvSpPr txBox="1">
-            <a:spLocks noGrp="1"/>
-          </p:cNvSpPr>
-          <p:nvPr>
-            <p:ph type="title"/>
-          </p:nvPr>
-        </p:nvSpPr>
-        <p:spPr>
-          <a:xfrm>
-            <a:off x="1689100" y="355600"/>
-            <a:ext cx="21005800" cy="2286000"/>
-          </a:xfrm>
-          <a:prstGeom prst="rect">
-            <a:avLst/>
-          </a:prstGeom>
-          <a:noFill/>
-          <a:ln>
-            <a:noFill/>
-          </a:ln>
-        </p:spPr>
-        <p:txBody>
-          <a:bodyPr spcFirstLastPara="1" wrap="square" lIns="50800" tIns="50800" rIns="50800" bIns="50800" anchor="ctr" anchorCtr="0">
-            <a:normAutofit/>
-          </a:bodyPr>
-          <a:lstStyle/>
-          <a:p>
-            <a:pPr marL="0" lvl="0" indent="0" algn="ctr" rtl="0">
-              <a:lnSpc>
-                <a:spcPct val="100000"/>
-              </a:lnSpc>
-              <a:spcBef>
-                <a:spcPts val="0"/>
-              </a:spcBef>
-              <a:spcAft>
-                <a:spcPts val="0"/>
-              </a:spcAft>
-              <a:buClr>
-                <a:srgbClr val="000000"/>
-              </a:buClr>
-              <a:buSzPts val="11200"/>
-              <a:buFont typeface="Helvetica Neue"/>
-              <a:buNone/>
-            </a:pPr>
-            <a:r>
-              <a:rPr lang="en-US" sz="8000" b="0" i="0" u="none" strike="noStrike" cap="none" dirty="0">
-                <a:solidFill>
-                  <a:srgbClr val="000000"/>
-                </a:solidFill>
-                <a:latin typeface="Helvetica Neue"/>
-                <a:ea typeface="Helvetica Neue"/>
-                <a:cs typeface="Helvetica Neue"/>
-                <a:sym typeface="Helvetica Neue"/>
-              </a:rPr>
-              <a:t>Feature done: Pull Request</a:t>
-            </a:r>
-            <a:endParaRPr sz="8000" dirty="0"/>
-          </a:p>
-        </p:txBody>
-      </p:sp>
-      <p:sp>
-        <p:nvSpPr>
-          <p:cNvPr id="190" name="Google Shape;190;p12"/>
-          <p:cNvSpPr txBox="1">
-            <a:spLocks noGrp="1"/>
-          </p:cNvSpPr>
-          <p:nvPr>
-            <p:ph type="body" idx="1"/>
-          </p:nvPr>
-        </p:nvSpPr>
-        <p:spPr>
-          <a:xfrm>
-            <a:off x="14305322" y="3294162"/>
-            <a:ext cx="9606841" cy="9450063"/>
-          </a:xfrm>
-          <a:prstGeom prst="rect">
-            <a:avLst/>
-          </a:prstGeom>
-          <a:noFill/>
-          <a:ln>
-            <a:noFill/>
-          </a:ln>
-        </p:spPr>
-        <p:txBody>
-          <a:bodyPr spcFirstLastPara="1" wrap="square" lIns="50800" tIns="50800" rIns="50800" bIns="50800" anchor="ctr" anchorCtr="0">
-            <a:normAutofit lnSpcReduction="10000"/>
-          </a:bodyPr>
-          <a:lstStyle/>
-          <a:p>
-            <a:pPr marL="615950" lvl="0" indent="-615950" algn="l" rtl="0">
-              <a:lnSpc>
-                <a:spcPct val="100000"/>
-              </a:lnSpc>
-              <a:spcBef>
-                <a:spcPts val="0"/>
-              </a:spcBef>
-              <a:spcAft>
-                <a:spcPts val="0"/>
-              </a:spcAft>
-              <a:buClr>
-                <a:srgbClr val="000000"/>
-              </a:buClr>
-              <a:buSzPts val="5820"/>
-              <a:buFont typeface="Helvetica Neue"/>
-              <a:buChar char="•"/>
-            </a:pPr>
-            <a:r>
-              <a:rPr lang="en-US" sz="4656"/>
-              <a:t>Differences between your feature branch and develop will be highlighted</a:t>
-            </a:r>
-            <a:endParaRPr/>
-          </a:p>
-          <a:p>
-            <a:pPr marL="615950" lvl="0" indent="-615950" algn="l" rtl="0">
-              <a:lnSpc>
-                <a:spcPct val="100000"/>
-              </a:lnSpc>
-              <a:spcBef>
-                <a:spcPts val="5700"/>
-              </a:spcBef>
-              <a:spcAft>
-                <a:spcPts val="0"/>
-              </a:spcAft>
-              <a:buClr>
-                <a:srgbClr val="000000"/>
-              </a:buClr>
-              <a:buSzPts val="5820"/>
-              <a:buFont typeface="Helvetica Neue"/>
-              <a:buChar char="•"/>
-            </a:pPr>
-            <a:r>
-              <a:rPr lang="en-US" sz="4656"/>
-              <a:t>Be descriptive with your changes</a:t>
-            </a:r>
-            <a:endParaRPr/>
-          </a:p>
-          <a:p>
-            <a:pPr marL="615950" lvl="0" indent="-615950" algn="l" rtl="0">
-              <a:lnSpc>
-                <a:spcPct val="100000"/>
-              </a:lnSpc>
-              <a:spcBef>
-                <a:spcPts val="5700"/>
-              </a:spcBef>
-              <a:spcAft>
-                <a:spcPts val="0"/>
-              </a:spcAft>
-              <a:buClr>
-                <a:srgbClr val="000000"/>
-              </a:buClr>
-              <a:buSzPts val="5820"/>
-              <a:buFont typeface="Helvetica Neue"/>
-              <a:buChar char="•"/>
-            </a:pPr>
-            <a:r>
-              <a:rPr lang="en-US" sz="4656"/>
-              <a:t>Usually an admin or senior developer will review and merge into develop after approval</a:t>
-            </a:r>
-            <a:endParaRPr/>
-          </a:p>
-          <a:p>
-            <a:pPr marL="615950" lvl="0" indent="-615950" algn="l" rtl="0">
-              <a:lnSpc>
-                <a:spcPct val="100000"/>
-              </a:lnSpc>
-              <a:spcBef>
-                <a:spcPts val="5700"/>
-              </a:spcBef>
-              <a:spcAft>
-                <a:spcPts val="0"/>
-              </a:spcAft>
-              <a:buClr>
-                <a:srgbClr val="000000"/>
-              </a:buClr>
-              <a:buSzPts val="5820"/>
-              <a:buFont typeface="Helvetica Neue"/>
-              <a:buChar char="•"/>
-            </a:pPr>
-            <a:r>
-              <a:rPr lang="en-US" sz="4656"/>
-              <a:t>Automated checks may also run</a:t>
-            </a:r>
-            <a:endParaRPr/>
-          </a:p>
-          <a:p>
-            <a:pPr marL="615950" lvl="0" indent="-615950" algn="l" rtl="0">
-              <a:lnSpc>
-                <a:spcPct val="100000"/>
-              </a:lnSpc>
-              <a:spcBef>
-                <a:spcPts val="5700"/>
-              </a:spcBef>
-              <a:spcAft>
-                <a:spcPts val="0"/>
-              </a:spcAft>
-              <a:buClr>
-                <a:srgbClr val="000000"/>
-              </a:buClr>
-              <a:buSzPts val="5820"/>
-              <a:buFont typeface="Helvetica Neue"/>
-              <a:buChar char="•"/>
-            </a:pPr>
-            <a:r>
-              <a:rPr lang="en-US" sz="4656"/>
-              <a:t>Delete feature branch after merge</a:t>
-            </a:r>
-            <a:endParaRPr/>
-          </a:p>
-        </p:txBody>
-      </p:sp>
-      <p:pic>
-        <p:nvPicPr>
-          <p:cNvPr id="191" name="Google Shape;191;p12" descr="Screen Shot 2020-06-05 at 12.50.47 PM.png"/>
-          <p:cNvPicPr preferRelativeResize="0"/>
-          <p:nvPr/>
-        </p:nvPicPr>
-        <p:blipFill rotWithShape="1">
-          <a:blip r:embed="rId3">
-            <a:alphaModFix/>
-          </a:blip>
-          <a:srcRect/>
-          <a:stretch/>
-        </p:blipFill>
-        <p:spPr>
-          <a:xfrm>
-            <a:off x="756672" y="2862993"/>
-            <a:ext cx="12992101" cy="10312401"/>
-          </a:xfrm>
-          <a:prstGeom prst="rect">
-            <a:avLst/>
-          </a:prstGeom>
-          <a:noFill/>
-          <a:ln>
-            <a:noFill/>
-          </a:ln>
-        </p:spPr>
-      </p:pic>
-    </p:spTree>
   </p:cSld>
   <p:clrMapOvr>
     <a:masterClrMapping/>
@@ -13272,10 +13631,14 @@
               <a:buNone/>
             </a:pPr>
             <a:r>
-              <a:rPr lang="en-US" sz="8000" dirty="0"/>
+              <a:rPr lang="en-US" sz="8000" dirty="0">
+                <a:latin typeface="+mn-lt"/>
+              </a:rPr>
               <a:t>By the end of this lesson, you will be able to:</a:t>
             </a:r>
-            <a:endParaRPr sz="8000" dirty="0"/>
+            <a:endParaRPr sz="8000" dirty="0">
+              <a:latin typeface="+mn-lt"/>
+            </a:endParaRPr>
           </a:p>
         </p:txBody>
       </p:sp>
@@ -13320,85 +13683,31 @@
               </a:spcAft>
               <a:buNone/>
             </a:pPr>
-            <a:endParaRPr dirty="0"/>
-          </a:p>
-          <a:p>
-            <a:pPr marL="635000" lvl="0" indent="-635000" algn="l" rtl="0">
-              <a:lnSpc>
-                <a:spcPct val="100000"/>
-              </a:lnSpc>
-              <a:spcBef>
-                <a:spcPts val="0"/>
-              </a:spcBef>
-              <a:spcAft>
-                <a:spcPts val="0"/>
-              </a:spcAft>
-              <a:buClr>
-                <a:srgbClr val="000000"/>
-              </a:buClr>
-              <a:buSzPts val="6000"/>
-              <a:buFont typeface="Helvetica Neue"/>
-              <a:buChar char="•"/>
-            </a:pPr>
-            <a:r>
-              <a:rPr lang="en-US" sz="5200" dirty="0"/>
-              <a:t>Create multiple branches within a git repository</a:t>
-            </a:r>
-          </a:p>
-          <a:p>
-            <a:pPr marL="635000" lvl="0" indent="-635000" algn="l" rtl="0">
-              <a:lnSpc>
-                <a:spcPct val="100000"/>
-              </a:lnSpc>
-              <a:spcBef>
-                <a:spcPts val="0"/>
-              </a:spcBef>
-              <a:spcAft>
-                <a:spcPts val="0"/>
-              </a:spcAft>
-              <a:buClr>
-                <a:srgbClr val="000000"/>
-              </a:buClr>
-              <a:buSzPts val="6000"/>
-              <a:buFont typeface="Helvetica Neue"/>
-              <a:buChar char="•"/>
-            </a:pPr>
-            <a:r>
-              <a:rPr lang="en-US" sz="5200" dirty="0"/>
-              <a:t>Make a pull request from one branch into another</a:t>
-            </a:r>
-          </a:p>
-          <a:p>
-            <a:pPr marL="635000" lvl="0" indent="-635000" algn="l" rtl="0">
-              <a:lnSpc>
-                <a:spcPct val="100000"/>
-              </a:lnSpc>
-              <a:spcBef>
-                <a:spcPts val="0"/>
-              </a:spcBef>
-              <a:spcAft>
-                <a:spcPts val="0"/>
-              </a:spcAft>
-              <a:buClr>
-                <a:srgbClr val="000000"/>
-              </a:buClr>
-              <a:buSzPts val="6000"/>
-              <a:buFont typeface="Helvetica Neue"/>
-              <a:buChar char="•"/>
+            <a:endParaRPr dirty="0">
+              <a:latin typeface="+mn-lt"/>
+            </a:endParaRPr>
+          </a:p>
+          <a:p>
+            <a:pPr marL="635000" indent="-635000">
+              <a:spcBef>
+                <a:spcPts val="0"/>
+              </a:spcBef>
             </a:pPr>
             <a:r>
               <a:rPr lang="en-US" sz="5200" dirty="0">
                 <a:solidFill>
                   <a:schemeClr val="dk1"/>
                 </a:solidFill>
+                <a:latin typeface="+mn-lt"/>
               </a:rPr>
-              <a:t>Describe the basic git workflow (”</a:t>
+              <a:t>Describe the basic git workflow (“</a:t>
             </a:r>
             <a:r>
               <a:rPr lang="en-US" sz="5200" dirty="0" err="1">
                 <a:solidFill>
                   <a:schemeClr val="dk1"/>
                 </a:solidFill>
+                <a:latin typeface="+mn-lt"/>
               </a:rPr>
               <a:t>gitflow</a:t>
             </a:r>
@@ -13407,10 +13716,63 @@
                 <a:solidFill>
                   <a:schemeClr val="dk1"/>
                 </a:solidFill>
+                <a:latin typeface="+mn-lt"/>
               </a:rPr>
               <a:t>”)</a:t>
             </a:r>
-            <a:endParaRPr sz="5200" dirty="0"/>
+            <a:endParaRPr lang="en-US" sz="5200" dirty="0">
+              <a:latin typeface="+mn-lt"/>
+            </a:endParaRPr>
+          </a:p>
+          <a:p>
+            <a:pPr marL="635000" lvl="0" indent="-635000" algn="l" rtl="0">
+              <a:lnSpc>
+                <a:spcPct val="100000"/>
+              </a:lnSpc>
+              <a:spcBef>
+                <a:spcPts val="0"/>
+              </a:spcBef>
+              <a:spcAft>
+                <a:spcPts val="0"/>
+              </a:spcAft>
+              <a:buClr>
+                <a:srgbClr val="000000"/>
+              </a:buClr>
+              <a:buSzPts val="6000"/>
+              <a:buFont typeface="Helvetica Neue"/>
+              <a:buChar char="•"/>
+            </a:pPr>
+            <a:r>
+              <a:rPr lang="en-US" sz="5200" dirty="0">
+                <a:latin typeface="+mn-lt"/>
+              </a:rPr>
+              <a:t>Create multiple branches within a git repository</a:t>
+            </a:r>
+          </a:p>
+          <a:p>
+            <a:pPr marL="635000" lvl="0" indent="-635000" algn="l" rtl="0">
+              <a:lnSpc>
+                <a:spcPct val="100000"/>
+              </a:lnSpc>
+              <a:spcBef>
+                <a:spcPts val="0"/>
+              </a:spcBef>
+              <a:spcAft>
+                <a:spcPts val="0"/>
+              </a:spcAft>
+              <a:buClr>
+                <a:srgbClr val="000000"/>
+              </a:buClr>
+              <a:buSzPts val="6000"/>
+              <a:buFont typeface="Helvetica Neue"/>
+              <a:buChar char="•"/>
+            </a:pPr>
+            <a:r>
+              <a:rPr lang="en-US" sz="5200" dirty="0">
+                <a:latin typeface="+mn-lt"/>
+              </a:rPr>
+              <a:t>Make a pull request from one branch into another</a:t>
+            </a:r>
           </a:p>
         </p:txBody>
       </p:sp>
@@ -13474,18 +13836,26 @@
               <a:buNone/>
             </a:pPr>
             <a:r>
-              <a:rPr lang="en-US" sz="8000" dirty="0"/>
+              <a:rPr lang="en-US" sz="8000" dirty="0">
+                <a:latin typeface="+mn-lt"/>
+              </a:rPr>
               <a:t>Why do we Need </a:t>
             </a:r>
             <a:r>
-              <a:rPr lang="en-US" sz="8000" dirty="0" err="1"/>
+              <a:rPr lang="en-US" sz="8000" dirty="0" err="1">
+                <a:latin typeface="+mn-lt"/>
+              </a:rPr>
               <a:t>Gitflow</a:t>
             </a:r>
             <a:r>
-              <a:rPr lang="en-US" sz="8000" dirty="0"/>
+              <a:rPr lang="en-US" sz="8000" dirty="0">
+                <a:latin typeface="+mn-lt"/>
+              </a:rPr>
               <a:t>?</a:t>
             </a:r>
-            <a:endParaRPr sz="8000" dirty="0"/>
+            <a:endParaRPr sz="8000" dirty="0">
+              <a:latin typeface="+mn-lt"/>
+            </a:endParaRPr>
           </a:p>
         </p:txBody>
       </p:sp>
@@ -13524,18 +13894,26 @@
               <a:buNone/>
             </a:pPr>
             <a:r>
-              <a:rPr lang="en-US" dirty="0"/>
+              <a:rPr lang="en-US" dirty="0">
+                <a:latin typeface="+mn-lt"/>
+              </a:rPr>
               <a:t>When you’re working on big projects, many people are committing at once. Source control allows people to edit the same code base at the same time, using different </a:t>
             </a:r>
             <a:r>
-              <a:rPr lang="en-US" b="1" dirty="0"/>
+              <a:rPr lang="en-US" b="1" dirty="0">
+                <a:latin typeface="+mn-lt"/>
+              </a:rPr>
               <a:t>branches</a:t>
             </a:r>
             <a:r>
-              <a:rPr lang="en-US" dirty="0"/>
+              <a:rPr lang="en-US" dirty="0">
+                <a:latin typeface="+mn-lt"/>
+              </a:rPr>
               <a:t>.</a:t>
             </a:r>
-            <a:endParaRPr dirty="0"/>
+            <a:endParaRPr dirty="0">
+              <a:latin typeface="+mn-lt"/>
+            </a:endParaRPr>
           </a:p>
         </p:txBody>
       </p:sp>
@@ -13611,14 +13989,20 @@
               <a:buNone/>
             </a:pPr>
             <a:r>
-              <a:rPr lang="en-US" sz="8000" dirty="0" err="1"/>
+              <a:rPr lang="en-US" sz="8000" dirty="0" err="1">
+                <a:latin typeface="+mn-lt"/>
+              </a:rPr>
               <a:t>Gitflow</a:t>
             </a:r>
             <a:r>
-              <a:rPr lang="en-US" sz="8000" dirty="0"/>
+              <a:rPr lang="en-US" sz="8000" dirty="0">
+                <a:latin typeface="+mn-lt"/>
+              </a:rPr>
               <a:t> is a way of using Git and GitHub</a:t>
             </a:r>
-            <a:endParaRPr sz="8000" dirty="0"/>
+            <a:endParaRPr sz="8000" dirty="0">
+              <a:latin typeface="+mn-lt"/>
+            </a:endParaRPr>
           </a:p>
         </p:txBody>
       </p:sp>
@@ -13669,10 +14053,14 @@
               <a:buChar char="•"/>
             </a:pPr>
             <a:r>
-              <a:rPr lang="en-US" sz="4800"/>
+              <a:rPr lang="en-US" sz="4800" dirty="0">
+                <a:latin typeface="+mn-lt"/>
+              </a:rPr>
               <a:t>Allows for multi-user development and testing</a:t>
             </a:r>
-            <a:endParaRPr/>
+            <a:endParaRPr dirty="0">
+              <a:latin typeface="+mn-lt"/>
+            </a:endParaRPr>
           </a:p>
           <a:p>
             <a:pPr marL="635000" lvl="0" indent="-635000" algn="l" rtl="0">
@@ -13693,10 +14081,14 @@
               <a:buChar char="•"/>
             </a:pPr>
             <a:r>
-              <a:rPr lang="en-US" sz="4800"/>
+              <a:rPr lang="en-US" sz="4800" dirty="0">
+                <a:latin typeface="+mn-lt"/>
+              </a:rPr>
               <a:t>“Protects” the main code</a:t>
             </a:r>
-            <a:endParaRPr/>
+            <a:endParaRPr dirty="0">
+              <a:latin typeface="+mn-lt"/>
+            </a:endParaRPr>
           </a:p>
           <a:p>
             <a:pPr marL="635000" lvl="0" indent="-635000" algn="l" rtl="0">
@@ -13717,10 +14109,14 @@
               <a:buChar char="•"/>
             </a:pPr>
             <a:r>
-              <a:rPr lang="en-US" sz="4800"/>
+              <a:rPr lang="en-US" sz="4800" dirty="0">
+                <a:latin typeface="+mn-lt"/>
+              </a:rPr>
               <a:t>Easy to go back to a stable point if something breaks</a:t>
             </a:r>
-            <a:endParaRPr/>
+            <a:endParaRPr dirty="0">
+              <a:latin typeface="+mn-lt"/>
+            </a:endParaRPr>
           </a:p>
           <a:p>
             <a:pPr marL="635000" lvl="0" indent="-635000" algn="l" rtl="0">
@@ -13741,10 +14137,14 @@
               <a:buChar char="•"/>
             </a:pPr>
             <a:r>
-              <a:rPr lang="en-US" sz="4800"/>
+              <a:rPr lang="en-US" sz="4800" dirty="0">
+                <a:latin typeface="+mn-lt"/>
+              </a:rPr>
               <a:t>Work is performed in parallel on one or more feature branches.</a:t>
             </a:r>
-            <a:endParaRPr/>
+            <a:endParaRPr dirty="0">
+              <a:latin typeface="+mn-lt"/>
+            </a:endParaRPr>
           </a:p>
         </p:txBody>
       </p:sp>
@@ -13820,10 +14220,14 @@
               <a:buNone/>
             </a:pPr>
             <a:r>
-              <a:rPr lang="en-US" sz="8000" dirty="0"/>
+              <a:rPr lang="en-US" sz="8000" dirty="0">
+                <a:latin typeface="+mn-lt"/>
+              </a:rPr>
               <a:t>How It Works</a:t>
             </a:r>
-            <a:endParaRPr sz="8000" dirty="0"/>
+            <a:endParaRPr sz="8000" dirty="0">
+              <a:latin typeface="+mn-lt"/>
+            </a:endParaRPr>
           </a:p>
         </p:txBody>
       </p:sp>
@@ -14000,7 +14404,9 @@
           <a:p>
             <a:pPr algn="ctr"/>
             <a:r>
-              <a:rPr lang="en-US" sz="7200" dirty="0"/>
+              <a:rPr lang="en-US" sz="7200" dirty="0">
+                <a:latin typeface="+mn-lt"/>
+              </a:rPr>
               <a:t>1: Make a development branch off main</a:t>
             </a:r>
           </a:p>
@@ -14078,10 +14484,14 @@
               <a:buNone/>
             </a:pPr>
             <a:r>
-              <a:rPr lang="en-US" sz="7200" dirty="0"/>
+              <a:rPr lang="en-US" sz="7200" dirty="0">
+                <a:latin typeface="+mn-lt"/>
+              </a:rPr>
               <a:t>2. Create a feature branch from develop</a:t>
             </a:r>
-            <a:endParaRPr sz="7200" dirty="0"/>
+            <a:endParaRPr sz="7200" dirty="0">
+              <a:latin typeface="+mn-lt"/>
+            </a:endParaRPr>
           </a:p>
         </p:txBody>
       </p:sp>
@@ -14659,14 +15069,16 @@
                 <a:solidFill>
                   <a:srgbClr val="000000"/>
                 </a:solidFill>
-                <a:latin typeface="Helvetica Neue"/>
+                <a:latin typeface="+mn-lt"/>
                 <a:ea typeface="Helvetica Neue"/>
                 <a:cs typeface="Helvetica Neue"/>
                 <a:sym typeface="Helvetica Neue"/>
               </a:rPr>
               <a:t>3. Merge into Develop</a:t>
             </a:r>
-            <a:endParaRPr sz="7200" dirty="0"/>
+            <a:endParaRPr sz="7200" dirty="0">
+              <a:latin typeface="+mn-lt"/>
+            </a:endParaRPr>
           </a:p>
         </p:txBody>
       </p:sp>
@@ -15641,14 +16053,16 @@
                 <a:solidFill>
                   <a:srgbClr val="000000"/>
                 </a:solidFill>
-                <a:latin typeface="Helvetica Neue"/>
+                <a:latin typeface="+mn-lt"/>
                 <a:ea typeface="Helvetica Neue"/>
                 <a:cs typeface="Helvetica Neue"/>
                 <a:sym typeface="Helvetica Neue"/>
               </a:rPr>
               <a:t>4. Merge into main</a:t>
             </a:r>
-            <a:endParaRPr sz="7200" dirty="0"/>
+            <a:endParaRPr sz="7200" dirty="0">
+              <a:latin typeface="+mn-lt"/>
+            </a:endParaRPr>
           </a:p>
         </p:txBody>
       </p:sp>
@@ -16816,14 +17230,16 @@
                 <a:solidFill>
                   <a:srgbClr val="000000"/>
                 </a:solidFill>
-                <a:latin typeface="Helvetica Neue"/>
+                <a:latin typeface="+mn-lt"/>
                 <a:ea typeface="Helvetica Neue"/>
                 <a:cs typeface="Helvetica Neue"/>
                 <a:sym typeface="Helvetica Neue"/>
               </a:rPr>
               <a:t>4. Merge into main</a:t>
             </a:r>
-            <a:endParaRPr sz="7200" dirty="0"/>
+            <a:endParaRPr sz="7200" dirty="0">
+              <a:latin typeface="+mn-lt"/>
+            </a:endParaRPr>
           </a:p>
         </p:txBody>
       </p:sp>

</xml_diff>

<commit_message>
minor modifications to gitflow lesson
</commit_message>
<xml_diff>
--- a/Day1/gitflow.pptx
+++ b/Day1/gitflow.pptx
@@ -5,41 +5,42 @@
     <p:sldMasterId id="2147483648" r:id="rId1"/>
   </p:sldMasterIdLst>
   <p:notesMasterIdLst>
-    <p:notesMasterId r:id="rId17"/>
+    <p:notesMasterId r:id="rId18"/>
   </p:notesMasterIdLst>
   <p:sldIdLst>
     <p:sldId id="256" r:id="rId2"/>
     <p:sldId id="257" r:id="rId3"/>
-    <p:sldId id="260" r:id="rId4"/>
-    <p:sldId id="261" r:id="rId5"/>
-    <p:sldId id="265" r:id="rId6"/>
-    <p:sldId id="268" r:id="rId7"/>
-    <p:sldId id="290" r:id="rId8"/>
-    <p:sldId id="272" r:id="rId9"/>
-    <p:sldId id="292" r:id="rId10"/>
-    <p:sldId id="295" r:id="rId11"/>
-    <p:sldId id="293" r:id="rId12"/>
-    <p:sldId id="274" r:id="rId13"/>
-    <p:sldId id="291" r:id="rId14"/>
-    <p:sldId id="262" r:id="rId15"/>
-    <p:sldId id="294" r:id="rId16"/>
+    <p:sldId id="262" r:id="rId4"/>
+    <p:sldId id="260" r:id="rId5"/>
+    <p:sldId id="261" r:id="rId6"/>
+    <p:sldId id="265" r:id="rId7"/>
+    <p:sldId id="268" r:id="rId8"/>
+    <p:sldId id="290" r:id="rId9"/>
+    <p:sldId id="272" r:id="rId10"/>
+    <p:sldId id="292" r:id="rId11"/>
+    <p:sldId id="295" r:id="rId12"/>
+    <p:sldId id="296" r:id="rId13"/>
+    <p:sldId id="293" r:id="rId14"/>
+    <p:sldId id="274" r:id="rId15"/>
+    <p:sldId id="291" r:id="rId16"/>
+    <p:sldId id="294" r:id="rId17"/>
   </p:sldIdLst>
   <p:sldSz cx="24384000" cy="13716000"/>
   <p:notesSz cx="6858000" cy="9144000"/>
   <p:embeddedFontLst>
     <p:embeddedFont>
       <p:font typeface="Helvetica Neue" panose="02000503000000020004" pitchFamily="2" charset="0"/>
-      <p:regular r:id="rId18"/>
-      <p:bold r:id="rId19"/>
-      <p:italic r:id="rId20"/>
-      <p:boldItalic r:id="rId21"/>
+      <p:regular r:id="rId19"/>
+      <p:bold r:id="rId20"/>
+      <p:italic r:id="rId21"/>
+      <p:boldItalic r:id="rId22"/>
     </p:embeddedFont>
     <p:embeddedFont>
       <p:font typeface="Helvetica Neue Light" panose="02000403000000020004" pitchFamily="2" charset="0"/>
-      <p:regular r:id="rId22"/>
-      <p:bold r:id="rId23"/>
-      <p:italic r:id="rId24"/>
-      <p:boldItalic r:id="rId25"/>
+      <p:regular r:id="rId23"/>
+      <p:bold r:id="rId24"/>
+      <p:italic r:id="rId25"/>
+      <p:boldItalic r:id="rId26"/>
     </p:embeddedFont>
   </p:embeddedFontLst>
   <p:defaultTextStyle>
@@ -992,6 +993,115 @@
     </p:spTree>
     <p:extLst>
       <p:ext uri="{BB962C8B-B14F-4D97-AF65-F5344CB8AC3E}">
+        <p14:creationId xmlns:p14="http://schemas.microsoft.com/office/powerpoint/2010/main" val="744880146"/>
+      </p:ext>
+    </p:extLst>
+  </p:cSld>
+  <p:clrMapOvr>
+    <a:masterClrMapping/>
+  </p:clrMapOvr>
+</p:notes>
+</file>
+
+<file path=ppt/notesSlides/notesSlide11.xml><?xml version="1.0" encoding="utf-8"?>
+<p:notes xmlns:a="http://schemas.openxmlformats.org/drawingml/2006/main" xmlns:r="http://schemas.openxmlformats.org/officeDocument/2006/relationships" xmlns:p="http://schemas.openxmlformats.org/presentationml/2006/main" showMasterSp="0" showMasterPhAnim="0">
+  <p:cSld>
+    <p:spTree>
+      <p:nvGrpSpPr>
+        <p:cNvPr id="1" name="Shape 193"/>
+        <p:cNvGrpSpPr/>
+        <p:nvPr/>
+      </p:nvGrpSpPr>
+      <p:grpSpPr>
+        <a:xfrm>
+          <a:off x="0" y="0"/>
+          <a:ext cx="0" cy="0"/>
+          <a:chOff x="0" y="0"/>
+          <a:chExt cx="0" cy="0"/>
+        </a:xfrm>
+      </p:grpSpPr>
+      <p:sp>
+        <p:nvSpPr>
+          <p:cNvPr id="194" name="Google Shape;194;p13:notes"/>
+          <p:cNvSpPr txBox="1">
+            <a:spLocks noGrp="1"/>
+          </p:cNvSpPr>
+          <p:nvPr>
+            <p:ph type="body" idx="1"/>
+          </p:nvPr>
+        </p:nvSpPr>
+        <p:spPr>
+          <a:xfrm>
+            <a:off x="914400" y="4343400"/>
+            <a:ext cx="5029200" cy="4114800"/>
+          </a:xfrm>
+          <a:prstGeom prst="rect">
+            <a:avLst/>
+          </a:prstGeom>
+        </p:spPr>
+        <p:txBody>
+          <a:bodyPr spcFirstLastPara="1" wrap="square" lIns="91425" tIns="45700" rIns="91425" bIns="45700" anchor="t" anchorCtr="0">
+            <a:noAutofit/>
+          </a:bodyPr>
+          <a:lstStyle/>
+          <a:p>
+            <a:pPr marL="0" lvl="0" indent="0" algn="l" rtl="0">
+              <a:spcBef>
+                <a:spcPts val="0"/>
+              </a:spcBef>
+              <a:spcAft>
+                <a:spcPts val="0"/>
+              </a:spcAft>
+              <a:buNone/>
+            </a:pPr>
+            <a:endParaRPr/>
+          </a:p>
+        </p:txBody>
+      </p:sp>
+      <p:sp>
+        <p:nvSpPr>
+          <p:cNvPr id="195" name="Google Shape;195;p13:notes"/>
+          <p:cNvSpPr>
+            <a:spLocks noGrp="1" noRot="1" noChangeAspect="1"/>
+          </p:cNvSpPr>
+          <p:nvPr>
+            <p:ph type="sldImg" idx="2"/>
+          </p:nvPr>
+        </p:nvSpPr>
+        <p:spPr>
+          <a:xfrm>
+            <a:off x="381000" y="685800"/>
+            <a:ext cx="6096000" cy="3429000"/>
+          </a:xfrm>
+          <a:custGeom>
+            <a:avLst/>
+            <a:gdLst/>
+            <a:ahLst/>
+            <a:cxnLst/>
+            <a:rect l="l" t="t" r="r" b="b"/>
+            <a:pathLst>
+              <a:path w="120000" h="120000" extrusionOk="0">
+                <a:moveTo>
+                  <a:pt x="0" y="0"/>
+                </a:moveTo>
+                <a:lnTo>
+                  <a:pt x="120000" y="0"/>
+                </a:lnTo>
+                <a:lnTo>
+                  <a:pt x="120000" y="120000"/>
+                </a:lnTo>
+                <a:lnTo>
+                  <a:pt x="0" y="120000"/>
+                </a:lnTo>
+                <a:close/>
+              </a:path>
+            </a:pathLst>
+          </a:custGeom>
+        </p:spPr>
+      </p:sp>
+    </p:spTree>
+    <p:extLst>
+      <p:ext uri="{BB962C8B-B14F-4D97-AF65-F5344CB8AC3E}">
         <p14:creationId xmlns:p14="http://schemas.microsoft.com/office/powerpoint/2010/main" val="498390696"/>
       </p:ext>
     </p:extLst>
@@ -1002,7 +1112,7 @@
 </p:notes>
 </file>
 
-<file path=ppt/notesSlides/notesSlide11.xml><?xml version="1.0" encoding="utf-8"?>
+<file path=ppt/notesSlides/notesSlide12.xml><?xml version="1.0" encoding="utf-8"?>
 <p:notes xmlns:a="http://schemas.openxmlformats.org/drawingml/2006/main" xmlns:r="http://schemas.openxmlformats.org/officeDocument/2006/relationships" xmlns:p="http://schemas.openxmlformats.org/presentationml/2006/main" showMasterSp="0" showMasterPhAnim="0">
   <p:cSld>
     <p:spTree>
@@ -1116,7 +1226,7 @@
             </a:pPr>
             <a:r>
               <a:rPr lang="en-US" dirty="0"/>
-              <a:t>Create main, develop, feature1, and feature2 branches</a:t>
+              <a:t>Create main, develop, &amp; feature1 branches</a:t>
             </a:r>
           </a:p>
           <a:p>
@@ -1132,7 +1242,7 @@
             </a:pPr>
             <a:r>
               <a:rPr lang="en-US" dirty="0"/>
-              <a:t>Create PRs for feature1 and feature2 to develop</a:t>
+              <a:t>Create PRs for feature1 to develop</a:t>
             </a:r>
           </a:p>
           <a:p>
@@ -1148,7 +1258,7 @@
             </a:pPr>
             <a:r>
               <a:rPr lang="en-US" dirty="0"/>
-              <a:t>Merge the PRs</a:t>
+              <a:t>Merge the PR</a:t>
             </a:r>
           </a:p>
           <a:p>
@@ -1220,7 +1330,7 @@
 </p:notes>
 </file>
 
-<file path=ppt/notesSlides/notesSlide12.xml><?xml version="1.0" encoding="utf-8"?>
+<file path=ppt/notesSlides/notesSlide13.xml><?xml version="1.0" encoding="utf-8"?>
 <p:notes xmlns:a="http://schemas.openxmlformats.org/drawingml/2006/main" xmlns:r="http://schemas.openxmlformats.org/officeDocument/2006/relationships" xmlns:p="http://schemas.openxmlformats.org/presentationml/2006/main" showMasterSp="0" showMasterPhAnim="0">
   <p:cSld>
     <p:spTree>
@@ -1324,7 +1434,7 @@
 </p:notes>
 </file>
 
-<file path=ppt/notesSlides/notesSlide13.xml><?xml version="1.0" encoding="utf-8"?>
+<file path=ppt/notesSlides/notesSlide14.xml><?xml version="1.0" encoding="utf-8"?>
 <p:notes xmlns:a="http://schemas.openxmlformats.org/drawingml/2006/main" xmlns:r="http://schemas.openxmlformats.org/officeDocument/2006/relationships" xmlns:p="http://schemas.openxmlformats.org/presentationml/2006/main" showMasterSp="0" showMasterPhAnim="0">
   <p:cSld>
     <p:spTree>
@@ -1426,158 +1536,6 @@
         <p14:creationId xmlns:p14="http://schemas.microsoft.com/office/powerpoint/2010/main" val="1895333862"/>
       </p:ext>
     </p:extLst>
-  </p:cSld>
-  <p:clrMapOvr>
-    <a:masterClrMapping/>
-  </p:clrMapOvr>
-</p:notes>
-</file>
-
-<file path=ppt/notesSlides/notesSlide14.xml><?xml version="1.0" encoding="utf-8"?>
-<p:notes xmlns:a="http://schemas.openxmlformats.org/drawingml/2006/main" xmlns:r="http://schemas.openxmlformats.org/officeDocument/2006/relationships" xmlns:p="http://schemas.openxmlformats.org/presentationml/2006/main" showMasterSp="0" showMasterPhAnim="0">
-  <p:cSld>
-    <p:spTree>
-      <p:nvGrpSpPr>
-        <p:cNvPr id="1" name="Shape 103"/>
-        <p:cNvGrpSpPr/>
-        <p:nvPr/>
-      </p:nvGrpSpPr>
-      <p:grpSpPr>
-        <a:xfrm>
-          <a:off x="0" y="0"/>
-          <a:ext cx="0" cy="0"/>
-          <a:chOff x="0" y="0"/>
-          <a:chExt cx="0" cy="0"/>
-        </a:xfrm>
-      </p:grpSpPr>
-      <p:sp>
-        <p:nvSpPr>
-          <p:cNvPr id="104" name="Google Shape;104;g1347d530a7d_1_0:notes"/>
-          <p:cNvSpPr>
-            <a:spLocks noGrp="1" noRot="1" noChangeAspect="1"/>
-          </p:cNvSpPr>
-          <p:nvPr>
-            <p:ph type="sldImg" idx="2"/>
-          </p:nvPr>
-        </p:nvSpPr>
-        <p:spPr>
-          <a:xfrm>
-            <a:off x="381000" y="685800"/>
-            <a:ext cx="6096000" cy="3429000"/>
-          </a:xfrm>
-          <a:custGeom>
-            <a:avLst/>
-            <a:gdLst/>
-            <a:ahLst/>
-            <a:cxnLst/>
-            <a:rect l="l" t="t" r="r" b="b"/>
-            <a:pathLst>
-              <a:path w="120000" h="120000" extrusionOk="0">
-                <a:moveTo>
-                  <a:pt x="0" y="0"/>
-                </a:moveTo>
-                <a:lnTo>
-                  <a:pt x="120000" y="0"/>
-                </a:lnTo>
-                <a:lnTo>
-                  <a:pt x="120000" y="120000"/>
-                </a:lnTo>
-                <a:lnTo>
-                  <a:pt x="0" y="120000"/>
-                </a:lnTo>
-                <a:close/>
-              </a:path>
-            </a:pathLst>
-          </a:custGeom>
-        </p:spPr>
-      </p:sp>
-      <p:sp>
-        <p:nvSpPr>
-          <p:cNvPr id="105" name="Google Shape;105;g1347d530a7d_1_0:notes"/>
-          <p:cNvSpPr txBox="1">
-            <a:spLocks noGrp="1"/>
-          </p:cNvSpPr>
-          <p:nvPr>
-            <p:ph type="body" idx="1"/>
-          </p:nvPr>
-        </p:nvSpPr>
-        <p:spPr>
-          <a:xfrm>
-            <a:off x="914400" y="4343400"/>
-            <a:ext cx="5029200" cy="4114800"/>
-          </a:xfrm>
-          <a:prstGeom prst="rect">
-            <a:avLst/>
-          </a:prstGeom>
-        </p:spPr>
-        <p:txBody>
-          <a:bodyPr spcFirstLastPara="1" wrap="square" lIns="91425" tIns="45700" rIns="91425" bIns="45700" anchor="t" anchorCtr="0">
-            <a:noAutofit/>
-          </a:bodyPr>
-          <a:lstStyle/>
-          <a:p>
-            <a:pPr marL="0" lvl="0" indent="0" algn="l" rtl="0">
-              <a:spcBef>
-                <a:spcPts val="0"/>
-              </a:spcBef>
-              <a:spcAft>
-                <a:spcPts val="0"/>
-              </a:spcAft>
-              <a:buNone/>
-            </a:pPr>
-            <a:r>
-              <a:rPr lang="en-US" dirty="0"/>
-              <a:t>on zoom: use stack. </a:t>
-            </a:r>
-            <a:endParaRPr dirty="0"/>
-          </a:p>
-          <a:p>
-            <a:pPr marL="0" lvl="0" indent="0" algn="l" rtl="0">
-              <a:spcBef>
-                <a:spcPts val="0"/>
-              </a:spcBef>
-              <a:spcAft>
-                <a:spcPts val="0"/>
-              </a:spcAft>
-              <a:buNone/>
-            </a:pPr>
-            <a:r>
-              <a:rPr lang="en-US" dirty="0"/>
-              <a:t>IRL: raise hand. </a:t>
-            </a:r>
-            <a:endParaRPr dirty="0"/>
-          </a:p>
-          <a:p>
-            <a:pPr marL="0" lvl="0" indent="0" algn="l" rtl="0">
-              <a:spcBef>
-                <a:spcPts val="0"/>
-              </a:spcBef>
-              <a:spcAft>
-                <a:spcPts val="0"/>
-              </a:spcAft>
-              <a:buNone/>
-            </a:pPr>
-            <a:r>
-              <a:rPr lang="en-US" dirty="0"/>
-              <a:t>Alternate </a:t>
-            </a:r>
-            <a:r>
-              <a:rPr lang="en-US" dirty="0" err="1"/>
-              <a:t>btwn</a:t>
-            </a:r>
-            <a:r>
-              <a:rPr lang="en-US" dirty="0"/>
-              <a:t> zoom &amp; </a:t>
-            </a:r>
-            <a:r>
-              <a:rPr lang="en-US" dirty="0" err="1"/>
-              <a:t>irl</a:t>
-            </a:r>
-            <a:endParaRPr dirty="0"/>
-          </a:p>
-        </p:txBody>
-      </p:sp>
-    </p:spTree>
   </p:cSld>
   <p:clrMapOvr>
     <a:masterClrMapping/>
@@ -1803,6 +1761,110 @@
   <p:cSld>
     <p:spTree>
       <p:nvGrpSpPr>
+        <p:cNvPr id="1" name="Shape 103"/>
+        <p:cNvGrpSpPr/>
+        <p:nvPr/>
+      </p:nvGrpSpPr>
+      <p:grpSpPr>
+        <a:xfrm>
+          <a:off x="0" y="0"/>
+          <a:ext cx="0" cy="0"/>
+          <a:chOff x="0" y="0"/>
+          <a:chExt cx="0" cy="0"/>
+        </a:xfrm>
+      </p:grpSpPr>
+      <p:sp>
+        <p:nvSpPr>
+          <p:cNvPr id="104" name="Google Shape;104;g1347d530a7d_1_0:notes"/>
+          <p:cNvSpPr>
+            <a:spLocks noGrp="1" noRot="1" noChangeAspect="1"/>
+          </p:cNvSpPr>
+          <p:nvPr>
+            <p:ph type="sldImg" idx="2"/>
+          </p:nvPr>
+        </p:nvSpPr>
+        <p:spPr>
+          <a:xfrm>
+            <a:off x="381000" y="685800"/>
+            <a:ext cx="6096000" cy="3429000"/>
+          </a:xfrm>
+          <a:custGeom>
+            <a:avLst/>
+            <a:gdLst/>
+            <a:ahLst/>
+            <a:cxnLst/>
+            <a:rect l="l" t="t" r="r" b="b"/>
+            <a:pathLst>
+              <a:path w="120000" h="120000" extrusionOk="0">
+                <a:moveTo>
+                  <a:pt x="0" y="0"/>
+                </a:moveTo>
+                <a:lnTo>
+                  <a:pt x="120000" y="0"/>
+                </a:lnTo>
+                <a:lnTo>
+                  <a:pt x="120000" y="120000"/>
+                </a:lnTo>
+                <a:lnTo>
+                  <a:pt x="0" y="120000"/>
+                </a:lnTo>
+                <a:close/>
+              </a:path>
+            </a:pathLst>
+          </a:custGeom>
+        </p:spPr>
+      </p:sp>
+      <p:sp>
+        <p:nvSpPr>
+          <p:cNvPr id="105" name="Google Shape;105;g1347d530a7d_1_0:notes"/>
+          <p:cNvSpPr txBox="1">
+            <a:spLocks noGrp="1"/>
+          </p:cNvSpPr>
+          <p:nvPr>
+            <p:ph type="body" idx="1"/>
+          </p:nvPr>
+        </p:nvSpPr>
+        <p:spPr>
+          <a:xfrm>
+            <a:off x="914400" y="4343400"/>
+            <a:ext cx="5029200" cy="4114800"/>
+          </a:xfrm>
+          <a:prstGeom prst="rect">
+            <a:avLst/>
+          </a:prstGeom>
+        </p:spPr>
+        <p:txBody>
+          <a:bodyPr spcFirstLastPara="1" wrap="square" lIns="91425" tIns="45700" rIns="91425" bIns="45700" anchor="t" anchorCtr="0">
+            <a:noAutofit/>
+          </a:bodyPr>
+          <a:lstStyle/>
+          <a:p>
+            <a:pPr marL="0" lvl="0" indent="0" algn="l" rtl="0">
+              <a:spcBef>
+                <a:spcPts val="0"/>
+              </a:spcBef>
+              <a:spcAft>
+                <a:spcPts val="0"/>
+              </a:spcAft>
+              <a:buNone/>
+            </a:pPr>
+            <a:endParaRPr dirty="0"/>
+          </a:p>
+        </p:txBody>
+      </p:sp>
+    </p:spTree>
+  </p:cSld>
+  <p:clrMapOvr>
+    <a:masterClrMapping/>
+  </p:clrMapOvr>
+</p:notes>
+</file>
+
+<file path=ppt/notesSlides/notesSlide4.xml><?xml version="1.0" encoding="utf-8"?>
+<p:notes xmlns:a="http://schemas.openxmlformats.org/drawingml/2006/main" xmlns:r="http://schemas.openxmlformats.org/officeDocument/2006/relationships" xmlns:p="http://schemas.openxmlformats.org/presentationml/2006/main" showMasterSp="0" showMasterPhAnim="0">
+  <p:cSld>
+    <p:spTree>
+      <p:nvGrpSpPr>
         <p:cNvPr id="1" name="Shape 90"/>
         <p:cNvGrpSpPr/>
         <p:nvPr/>
@@ -1902,7 +1964,7 @@
 </p:notes>
 </file>
 
-<file path=ppt/notesSlides/notesSlide4.xml><?xml version="1.0" encoding="utf-8"?>
+<file path=ppt/notesSlides/notesSlide5.xml><?xml version="1.0" encoding="utf-8"?>
 <p:notes xmlns:a="http://schemas.openxmlformats.org/drawingml/2006/main" xmlns:r="http://schemas.openxmlformats.org/officeDocument/2006/relationships" xmlns:p="http://schemas.openxmlformats.org/presentationml/2006/main" showMasterSp="0" showMasterPhAnim="0">
   <p:cSld>
     <p:spTree>
@@ -2006,7 +2068,7 @@
 </p:notes>
 </file>
 
-<file path=ppt/notesSlides/notesSlide5.xml><?xml version="1.0" encoding="utf-8"?>
+<file path=ppt/notesSlides/notesSlide6.xml><?xml version="1.0" encoding="utf-8"?>
 <p:notes xmlns:a="http://schemas.openxmlformats.org/drawingml/2006/main" xmlns:r="http://schemas.openxmlformats.org/officeDocument/2006/relationships" xmlns:p="http://schemas.openxmlformats.org/presentationml/2006/main" showMasterSp="0" showMasterPhAnim="0">
   <p:cSld>
     <p:spTree>
@@ -2110,7 +2172,7 @@
 </p:notes>
 </file>
 
-<file path=ppt/notesSlides/notesSlide6.xml><?xml version="1.0" encoding="utf-8"?>
+<file path=ppt/notesSlides/notesSlide7.xml><?xml version="1.0" encoding="utf-8"?>
 <p:notes xmlns:a="http://schemas.openxmlformats.org/drawingml/2006/main" xmlns:r="http://schemas.openxmlformats.org/officeDocument/2006/relationships" xmlns:p="http://schemas.openxmlformats.org/presentationml/2006/main" showMasterSp="0" showMasterPhAnim="0">
   <p:cSld>
     <p:spTree>
@@ -2214,7 +2276,7 @@
 </p:notes>
 </file>
 
-<file path=ppt/notesSlides/notesSlide7.xml><?xml version="1.0" encoding="utf-8"?>
+<file path=ppt/notesSlides/notesSlide8.xml><?xml version="1.0" encoding="utf-8"?>
 <p:notes xmlns:a="http://schemas.openxmlformats.org/drawingml/2006/main" xmlns:r="http://schemas.openxmlformats.org/officeDocument/2006/relationships" xmlns:p="http://schemas.openxmlformats.org/presentationml/2006/main" showMasterSp="0" showMasterPhAnim="0">
   <p:cSld>
     <p:spTree>
@@ -2323,7 +2385,7 @@
 </p:notes>
 </file>
 
-<file path=ppt/notesSlides/notesSlide8.xml><?xml version="1.0" encoding="utf-8"?>
+<file path=ppt/notesSlides/notesSlide9.xml><?xml version="1.0" encoding="utf-8"?>
 <p:notes xmlns:a="http://schemas.openxmlformats.org/drawingml/2006/main" xmlns:r="http://schemas.openxmlformats.org/officeDocument/2006/relationships" xmlns:p="http://schemas.openxmlformats.org/presentationml/2006/main" showMasterSp="0" showMasterPhAnim="0">
   <p:cSld>
     <p:spTree>
@@ -2420,115 +2482,6 @@
         </p:spPr>
       </p:sp>
     </p:spTree>
-  </p:cSld>
-  <p:clrMapOvr>
-    <a:masterClrMapping/>
-  </p:clrMapOvr>
-</p:notes>
-</file>
-
-<file path=ppt/notesSlides/notesSlide9.xml><?xml version="1.0" encoding="utf-8"?>
-<p:notes xmlns:a="http://schemas.openxmlformats.org/drawingml/2006/main" xmlns:r="http://schemas.openxmlformats.org/officeDocument/2006/relationships" xmlns:p="http://schemas.openxmlformats.org/presentationml/2006/main" showMasterSp="0" showMasterPhAnim="0">
-  <p:cSld>
-    <p:spTree>
-      <p:nvGrpSpPr>
-        <p:cNvPr id="1" name="Shape 193"/>
-        <p:cNvGrpSpPr/>
-        <p:nvPr/>
-      </p:nvGrpSpPr>
-      <p:grpSpPr>
-        <a:xfrm>
-          <a:off x="0" y="0"/>
-          <a:ext cx="0" cy="0"/>
-          <a:chOff x="0" y="0"/>
-          <a:chExt cx="0" cy="0"/>
-        </a:xfrm>
-      </p:grpSpPr>
-      <p:sp>
-        <p:nvSpPr>
-          <p:cNvPr id="194" name="Google Shape;194;p13:notes"/>
-          <p:cNvSpPr txBox="1">
-            <a:spLocks noGrp="1"/>
-          </p:cNvSpPr>
-          <p:nvPr>
-            <p:ph type="body" idx="1"/>
-          </p:nvPr>
-        </p:nvSpPr>
-        <p:spPr>
-          <a:xfrm>
-            <a:off x="914400" y="4343400"/>
-            <a:ext cx="5029200" cy="4114800"/>
-          </a:xfrm>
-          <a:prstGeom prst="rect">
-            <a:avLst/>
-          </a:prstGeom>
-        </p:spPr>
-        <p:txBody>
-          <a:bodyPr spcFirstLastPara="1" wrap="square" lIns="91425" tIns="45700" rIns="91425" bIns="45700" anchor="t" anchorCtr="0">
-            <a:noAutofit/>
-          </a:bodyPr>
-          <a:lstStyle/>
-          <a:p>
-            <a:pPr marL="0" lvl="0" indent="0" algn="l" rtl="0">
-              <a:spcBef>
-                <a:spcPts val="0"/>
-              </a:spcBef>
-              <a:spcAft>
-                <a:spcPts val="0"/>
-              </a:spcAft>
-              <a:buNone/>
-            </a:pPr>
-            <a:endParaRPr/>
-          </a:p>
-        </p:txBody>
-      </p:sp>
-      <p:sp>
-        <p:nvSpPr>
-          <p:cNvPr id="195" name="Google Shape;195;p13:notes"/>
-          <p:cNvSpPr>
-            <a:spLocks noGrp="1" noRot="1" noChangeAspect="1"/>
-          </p:cNvSpPr>
-          <p:nvPr>
-            <p:ph type="sldImg" idx="2"/>
-          </p:nvPr>
-        </p:nvSpPr>
-        <p:spPr>
-          <a:xfrm>
-            <a:off x="381000" y="685800"/>
-            <a:ext cx="6096000" cy="3429000"/>
-          </a:xfrm>
-          <a:custGeom>
-            <a:avLst/>
-            <a:gdLst/>
-            <a:ahLst/>
-            <a:cxnLst/>
-            <a:rect l="l" t="t" r="r" b="b"/>
-            <a:pathLst>
-              <a:path w="120000" h="120000" extrusionOk="0">
-                <a:moveTo>
-                  <a:pt x="0" y="0"/>
-                </a:moveTo>
-                <a:lnTo>
-                  <a:pt x="120000" y="0"/>
-                </a:lnTo>
-                <a:lnTo>
-                  <a:pt x="120000" y="120000"/>
-                </a:lnTo>
-                <a:lnTo>
-                  <a:pt x="0" y="120000"/>
-                </a:lnTo>
-                <a:close/>
-              </a:path>
-            </a:pathLst>
-          </a:custGeom>
-        </p:spPr>
-      </p:sp>
-    </p:spTree>
-    <p:extLst>
-      <p:ext uri="{BB962C8B-B14F-4D97-AF65-F5344CB8AC3E}">
-        <p14:creationId xmlns:p14="http://schemas.microsoft.com/office/powerpoint/2010/main" val="744880146"/>
-      </p:ext>
-    </p:extLst>
   </p:cSld>
   <p:clrMapOvr>
     <a:masterClrMapping/>
@@ -4561,7 +4514,7 @@
           <a:p>
             <a:fld id="{34073DC1-AB27-4363-9845-555972D7C4F0}" type="datetimeFigureOut">
               <a:rPr lang="en-US" smtClean="0"/>
-              <a:t>7/5/24</a:t>
+              <a:t>7/14/24</a:t>
             </a:fld>
             <a:endParaRPr lang="en-US"/>
           </a:p>
@@ -11275,7 +11228,7 @@
               <a:buNone/>
             </a:pPr>
             <a:r>
-              <a:rPr lang="en-US" sz="3000" b="0" i="0" u="none" strike="noStrike" cap="none" dirty="0">
+              <a:rPr lang="en-US" sz="3000" b="0" i="0" u="none" strike="noStrike" cap="none">
                 <a:solidFill>
                   <a:srgbClr val="000000"/>
                 </a:solidFill>
@@ -11286,7 +11239,7 @@
               </a:rPr>
               <a:t>Main   </a:t>
             </a:r>
-            <a:endParaRPr dirty="0"/>
+            <a:endParaRPr/>
           </a:p>
         </p:txBody>
       </p:sp>
@@ -11731,6 +11684,74 @@
           </a:p>
         </p:txBody>
       </p:sp>
+      <p:cxnSp>
+        <p:nvCxnSpPr>
+          <p:cNvPr id="20" name="Google Shape;202;p13">
+            <a:extLst>
+              <a:ext uri="{FF2B5EF4-FFF2-40B4-BE49-F238E27FC236}">
+                <a16:creationId xmlns:a16="http://schemas.microsoft.com/office/drawing/2014/main" id="{154699A9-7FCA-724C-91DE-741CE2808BD0}"/>
+              </a:ext>
+            </a:extLst>
+          </p:cNvPr>
+          <p:cNvCxnSpPr>
+            <a:cxnSpLocks/>
+          </p:cNvCxnSpPr>
+          <p:nvPr/>
+        </p:nvCxnSpPr>
+        <p:spPr>
+          <a:xfrm flipV="1">
+            <a:off x="11846816" y="10220006"/>
+            <a:ext cx="2040960" cy="1012762"/>
+          </a:xfrm>
+          <a:prstGeom prst="straightConnector1">
+            <a:avLst/>
+          </a:prstGeom>
+          <a:noFill/>
+          <a:ln w="127000" cap="flat" cmpd="sng">
+            <a:solidFill>
+              <a:srgbClr val="FF0000"/>
+            </a:solidFill>
+            <a:prstDash val="solid"/>
+            <a:miter lim="400000"/>
+            <a:headEnd type="none" w="sm" len="sm"/>
+            <a:tailEnd type="triangle" w="med" len="med"/>
+          </a:ln>
+        </p:spPr>
+      </p:cxnSp>
+      <p:cxnSp>
+        <p:nvCxnSpPr>
+          <p:cNvPr id="22" name="Google Shape;202;p13">
+            <a:extLst>
+              <a:ext uri="{FF2B5EF4-FFF2-40B4-BE49-F238E27FC236}">
+                <a16:creationId xmlns:a16="http://schemas.microsoft.com/office/drawing/2014/main" id="{FA55A6E1-E3E8-174F-8801-F6292B1C214A}"/>
+              </a:ext>
+            </a:extLst>
+          </p:cNvPr>
+          <p:cNvCxnSpPr>
+            <a:cxnSpLocks/>
+          </p:cNvCxnSpPr>
+          <p:nvPr/>
+        </p:nvCxnSpPr>
+        <p:spPr>
+          <a:xfrm flipV="1">
+            <a:off x="14670332" y="8723546"/>
+            <a:ext cx="2961294" cy="1103078"/>
+          </a:xfrm>
+          <a:prstGeom prst="straightConnector1">
+            <a:avLst/>
+          </a:prstGeom>
+          <a:noFill/>
+          <a:ln w="127000" cap="flat" cmpd="sng">
+            <a:solidFill>
+              <a:srgbClr val="FF0000"/>
+            </a:solidFill>
+            <a:prstDash val="solid"/>
+            <a:miter lim="400000"/>
+            <a:headEnd type="none" w="sm" len="sm"/>
+            <a:tailEnd type="triangle" w="med" len="med"/>
+          </a:ln>
+        </p:spPr>
+      </p:cxnSp>
       <p:sp>
         <p:nvSpPr>
           <p:cNvPr id="25" name="Rectangle 24">
@@ -11785,6 +11806,872 @@
       </p:sp>
       <p:sp>
         <p:nvSpPr>
+          <p:cNvPr id="23" name="TextBox 22">
+            <a:extLst>
+              <a:ext uri="{FF2B5EF4-FFF2-40B4-BE49-F238E27FC236}">
+                <a16:creationId xmlns:a16="http://schemas.microsoft.com/office/drawing/2014/main" id="{3EC0232B-692F-834C-B3DC-E9F8F5633EAC}"/>
+              </a:ext>
+            </a:extLst>
+          </p:cNvPr>
+          <p:cNvSpPr txBox="1"/>
+          <p:nvPr/>
+        </p:nvSpPr>
+        <p:spPr>
+          <a:xfrm>
+            <a:off x="13121340" y="10839471"/>
+            <a:ext cx="3673798" cy="630942"/>
+          </a:xfrm>
+          <a:prstGeom prst="rect">
+            <a:avLst/>
+          </a:prstGeom>
+          <a:noFill/>
+        </p:spPr>
+        <p:txBody>
+          <a:bodyPr wrap="square" rtlCol="0">
+            <a:spAutoFit/>
+          </a:bodyPr>
+          <a:lstStyle/>
+          <a:p>
+            <a:pPr algn="ctr"/>
+            <a:r>
+              <a:rPr lang="en-US" sz="3500" dirty="0">
+                <a:solidFill>
+                  <a:srgbClr val="FF0000"/>
+                </a:solidFill>
+              </a:rPr>
+              <a:t>Pull Request # 1</a:t>
+            </a:r>
+          </a:p>
+        </p:txBody>
+      </p:sp>
+      <p:sp>
+        <p:nvSpPr>
+          <p:cNvPr id="24" name="TextBox 23">
+            <a:extLst>
+              <a:ext uri="{FF2B5EF4-FFF2-40B4-BE49-F238E27FC236}">
+                <a16:creationId xmlns:a16="http://schemas.microsoft.com/office/drawing/2014/main" id="{150370D1-A4F5-F249-8F76-7AE51C7517DC}"/>
+              </a:ext>
+            </a:extLst>
+          </p:cNvPr>
+          <p:cNvSpPr txBox="1"/>
+          <p:nvPr/>
+        </p:nvSpPr>
+        <p:spPr>
+          <a:xfrm>
+            <a:off x="16281957" y="9188915"/>
+            <a:ext cx="3673798" cy="630942"/>
+          </a:xfrm>
+          <a:prstGeom prst="rect">
+            <a:avLst/>
+          </a:prstGeom>
+          <a:noFill/>
+        </p:spPr>
+        <p:txBody>
+          <a:bodyPr wrap="square" rtlCol="0">
+            <a:spAutoFit/>
+          </a:bodyPr>
+          <a:lstStyle/>
+          <a:p>
+            <a:pPr algn="ctr"/>
+            <a:r>
+              <a:rPr lang="en-US" sz="3500" dirty="0">
+                <a:solidFill>
+                  <a:srgbClr val="FF0000"/>
+                </a:solidFill>
+              </a:rPr>
+              <a:t>Pull Request # 2</a:t>
+            </a:r>
+          </a:p>
+        </p:txBody>
+      </p:sp>
+    </p:spTree>
+    <p:extLst>
+      <p:ext uri="{BB962C8B-B14F-4D97-AF65-F5344CB8AC3E}">
+        <p14:creationId xmlns:p14="http://schemas.microsoft.com/office/powerpoint/2010/main" val="2495907393"/>
+      </p:ext>
+    </p:extLst>
+  </p:cSld>
+  <p:clrMapOvr>
+    <a:masterClrMapping/>
+  </p:clrMapOvr>
+</p:sld>
+</file>
+
+<file path=ppt/slides/slide11.xml><?xml version="1.0" encoding="utf-8"?>
+<p:sld xmlns:a="http://schemas.openxmlformats.org/drawingml/2006/main" xmlns:r="http://schemas.openxmlformats.org/officeDocument/2006/relationships" xmlns:p="http://schemas.openxmlformats.org/presentationml/2006/main">
+  <p:cSld>
+    <p:spTree>
+      <p:nvGrpSpPr>
+        <p:cNvPr id="1" name="Shape 196"/>
+        <p:cNvGrpSpPr/>
+        <p:nvPr/>
+      </p:nvGrpSpPr>
+      <p:grpSpPr>
+        <a:xfrm>
+          <a:off x="0" y="0"/>
+          <a:ext cx="0" cy="0"/>
+          <a:chOff x="0" y="0"/>
+          <a:chExt cx="0" cy="0"/>
+        </a:xfrm>
+      </p:grpSpPr>
+      <p:pic>
+        <p:nvPicPr>
+          <p:cNvPr id="197" name="Google Shape;197;p13" descr="Screenshot 2020-06-05 12.22.34.png"/>
+          <p:cNvPicPr preferRelativeResize="0"/>
+          <p:nvPr/>
+        </p:nvPicPr>
+        <p:blipFill rotWithShape="1">
+          <a:blip r:embed="rId3">
+            <a:alphaModFix/>
+          </a:blip>
+          <a:srcRect b="11825"/>
+          <a:stretch/>
+        </p:blipFill>
+        <p:spPr>
+          <a:xfrm>
+            <a:off x="2566743" y="2541399"/>
+            <a:ext cx="19250514" cy="9765931"/>
+          </a:xfrm>
+          <a:prstGeom prst="rect">
+            <a:avLst/>
+          </a:prstGeom>
+          <a:noFill/>
+          <a:ln>
+            <a:noFill/>
+          </a:ln>
+        </p:spPr>
+      </p:pic>
+      <p:sp>
+        <p:nvSpPr>
+          <p:cNvPr id="198" name="Google Shape;198;p13"/>
+          <p:cNvSpPr txBox="1">
+            <a:spLocks noGrp="1"/>
+          </p:cNvSpPr>
+          <p:nvPr>
+            <p:ph type="title"/>
+          </p:nvPr>
+        </p:nvSpPr>
+        <p:spPr>
+          <a:xfrm>
+            <a:off x="1689100" y="355600"/>
+            <a:ext cx="21005800" cy="2286000"/>
+          </a:xfrm>
+          <a:prstGeom prst="rect">
+            <a:avLst/>
+          </a:prstGeom>
+          <a:noFill/>
+          <a:ln>
+            <a:noFill/>
+          </a:ln>
+        </p:spPr>
+        <p:txBody>
+          <a:bodyPr spcFirstLastPara="1" wrap="square" lIns="50800" tIns="50800" rIns="50800" bIns="50800" anchor="ctr" anchorCtr="0">
+            <a:normAutofit/>
+          </a:bodyPr>
+          <a:lstStyle/>
+          <a:p>
+            <a:pPr marL="0" lvl="0" indent="0" algn="ctr" rtl="0">
+              <a:lnSpc>
+                <a:spcPct val="100000"/>
+              </a:lnSpc>
+              <a:spcBef>
+                <a:spcPts val="0"/>
+              </a:spcBef>
+              <a:spcAft>
+                <a:spcPts val="0"/>
+              </a:spcAft>
+              <a:buClr>
+                <a:srgbClr val="000000"/>
+              </a:buClr>
+              <a:buSzPts val="11200"/>
+              <a:buFont typeface="Helvetica Neue"/>
+              <a:buNone/>
+            </a:pPr>
+            <a:r>
+              <a:rPr lang="en-US" sz="7200" b="0" i="0" u="none" strike="noStrike" cap="none" dirty="0">
+                <a:solidFill>
+                  <a:srgbClr val="000000"/>
+                </a:solidFill>
+                <a:latin typeface="+mn-lt"/>
+                <a:ea typeface="Helvetica Neue"/>
+                <a:cs typeface="Helvetica Neue"/>
+                <a:sym typeface="Helvetica Neue"/>
+              </a:rPr>
+              <a:t>4. Merge into main</a:t>
+            </a:r>
+            <a:endParaRPr sz="7200" dirty="0">
+              <a:latin typeface="+mn-lt"/>
+            </a:endParaRPr>
+          </a:p>
+        </p:txBody>
+      </p:sp>
+      <p:sp>
+        <p:nvSpPr>
+          <p:cNvPr id="199" name="Google Shape;199;p13"/>
+          <p:cNvSpPr/>
+          <p:nvPr/>
+        </p:nvSpPr>
+        <p:spPr>
+          <a:xfrm>
+            <a:off x="14670332" y="10583134"/>
+            <a:ext cx="7146925" cy="1719842"/>
+          </a:xfrm>
+          <a:prstGeom prst="rect">
+            <a:avLst/>
+          </a:prstGeom>
+          <a:solidFill>
+            <a:srgbClr val="F5F5F5"/>
+          </a:solidFill>
+          <a:ln>
+            <a:noFill/>
+          </a:ln>
+        </p:spPr>
+        <p:txBody>
+          <a:bodyPr spcFirstLastPara="1" wrap="square" lIns="0" tIns="0" rIns="0" bIns="0" anchor="ctr" anchorCtr="0">
+            <a:noAutofit/>
+          </a:bodyPr>
+          <a:lstStyle/>
+          <a:p>
+            <a:pPr marL="0" marR="0" lvl="0" indent="0" algn="ctr" rtl="0">
+              <a:lnSpc>
+                <a:spcPct val="100000"/>
+              </a:lnSpc>
+              <a:spcBef>
+                <a:spcPts val="0"/>
+              </a:spcBef>
+              <a:spcAft>
+                <a:spcPts val="0"/>
+              </a:spcAft>
+              <a:buClr>
+                <a:srgbClr val="FFFFFF"/>
+              </a:buClr>
+              <a:buSzPts val="3200"/>
+              <a:buFont typeface="Helvetica Neue"/>
+              <a:buNone/>
+            </a:pPr>
+            <a:endParaRPr sz="3200" b="0" i="0" u="none" strike="noStrike" cap="none">
+              <a:solidFill>
+                <a:srgbClr val="FFFFFF"/>
+              </a:solidFill>
+              <a:latin typeface="Helvetica Neue"/>
+              <a:ea typeface="Helvetica Neue"/>
+              <a:cs typeface="Helvetica Neue"/>
+              <a:sym typeface="Helvetica Neue"/>
+            </a:endParaRPr>
+          </a:p>
+        </p:txBody>
+      </p:sp>
+      <p:sp>
+        <p:nvSpPr>
+          <p:cNvPr id="200" name="Google Shape;200;p13"/>
+          <p:cNvSpPr/>
+          <p:nvPr/>
+        </p:nvSpPr>
+        <p:spPr>
+          <a:xfrm>
+            <a:off x="8956802" y="5734935"/>
+            <a:ext cx="2729938" cy="2246130"/>
+          </a:xfrm>
+          <a:prstGeom prst="rect">
+            <a:avLst/>
+          </a:prstGeom>
+          <a:solidFill>
+            <a:srgbClr val="F5F5F5"/>
+          </a:solidFill>
+          <a:ln>
+            <a:noFill/>
+          </a:ln>
+        </p:spPr>
+        <p:txBody>
+          <a:bodyPr spcFirstLastPara="1" wrap="square" lIns="0" tIns="0" rIns="0" bIns="0" anchor="ctr" anchorCtr="0">
+            <a:noAutofit/>
+          </a:bodyPr>
+          <a:lstStyle/>
+          <a:p>
+            <a:pPr marL="0" marR="0" lvl="0" indent="0" algn="ctr" rtl="0">
+              <a:lnSpc>
+                <a:spcPct val="100000"/>
+              </a:lnSpc>
+              <a:spcBef>
+                <a:spcPts val="0"/>
+              </a:spcBef>
+              <a:spcAft>
+                <a:spcPts val="0"/>
+              </a:spcAft>
+              <a:buClr>
+                <a:srgbClr val="FFFFFF"/>
+              </a:buClr>
+              <a:buSzPts val="3200"/>
+              <a:buFont typeface="Helvetica Neue"/>
+              <a:buNone/>
+            </a:pPr>
+            <a:endParaRPr sz="3200" b="0" i="0" u="none" strike="noStrike" cap="none">
+              <a:solidFill>
+                <a:srgbClr val="FFFFFF"/>
+              </a:solidFill>
+              <a:latin typeface="Helvetica Neue"/>
+              <a:ea typeface="Helvetica Neue"/>
+              <a:cs typeface="Helvetica Neue"/>
+              <a:sym typeface="Helvetica Neue"/>
+            </a:endParaRPr>
+          </a:p>
+        </p:txBody>
+      </p:sp>
+      <p:sp>
+        <p:nvSpPr>
+          <p:cNvPr id="203" name="Google Shape;203;p13"/>
+          <p:cNvSpPr txBox="1"/>
+          <p:nvPr/>
+        </p:nvSpPr>
+        <p:spPr>
+          <a:xfrm>
+            <a:off x="3506109" y="3215894"/>
+            <a:ext cx="1264921" cy="548134"/>
+          </a:xfrm>
+          <a:prstGeom prst="rect">
+            <a:avLst/>
+          </a:prstGeom>
+          <a:solidFill>
+            <a:srgbClr val="B3E3FF"/>
+          </a:solidFill>
+          <a:ln>
+            <a:noFill/>
+          </a:ln>
+        </p:spPr>
+        <p:txBody>
+          <a:bodyPr spcFirstLastPara="1" wrap="square" lIns="50800" tIns="50800" rIns="50800" bIns="50800" anchor="ctr" anchorCtr="0">
+            <a:spAutoFit/>
+          </a:bodyPr>
+          <a:lstStyle/>
+          <a:p>
+            <a:pPr marL="0" marR="0" lvl="0" indent="0" algn="ctr" rtl="0">
+              <a:lnSpc>
+                <a:spcPct val="100000"/>
+              </a:lnSpc>
+              <a:spcBef>
+                <a:spcPts val="0"/>
+              </a:spcBef>
+              <a:spcAft>
+                <a:spcPts val="0"/>
+              </a:spcAft>
+              <a:buClr>
+                <a:srgbClr val="000000"/>
+              </a:buClr>
+              <a:buSzPts val="3000"/>
+              <a:buFont typeface="Helvetica Neue"/>
+              <a:buNone/>
+            </a:pPr>
+            <a:r>
+              <a:rPr lang="en-US" sz="3000" b="0" i="0" u="none" strike="noStrike" cap="none" dirty="0">
+                <a:solidFill>
+                  <a:srgbClr val="000000"/>
+                </a:solidFill>
+                <a:latin typeface="Helvetica Neue"/>
+                <a:ea typeface="Helvetica Neue"/>
+                <a:cs typeface="Helvetica Neue"/>
+                <a:sym typeface="Helvetica Neue"/>
+              </a:rPr>
+              <a:t>Main   </a:t>
+            </a:r>
+            <a:endParaRPr dirty="0"/>
+          </a:p>
+        </p:txBody>
+      </p:sp>
+      <p:sp>
+        <p:nvSpPr>
+          <p:cNvPr id="10" name="Rectangle 9">
+            <a:extLst>
+              <a:ext uri="{FF2B5EF4-FFF2-40B4-BE49-F238E27FC236}">
+                <a16:creationId xmlns:a16="http://schemas.microsoft.com/office/drawing/2014/main" id="{51F4AA09-C08B-5848-8FB7-C74D7A5FCF27}"/>
+              </a:ext>
+            </a:extLst>
+          </p:cNvPr>
+          <p:cNvSpPr/>
+          <p:nvPr/>
+        </p:nvSpPr>
+        <p:spPr>
+          <a:xfrm>
+            <a:off x="3029288" y="10428456"/>
+            <a:ext cx="5601761" cy="1874519"/>
+          </a:xfrm>
+          <a:prstGeom prst="rect">
+            <a:avLst/>
+          </a:prstGeom>
+          <a:solidFill>
+            <a:srgbClr val="F5F5F5"/>
+          </a:solidFill>
+          <a:ln>
+            <a:noFill/>
+          </a:ln>
+        </p:spPr>
+        <p:style>
+          <a:lnRef idx="2">
+            <a:schemeClr val="accent1">
+              <a:shade val="50000"/>
+            </a:schemeClr>
+          </a:lnRef>
+          <a:fillRef idx="1">
+            <a:schemeClr val="accent1"/>
+          </a:fillRef>
+          <a:effectRef idx="0">
+            <a:schemeClr val="accent1"/>
+          </a:effectRef>
+          <a:fontRef idx="minor">
+            <a:schemeClr val="lt1"/>
+          </a:fontRef>
+        </p:style>
+        <p:txBody>
+          <a:bodyPr rtlCol="0" anchor="ctr"/>
+          <a:lstStyle/>
+          <a:p>
+            <a:pPr algn="ctr"/>
+            <a:endParaRPr lang="en-US" dirty="0"/>
+          </a:p>
+        </p:txBody>
+      </p:sp>
+      <p:sp>
+        <p:nvSpPr>
+          <p:cNvPr id="11" name="Rectangle 10">
+            <a:extLst>
+              <a:ext uri="{FF2B5EF4-FFF2-40B4-BE49-F238E27FC236}">
+                <a16:creationId xmlns:a16="http://schemas.microsoft.com/office/drawing/2014/main" id="{8B1407B6-8D8F-F747-98F5-D43EB86F87CE}"/>
+              </a:ext>
+            </a:extLst>
+          </p:cNvPr>
+          <p:cNvSpPr/>
+          <p:nvPr/>
+        </p:nvSpPr>
+        <p:spPr>
+          <a:xfrm>
+            <a:off x="6806307" y="8896942"/>
+            <a:ext cx="1266745" cy="1829445"/>
+          </a:xfrm>
+          <a:prstGeom prst="rect">
+            <a:avLst/>
+          </a:prstGeom>
+          <a:solidFill>
+            <a:srgbClr val="F5F5F5"/>
+          </a:solidFill>
+          <a:ln>
+            <a:noFill/>
+          </a:ln>
+        </p:spPr>
+        <p:style>
+          <a:lnRef idx="2">
+            <a:schemeClr val="accent1">
+              <a:shade val="50000"/>
+            </a:schemeClr>
+          </a:lnRef>
+          <a:fillRef idx="1">
+            <a:schemeClr val="accent1"/>
+          </a:fillRef>
+          <a:effectRef idx="0">
+            <a:schemeClr val="accent1"/>
+          </a:effectRef>
+          <a:fontRef idx="minor">
+            <a:schemeClr val="lt1"/>
+          </a:fontRef>
+        </p:style>
+        <p:txBody>
+          <a:bodyPr rtlCol="0" anchor="ctr"/>
+          <a:lstStyle/>
+          <a:p>
+            <a:pPr algn="ctr"/>
+            <a:endParaRPr lang="en-US" dirty="0"/>
+          </a:p>
+        </p:txBody>
+      </p:sp>
+      <p:cxnSp>
+        <p:nvCxnSpPr>
+          <p:cNvPr id="12" name="Straight Connector 11">
+            <a:extLst>
+              <a:ext uri="{FF2B5EF4-FFF2-40B4-BE49-F238E27FC236}">
+                <a16:creationId xmlns:a16="http://schemas.microsoft.com/office/drawing/2014/main" id="{34A23E5E-0B14-7B4F-8E65-0E8DEAF3CF45}"/>
+              </a:ext>
+            </a:extLst>
+          </p:cNvPr>
+          <p:cNvCxnSpPr>
+            <a:cxnSpLocks/>
+          </p:cNvCxnSpPr>
+          <p:nvPr/>
+        </p:nvCxnSpPr>
+        <p:spPr>
+          <a:xfrm flipH="1">
+            <a:off x="6732165" y="9984662"/>
+            <a:ext cx="1800028" cy="0"/>
+          </a:xfrm>
+          <a:prstGeom prst="line">
+            <a:avLst/>
+          </a:prstGeom>
+          <a:ln w="107950">
+            <a:solidFill>
+              <a:srgbClr val="414141"/>
+            </a:solidFill>
+          </a:ln>
+        </p:spPr>
+        <p:style>
+          <a:lnRef idx="1">
+            <a:schemeClr val="accent1"/>
+          </a:lnRef>
+          <a:fillRef idx="0">
+            <a:schemeClr val="accent1"/>
+          </a:fillRef>
+          <a:effectRef idx="0">
+            <a:schemeClr val="accent1"/>
+          </a:effectRef>
+          <a:fontRef idx="minor">
+            <a:schemeClr val="tx1"/>
+          </a:fontRef>
+        </p:style>
+      </p:cxnSp>
+      <p:sp>
+        <p:nvSpPr>
+          <p:cNvPr id="13" name="Rectangle 12">
+            <a:extLst>
+              <a:ext uri="{FF2B5EF4-FFF2-40B4-BE49-F238E27FC236}">
+                <a16:creationId xmlns:a16="http://schemas.microsoft.com/office/drawing/2014/main" id="{06577297-76D3-FA47-8F9B-15AABC1AC8D9}"/>
+              </a:ext>
+            </a:extLst>
+          </p:cNvPr>
+          <p:cNvSpPr/>
+          <p:nvPr/>
+        </p:nvSpPr>
+        <p:spPr>
+          <a:xfrm>
+            <a:off x="9688398" y="7981065"/>
+            <a:ext cx="1266745" cy="1096386"/>
+          </a:xfrm>
+          <a:prstGeom prst="rect">
+            <a:avLst/>
+          </a:prstGeom>
+          <a:solidFill>
+            <a:srgbClr val="F5F5F5"/>
+          </a:solidFill>
+          <a:ln>
+            <a:noFill/>
+          </a:ln>
+        </p:spPr>
+        <p:style>
+          <a:lnRef idx="2">
+            <a:schemeClr val="accent1">
+              <a:shade val="50000"/>
+            </a:schemeClr>
+          </a:lnRef>
+          <a:fillRef idx="1">
+            <a:schemeClr val="accent1"/>
+          </a:fillRef>
+          <a:effectRef idx="0">
+            <a:schemeClr val="accent1"/>
+          </a:effectRef>
+          <a:fontRef idx="minor">
+            <a:schemeClr val="lt1"/>
+          </a:fontRef>
+        </p:style>
+        <p:txBody>
+          <a:bodyPr rtlCol="0" anchor="ctr"/>
+          <a:lstStyle/>
+          <a:p>
+            <a:pPr algn="ctr"/>
+            <a:endParaRPr lang="en-US" dirty="0"/>
+          </a:p>
+        </p:txBody>
+      </p:sp>
+      <p:cxnSp>
+        <p:nvCxnSpPr>
+          <p:cNvPr id="14" name="Straight Connector 13">
+            <a:extLst>
+              <a:ext uri="{FF2B5EF4-FFF2-40B4-BE49-F238E27FC236}">
+                <a16:creationId xmlns:a16="http://schemas.microsoft.com/office/drawing/2014/main" id="{4FD0EBA6-9D64-8747-8299-EF34C821E23F}"/>
+              </a:ext>
+            </a:extLst>
+          </p:cNvPr>
+          <p:cNvCxnSpPr>
+            <a:cxnSpLocks/>
+          </p:cNvCxnSpPr>
+          <p:nvPr/>
+        </p:nvCxnSpPr>
+        <p:spPr>
+          <a:xfrm flipH="1">
+            <a:off x="9446470" y="8512998"/>
+            <a:ext cx="1800028" cy="0"/>
+          </a:xfrm>
+          <a:prstGeom prst="line">
+            <a:avLst/>
+          </a:prstGeom>
+          <a:ln w="107950">
+            <a:solidFill>
+              <a:srgbClr val="414141"/>
+            </a:solidFill>
+          </a:ln>
+        </p:spPr>
+        <p:style>
+          <a:lnRef idx="1">
+            <a:schemeClr val="accent1"/>
+          </a:lnRef>
+          <a:fillRef idx="0">
+            <a:schemeClr val="accent1"/>
+          </a:fillRef>
+          <a:effectRef idx="0">
+            <a:schemeClr val="accent1"/>
+          </a:effectRef>
+          <a:fontRef idx="minor">
+            <a:schemeClr val="tx1"/>
+          </a:fontRef>
+        </p:style>
+      </p:cxnSp>
+      <p:sp>
+        <p:nvSpPr>
+          <p:cNvPr id="15" name="Rectangle 14">
+            <a:extLst>
+              <a:ext uri="{FF2B5EF4-FFF2-40B4-BE49-F238E27FC236}">
+                <a16:creationId xmlns:a16="http://schemas.microsoft.com/office/drawing/2014/main" id="{E2347BE9-0939-EC4C-A0CF-BCFCDB9219B6}"/>
+              </a:ext>
+            </a:extLst>
+          </p:cNvPr>
+          <p:cNvSpPr/>
+          <p:nvPr/>
+        </p:nvSpPr>
+        <p:spPr>
+          <a:xfrm>
+            <a:off x="9713669" y="9500617"/>
+            <a:ext cx="1266745" cy="1096386"/>
+          </a:xfrm>
+          <a:prstGeom prst="rect">
+            <a:avLst/>
+          </a:prstGeom>
+          <a:solidFill>
+            <a:srgbClr val="F5F5F5"/>
+          </a:solidFill>
+          <a:ln>
+            <a:noFill/>
+          </a:ln>
+        </p:spPr>
+        <p:style>
+          <a:lnRef idx="2">
+            <a:schemeClr val="accent1">
+              <a:shade val="50000"/>
+            </a:schemeClr>
+          </a:lnRef>
+          <a:fillRef idx="1">
+            <a:schemeClr val="accent1"/>
+          </a:fillRef>
+          <a:effectRef idx="0">
+            <a:schemeClr val="accent1"/>
+          </a:effectRef>
+          <a:fontRef idx="minor">
+            <a:schemeClr val="lt1"/>
+          </a:fontRef>
+        </p:style>
+        <p:txBody>
+          <a:bodyPr rtlCol="0" anchor="ctr"/>
+          <a:lstStyle/>
+          <a:p>
+            <a:pPr algn="ctr"/>
+            <a:endParaRPr lang="en-US" dirty="0"/>
+          </a:p>
+        </p:txBody>
+      </p:sp>
+      <p:cxnSp>
+        <p:nvCxnSpPr>
+          <p:cNvPr id="16" name="Straight Connector 15">
+            <a:extLst>
+              <a:ext uri="{FF2B5EF4-FFF2-40B4-BE49-F238E27FC236}">
+                <a16:creationId xmlns:a16="http://schemas.microsoft.com/office/drawing/2014/main" id="{8E619E55-491C-5F42-92DF-0EC0D778BCB4}"/>
+              </a:ext>
+            </a:extLst>
+          </p:cNvPr>
+          <p:cNvCxnSpPr>
+            <a:cxnSpLocks/>
+          </p:cNvCxnSpPr>
+          <p:nvPr/>
+        </p:nvCxnSpPr>
+        <p:spPr>
+          <a:xfrm flipH="1">
+            <a:off x="9500014" y="9954434"/>
+            <a:ext cx="1800028" cy="0"/>
+          </a:xfrm>
+          <a:prstGeom prst="line">
+            <a:avLst/>
+          </a:prstGeom>
+          <a:ln w="107950">
+            <a:solidFill>
+              <a:srgbClr val="414141"/>
+            </a:solidFill>
+          </a:ln>
+        </p:spPr>
+        <p:style>
+          <a:lnRef idx="1">
+            <a:schemeClr val="accent1"/>
+          </a:lnRef>
+          <a:fillRef idx="0">
+            <a:schemeClr val="accent1"/>
+          </a:fillRef>
+          <a:effectRef idx="0">
+            <a:schemeClr val="accent1"/>
+          </a:effectRef>
+          <a:fontRef idx="minor">
+            <a:schemeClr val="tx1"/>
+          </a:fontRef>
+        </p:style>
+      </p:cxnSp>
+      <p:sp>
+        <p:nvSpPr>
+          <p:cNvPr id="18" name="Rectangle 17">
+            <a:extLst>
+              <a:ext uri="{FF2B5EF4-FFF2-40B4-BE49-F238E27FC236}">
+                <a16:creationId xmlns:a16="http://schemas.microsoft.com/office/drawing/2014/main" id="{1E40074E-3C11-4F4E-B750-19551E3EE30C}"/>
+              </a:ext>
+            </a:extLst>
+          </p:cNvPr>
+          <p:cNvSpPr/>
+          <p:nvPr/>
+        </p:nvSpPr>
+        <p:spPr>
+          <a:xfrm>
+            <a:off x="11762970" y="10395371"/>
+            <a:ext cx="4646803" cy="1874519"/>
+          </a:xfrm>
+          <a:prstGeom prst="rect">
+            <a:avLst/>
+          </a:prstGeom>
+          <a:solidFill>
+            <a:srgbClr val="F5F5F5"/>
+          </a:solidFill>
+          <a:ln>
+            <a:noFill/>
+          </a:ln>
+        </p:spPr>
+        <p:style>
+          <a:lnRef idx="2">
+            <a:schemeClr val="accent1">
+              <a:shade val="50000"/>
+            </a:schemeClr>
+          </a:lnRef>
+          <a:fillRef idx="1">
+            <a:schemeClr val="accent1"/>
+          </a:fillRef>
+          <a:effectRef idx="0">
+            <a:schemeClr val="accent1"/>
+          </a:effectRef>
+          <a:fontRef idx="minor">
+            <a:schemeClr val="lt1"/>
+          </a:fontRef>
+        </p:style>
+        <p:txBody>
+          <a:bodyPr rtlCol="0" anchor="ctr"/>
+          <a:lstStyle/>
+          <a:p>
+            <a:pPr algn="ctr"/>
+            <a:endParaRPr lang="en-US" dirty="0"/>
+          </a:p>
+        </p:txBody>
+      </p:sp>
+      <p:sp>
+        <p:nvSpPr>
+          <p:cNvPr id="19" name="Rectangle 18">
+            <a:extLst>
+              <a:ext uri="{FF2B5EF4-FFF2-40B4-BE49-F238E27FC236}">
+                <a16:creationId xmlns:a16="http://schemas.microsoft.com/office/drawing/2014/main" id="{39F72549-CD58-DA47-B664-DA16198CEFEE}"/>
+              </a:ext>
+            </a:extLst>
+          </p:cNvPr>
+          <p:cNvSpPr/>
+          <p:nvPr/>
+        </p:nvSpPr>
+        <p:spPr>
+          <a:xfrm>
+            <a:off x="12088018" y="10028576"/>
+            <a:ext cx="1652349" cy="1874519"/>
+          </a:xfrm>
+          <a:prstGeom prst="rect">
+            <a:avLst/>
+          </a:prstGeom>
+          <a:solidFill>
+            <a:srgbClr val="F5F5F5"/>
+          </a:solidFill>
+          <a:ln>
+            <a:noFill/>
+          </a:ln>
+        </p:spPr>
+        <p:style>
+          <a:lnRef idx="2">
+            <a:schemeClr val="accent1">
+              <a:shade val="50000"/>
+            </a:schemeClr>
+          </a:lnRef>
+          <a:fillRef idx="1">
+            <a:schemeClr val="accent1"/>
+          </a:fillRef>
+          <a:effectRef idx="0">
+            <a:schemeClr val="accent1"/>
+          </a:effectRef>
+          <a:fontRef idx="minor">
+            <a:schemeClr val="lt1"/>
+          </a:fontRef>
+        </p:style>
+        <p:txBody>
+          <a:bodyPr rtlCol="0" anchor="ctr"/>
+          <a:lstStyle/>
+          <a:p>
+            <a:pPr algn="ctr"/>
+            <a:endParaRPr lang="en-US" dirty="0"/>
+          </a:p>
+        </p:txBody>
+      </p:sp>
+      <p:sp>
+        <p:nvSpPr>
+          <p:cNvPr id="25" name="Rectangle 24">
+            <a:extLst>
+              <a:ext uri="{FF2B5EF4-FFF2-40B4-BE49-F238E27FC236}">
+                <a16:creationId xmlns:a16="http://schemas.microsoft.com/office/drawing/2014/main" id="{530E4166-F09F-234C-B97D-A7F2252828B9}"/>
+              </a:ext>
+            </a:extLst>
+          </p:cNvPr>
+          <p:cNvSpPr/>
+          <p:nvPr/>
+        </p:nvSpPr>
+        <p:spPr>
+          <a:xfrm>
+            <a:off x="12086799" y="2735613"/>
+            <a:ext cx="3532909" cy="1508695"/>
+          </a:xfrm>
+          <a:prstGeom prst="rect">
+            <a:avLst/>
+          </a:prstGeom>
+          <a:solidFill>
+            <a:srgbClr val="F5F5F5"/>
+          </a:solidFill>
+          <a:ln>
+            <a:noFill/>
+          </a:ln>
+        </p:spPr>
+        <p:style>
+          <a:lnRef idx="2">
+            <a:schemeClr val="accent1">
+              <a:shade val="50000"/>
+            </a:schemeClr>
+          </a:lnRef>
+          <a:fillRef idx="1">
+            <a:schemeClr val="accent1"/>
+          </a:fillRef>
+          <a:effectRef idx="0">
+            <a:schemeClr val="accent1"/>
+          </a:effectRef>
+          <a:fontRef idx="minor">
+            <a:schemeClr val="lt1"/>
+          </a:fontRef>
+        </p:style>
+        <p:txBody>
+          <a:bodyPr rtlCol="0" anchor="ctr"/>
+          <a:lstStyle/>
+          <a:p>
+            <a:pPr algn="ctr"/>
+            <a:endParaRPr lang="en-US" dirty="0"/>
+          </a:p>
+        </p:txBody>
+      </p:sp>
+      <p:sp>
+        <p:nvSpPr>
           <p:cNvPr id="2" name="Google Shape;101;p3">
             <a:extLst>
               <a:ext uri="{FF2B5EF4-FFF2-40B4-BE49-F238E27FC236}">
@@ -11949,7 +12836,177 @@
 </p:sld>
 </file>
 
-<file path=ppt/slides/slide11.xml><?xml version="1.0" encoding="utf-8"?>
+<file path=ppt/slides/slide12.xml><?xml version="1.0" encoding="utf-8"?>
+<p:sld xmlns:a="http://schemas.openxmlformats.org/drawingml/2006/main" xmlns:r="http://schemas.openxmlformats.org/officeDocument/2006/relationships" xmlns:p="http://schemas.openxmlformats.org/presentationml/2006/main">
+  <p:cSld>
+    <p:spTree>
+      <p:nvGrpSpPr>
+        <p:cNvPr id="1" name=""/>
+        <p:cNvGrpSpPr/>
+        <p:nvPr/>
+      </p:nvGrpSpPr>
+      <p:grpSpPr>
+        <a:xfrm>
+          <a:off x="0" y="0"/>
+          <a:ext cx="0" cy="0"/>
+          <a:chOff x="0" y="0"/>
+          <a:chExt cx="0" cy="0"/>
+        </a:xfrm>
+      </p:grpSpPr>
+      <p:sp>
+        <p:nvSpPr>
+          <p:cNvPr id="2" name="Title 1">
+            <a:extLst>
+              <a:ext uri="{FF2B5EF4-FFF2-40B4-BE49-F238E27FC236}">
+                <a16:creationId xmlns:a16="http://schemas.microsoft.com/office/drawing/2014/main" id="{1964338B-EBB9-4BE6-1F5B-1CE0955A90A3}"/>
+              </a:ext>
+            </a:extLst>
+          </p:cNvPr>
+          <p:cNvSpPr>
+            <a:spLocks noGrp="1"/>
+          </p:cNvSpPr>
+          <p:nvPr>
+            <p:ph type="title"/>
+          </p:nvPr>
+        </p:nvSpPr>
+        <p:spPr>
+          <a:xfrm>
+            <a:off x="0" y="355600"/>
+            <a:ext cx="24384000" cy="2286000"/>
+          </a:xfrm>
+        </p:spPr>
+        <p:txBody>
+          <a:bodyPr>
+            <a:normAutofit fontScale="90000"/>
+          </a:bodyPr>
+          <a:lstStyle/>
+          <a:p>
+            <a:r>
+              <a:rPr lang="en-US" dirty="0">
+                <a:latin typeface="+mn-lt"/>
+              </a:rPr>
+              <a:t>Confession: I don’t always follow </a:t>
+            </a:r>
+            <a:r>
+              <a:rPr lang="en-US" dirty="0" err="1">
+                <a:latin typeface="+mn-lt"/>
+              </a:rPr>
+              <a:t>gitflow</a:t>
+            </a:r>
+            <a:r>
+              <a:rPr lang="en-US" dirty="0">
+                <a:latin typeface="+mn-lt"/>
+              </a:rPr>
+              <a:t>.</a:t>
+            </a:r>
+          </a:p>
+        </p:txBody>
+      </p:sp>
+      <p:sp>
+        <p:nvSpPr>
+          <p:cNvPr id="3" name="Text Placeholder 2">
+            <a:extLst>
+              <a:ext uri="{FF2B5EF4-FFF2-40B4-BE49-F238E27FC236}">
+                <a16:creationId xmlns:a16="http://schemas.microsoft.com/office/drawing/2014/main" id="{E24AD662-8BBA-4892-227B-4DB86594679C}"/>
+              </a:ext>
+            </a:extLst>
+          </p:cNvPr>
+          <p:cNvSpPr>
+            <a:spLocks noGrp="1"/>
+          </p:cNvSpPr>
+          <p:nvPr>
+            <p:ph type="body" idx="1"/>
+          </p:nvPr>
+        </p:nvSpPr>
+        <p:spPr/>
+        <p:txBody>
+          <a:bodyPr/>
+          <a:lstStyle/>
+          <a:p>
+            <a:pPr marL="0" indent="0">
+              <a:buNone/>
+            </a:pPr>
+            <a:r>
+              <a:rPr lang="en-US" dirty="0">
+                <a:latin typeface="+mn-lt"/>
+              </a:rPr>
+              <a:t>I tend not to make a “develop” branch unless I expect a lot of changes to happen at once.</a:t>
+            </a:r>
+          </a:p>
+          <a:p>
+            <a:pPr marL="0" indent="0">
+              <a:buNone/>
+            </a:pPr>
+            <a:r>
+              <a:rPr lang="en-US" dirty="0">
+                <a:latin typeface="+mn-lt"/>
+              </a:rPr>
+              <a:t>I did use a develop branch:</a:t>
+            </a:r>
+          </a:p>
+          <a:p>
+            <a:pPr marL="685800" indent="-685800">
+              <a:buFontTx/>
+              <a:buChar char="-"/>
+            </a:pPr>
+            <a:r>
+              <a:rPr lang="en-US" dirty="0">
+                <a:latin typeface="+mn-lt"/>
+              </a:rPr>
+              <a:t>Just before releasing major new versions (v2.0.0, v3.0.0).</a:t>
+            </a:r>
+          </a:p>
+          <a:p>
+            <a:pPr marL="685800" indent="-685800">
+              <a:buFontTx/>
+              <a:buChar char="-"/>
+            </a:pPr>
+            <a:r>
+              <a:rPr lang="en-US" dirty="0">
+                <a:latin typeface="+mn-lt"/>
+              </a:rPr>
+              <a:t>When working on industry code.</a:t>
+            </a:r>
+          </a:p>
+          <a:p>
+            <a:pPr marL="0" indent="0">
+              <a:buNone/>
+            </a:pPr>
+            <a:r>
+              <a:rPr lang="en-US" dirty="0">
+                <a:latin typeface="+mn-lt"/>
+              </a:rPr>
+              <a:t>Each developer will follow their own flavor of </a:t>
+            </a:r>
+            <a:r>
+              <a:rPr lang="en-US" dirty="0" err="1">
+                <a:latin typeface="+mn-lt"/>
+              </a:rPr>
+              <a:t>gitflow</a:t>
+            </a:r>
+            <a:r>
+              <a:rPr lang="en-US" dirty="0">
+                <a:latin typeface="+mn-lt"/>
+              </a:rPr>
+              <a:t>. </a:t>
+            </a:r>
+          </a:p>
+        </p:txBody>
+      </p:sp>
+    </p:spTree>
+    <p:extLst>
+      <p:ext uri="{BB962C8B-B14F-4D97-AF65-F5344CB8AC3E}">
+        <p14:creationId xmlns:p14="http://schemas.microsoft.com/office/powerpoint/2010/main" val="1763438234"/>
+      </p:ext>
+    </p:extLst>
+  </p:cSld>
+  <p:clrMapOvr>
+    <a:masterClrMapping/>
+  </p:clrMapOvr>
+</p:sld>
+</file>
+
+<file path=ppt/slides/slide13.xml><?xml version="1.0" encoding="utf-8"?>
 <p:sld xmlns:a="http://schemas.openxmlformats.org/drawingml/2006/main" xmlns:r="http://schemas.openxmlformats.org/officeDocument/2006/relationships" xmlns:p="http://schemas.openxmlformats.org/presentationml/2006/main">
   <p:cSld>
     <p:spTree>
@@ -12151,7 +13208,7 @@
 </p:sld>
 </file>
 
-<file path=ppt/slides/slide12.xml><?xml version="1.0" encoding="utf-8"?>
+<file path=ppt/slides/slide14.xml><?xml version="1.0" encoding="utf-8"?>
 <p:sld xmlns:a="http://schemas.openxmlformats.org/drawingml/2006/main" xmlns:r="http://schemas.openxmlformats.org/officeDocument/2006/relationships" xmlns:p="http://schemas.openxmlformats.org/presentationml/2006/main">
   <p:cSld>
     <p:spTree>
@@ -12378,7 +13435,7 @@
 </p:sld>
 </file>
 
-<file path=ppt/slides/slide13.xml><?xml version="1.0" encoding="utf-8"?>
+<file path=ppt/slides/slide15.xml><?xml version="1.0" encoding="utf-8"?>
 <p:sld xmlns:a="http://schemas.openxmlformats.org/drawingml/2006/main" xmlns:r="http://schemas.openxmlformats.org/officeDocument/2006/relationships" xmlns:p="http://schemas.openxmlformats.org/presentationml/2006/main">
   <p:cSld>
     <p:spTree>
@@ -12461,7 +13518,7 @@
         </p:nvSpPr>
         <p:spPr>
           <a:xfrm>
-            <a:off x="1676399" y="3651250"/>
+            <a:off x="1676399" y="3226709"/>
             <a:ext cx="22326601" cy="8702676"/>
           </a:xfrm>
           <a:prstGeom prst="rect">
@@ -12839,8 +13896,8 @@
         </p:nvSpPr>
         <p:spPr>
           <a:xfrm>
-            <a:off x="3552403" y="12766675"/>
-            <a:ext cx="18012870" cy="677028"/>
+            <a:off x="0" y="12603390"/>
+            <a:ext cx="25117676" cy="1046360"/>
           </a:xfrm>
           <a:prstGeom prst="rect">
             <a:avLst/>
@@ -12867,7 +13924,46 @@
                 <a:cs typeface="Calibri"/>
                 <a:sym typeface="Calibri"/>
               </a:rPr>
-              <a:t>There are a lot of “Git cheat sheets” online if you want a summary of more commands!</a:t>
+              <a:t>There are a lot of “Git cheat sheets” online if you want a summary of more commands! Here’s the one I have bookmarked:</a:t>
+            </a:r>
+          </a:p>
+          <a:p>
+            <a:pPr algn="ctr"/>
+            <a:r>
+              <a:rPr lang="en-US" sz="2400" dirty="0">
+                <a:latin typeface="+mn-lt"/>
+              </a:rPr>
+              <a:t>https://</a:t>
+            </a:r>
+            <a:r>
+              <a:rPr lang="en-US" sz="2400" dirty="0" err="1">
+                <a:latin typeface="+mn-lt"/>
+              </a:rPr>
+              <a:t>training.github.com</a:t>
+            </a:r>
+            <a:r>
+              <a:rPr lang="en-US" sz="2400" dirty="0">
+                <a:latin typeface="+mn-lt"/>
+              </a:rPr>
+              <a:t>/downloads/</a:t>
+            </a:r>
+            <a:r>
+              <a:rPr lang="en-US" sz="2400" dirty="0" err="1">
+                <a:latin typeface="+mn-lt"/>
+              </a:rPr>
+              <a:t>github</a:t>
+            </a:r>
+            <a:r>
+              <a:rPr lang="en-US" sz="2400" dirty="0">
+                <a:latin typeface="+mn-lt"/>
+              </a:rPr>
+              <a:t>-git-cheat-</a:t>
+            </a:r>
+            <a:r>
+              <a:rPr lang="en-US" sz="2400" dirty="0" err="1">
+                <a:latin typeface="+mn-lt"/>
+              </a:rPr>
+              <a:t>sheet.pdf</a:t>
             </a:r>
             <a:endParaRPr sz="2400" dirty="0">
               <a:latin typeface="+mn-lt"/>
@@ -12888,295 +13984,7 @@
 </p:sld>
 </file>
 
-<file path=ppt/slides/slide14.xml><?xml version="1.0" encoding="utf-8"?>
-<p:sld xmlns:a="http://schemas.openxmlformats.org/drawingml/2006/main" xmlns:r="http://schemas.openxmlformats.org/officeDocument/2006/relationships" xmlns:p="http://schemas.openxmlformats.org/presentationml/2006/main">
-  <p:cSld>
-    <p:spTree>
-      <p:nvGrpSpPr>
-        <p:cNvPr id="1" name="Shape 106"/>
-        <p:cNvGrpSpPr/>
-        <p:nvPr/>
-      </p:nvGrpSpPr>
-      <p:grpSpPr>
-        <a:xfrm>
-          <a:off x="0" y="0"/>
-          <a:ext cx="0" cy="0"/>
-          <a:chOff x="0" y="0"/>
-          <a:chExt cx="0" cy="0"/>
-        </a:xfrm>
-      </p:grpSpPr>
-      <p:sp>
-        <p:nvSpPr>
-          <p:cNvPr id="107" name="Google Shape;107;g1347d530a7d_1_0"/>
-          <p:cNvSpPr txBox="1">
-            <a:spLocks noGrp="1"/>
-          </p:cNvSpPr>
-          <p:nvPr>
-            <p:ph type="title"/>
-          </p:nvPr>
-        </p:nvSpPr>
-        <p:spPr>
-          <a:xfrm>
-            <a:off x="1689100" y="355600"/>
-            <a:ext cx="21005700" cy="2286000"/>
-          </a:xfrm>
-          <a:prstGeom prst="rect">
-            <a:avLst/>
-          </a:prstGeom>
-        </p:spPr>
-        <p:txBody>
-          <a:bodyPr spcFirstLastPara="1" wrap="square" lIns="50800" tIns="50800" rIns="50800" bIns="50800" anchor="ctr" anchorCtr="0">
-            <a:normAutofit/>
-          </a:bodyPr>
-          <a:lstStyle/>
-          <a:p>
-            <a:pPr marL="0" lvl="0" indent="0" algn="ctr" rtl="0">
-              <a:spcBef>
-                <a:spcPts val="0"/>
-              </a:spcBef>
-              <a:spcAft>
-                <a:spcPts val="0"/>
-              </a:spcAft>
-              <a:buNone/>
-            </a:pPr>
-            <a:r>
-              <a:rPr lang="en-US" dirty="0">
-                <a:latin typeface="+mn-lt"/>
-              </a:rPr>
-              <a:t>Class-sourced Vocabulary List</a:t>
-            </a:r>
-            <a:endParaRPr dirty="0">
-              <a:latin typeface="+mn-lt"/>
-            </a:endParaRPr>
-          </a:p>
-        </p:txBody>
-      </p:sp>
-      <p:sp>
-        <p:nvSpPr>
-          <p:cNvPr id="108" name="Google Shape;108;g1347d530a7d_1_0"/>
-          <p:cNvSpPr txBox="1">
-            <a:spLocks noGrp="1"/>
-          </p:cNvSpPr>
-          <p:nvPr>
-            <p:ph type="body" idx="1"/>
-          </p:nvPr>
-        </p:nvSpPr>
-        <p:spPr>
-          <a:xfrm>
-            <a:off x="1689150" y="2641600"/>
-            <a:ext cx="21005700" cy="9296400"/>
-          </a:xfrm>
-          <a:prstGeom prst="rect">
-            <a:avLst/>
-          </a:prstGeom>
-        </p:spPr>
-        <p:txBody>
-          <a:bodyPr spcFirstLastPara="1" wrap="square" lIns="50800" tIns="50800" rIns="50800" bIns="50800" anchor="ctr" anchorCtr="0">
-            <a:normAutofit fontScale="92500" lnSpcReduction="20000"/>
-          </a:bodyPr>
-          <a:lstStyle/>
-          <a:p>
-            <a:pPr marL="457200" lvl="0" indent="-609600" algn="l" rtl="0">
-              <a:spcBef>
-                <a:spcPts val="5900"/>
-              </a:spcBef>
-              <a:spcAft>
-                <a:spcPts val="0"/>
-              </a:spcAft>
-              <a:buSzPts val="6000"/>
-              <a:buChar char="•"/>
-            </a:pPr>
-            <a:r>
-              <a:rPr lang="en-US" dirty="0">
-                <a:latin typeface="+mn-lt"/>
-              </a:rPr>
-              <a:t>Git: </a:t>
-            </a:r>
-          </a:p>
-          <a:p>
-            <a:pPr marL="457200" lvl="0" indent="-609600" algn="l" rtl="0">
-              <a:spcBef>
-                <a:spcPts val="5900"/>
-              </a:spcBef>
-              <a:spcAft>
-                <a:spcPts val="0"/>
-              </a:spcAft>
-              <a:buSzPts val="6000"/>
-              <a:buChar char="•"/>
-            </a:pPr>
-            <a:r>
-              <a:rPr lang="en-US" dirty="0">
-                <a:latin typeface="+mn-lt"/>
-              </a:rPr>
-              <a:t>GitHub: </a:t>
-            </a:r>
-          </a:p>
-          <a:p>
-            <a:pPr marL="457200" lvl="0" indent="-609600" algn="l" rtl="0">
-              <a:spcBef>
-                <a:spcPts val="5900"/>
-              </a:spcBef>
-              <a:spcAft>
-                <a:spcPts val="0"/>
-              </a:spcAft>
-              <a:buSzPts val="6000"/>
-              <a:buChar char="•"/>
-            </a:pPr>
-            <a:r>
-              <a:rPr lang="en-US" dirty="0">
-                <a:solidFill>
-                  <a:schemeClr val="dk1"/>
-                </a:solidFill>
-                <a:latin typeface="+mn-lt"/>
-              </a:rPr>
-              <a:t>source control: </a:t>
-            </a:r>
-          </a:p>
-          <a:p>
-            <a:pPr marL="457200" lvl="0" indent="-609600" algn="l" rtl="0">
-              <a:spcBef>
-                <a:spcPts val="5900"/>
-              </a:spcBef>
-              <a:spcAft>
-                <a:spcPts val="0"/>
-              </a:spcAft>
-              <a:buSzPts val="6000"/>
-              <a:buChar char="•"/>
-            </a:pPr>
-            <a:r>
-              <a:rPr lang="en-US" dirty="0">
-                <a:latin typeface="+mn-lt"/>
-              </a:rPr>
-              <a:t>repo (short for “repository”): </a:t>
-            </a:r>
-          </a:p>
-          <a:p>
-            <a:pPr marL="457200" lvl="0" indent="-609600" algn="l" rtl="0">
-              <a:spcBef>
-                <a:spcPts val="5900"/>
-              </a:spcBef>
-              <a:spcAft>
-                <a:spcPts val="0"/>
-              </a:spcAft>
-              <a:buSzPts val="6000"/>
-              <a:buChar char="•"/>
-            </a:pPr>
-            <a:r>
-              <a:rPr lang="en-US" dirty="0">
-                <a:solidFill>
-                  <a:schemeClr val="dk1"/>
-                </a:solidFill>
-                <a:latin typeface="+mn-lt"/>
-              </a:rPr>
-              <a:t>commit: </a:t>
-            </a:r>
-          </a:p>
-          <a:p>
-            <a:pPr marL="457200" lvl="0" indent="-609600" algn="l" rtl="0">
-              <a:spcBef>
-                <a:spcPts val="5900"/>
-              </a:spcBef>
-              <a:spcAft>
-                <a:spcPts val="0"/>
-              </a:spcAft>
-              <a:buSzPts val="6000"/>
-              <a:buChar char="•"/>
-            </a:pPr>
-            <a:r>
-              <a:rPr lang="en-US" dirty="0">
-                <a:latin typeface="+mn-lt"/>
-              </a:rPr>
-              <a:t>branch: </a:t>
-            </a:r>
-          </a:p>
-          <a:p>
-            <a:pPr marL="457200" lvl="0" indent="-609600" algn="l" rtl="0">
-              <a:spcBef>
-                <a:spcPts val="5900"/>
-              </a:spcBef>
-              <a:spcAft>
-                <a:spcPts val="0"/>
-              </a:spcAft>
-              <a:buSzPts val="6000"/>
-              <a:buChar char="•"/>
-            </a:pPr>
-            <a:r>
-              <a:rPr lang="en-US" dirty="0">
-                <a:latin typeface="+mn-lt"/>
-              </a:rPr>
-              <a:t>clone:</a:t>
-            </a:r>
-          </a:p>
-        </p:txBody>
-      </p:sp>
-      <p:sp>
-        <p:nvSpPr>
-          <p:cNvPr id="110" name="Google Shape;110;g1347d530a7d_1_0"/>
-          <p:cNvSpPr txBox="1"/>
-          <p:nvPr/>
-        </p:nvSpPr>
-        <p:spPr>
-          <a:xfrm>
-            <a:off x="19701035" y="12896087"/>
-            <a:ext cx="4667725" cy="738633"/>
-          </a:xfrm>
-          <a:prstGeom prst="rect">
-            <a:avLst/>
-          </a:prstGeom>
-          <a:noFill/>
-          <a:ln w="9525" cap="flat" cmpd="sng">
-            <a:solidFill>
-              <a:schemeClr val="dk1"/>
-            </a:solidFill>
-            <a:prstDash val="solid"/>
-            <a:round/>
-            <a:headEnd type="none" w="sm" len="sm"/>
-            <a:tailEnd type="none" w="sm" len="sm"/>
-          </a:ln>
-        </p:spPr>
-        <p:txBody>
-          <a:bodyPr spcFirstLastPara="1" wrap="square" lIns="91425" tIns="91425" rIns="91425" bIns="91425" anchor="t" anchorCtr="0">
-            <a:spAutoFit/>
-          </a:bodyPr>
-          <a:lstStyle/>
-          <a:p>
-            <a:pPr marL="0" lvl="0" indent="0" algn="ctr" rtl="0">
-              <a:spcBef>
-                <a:spcPts val="0"/>
-              </a:spcBef>
-              <a:spcAft>
-                <a:spcPts val="0"/>
-              </a:spcAft>
-              <a:buNone/>
-            </a:pPr>
-            <a:r>
-              <a:rPr lang="en-US" sz="3600" u="sng" dirty="0">
-                <a:latin typeface="Helvetica Neue"/>
-                <a:ea typeface="Helvetica Neue"/>
-                <a:cs typeface="Helvetica Neue"/>
-                <a:sym typeface="Helvetica Neue"/>
-                <a:hlinkClick r:id="rId3"/>
-              </a:rPr>
-              <a:t>Code/Astro vocab list</a:t>
-            </a:r>
-            <a:endParaRPr sz="3600" dirty="0">
-              <a:latin typeface="Helvetica Neue"/>
-              <a:ea typeface="Helvetica Neue"/>
-              <a:cs typeface="Helvetica Neue"/>
-              <a:sym typeface="Helvetica Neue"/>
-            </a:endParaRPr>
-          </a:p>
-        </p:txBody>
-      </p:sp>
-    </p:spTree>
-  </p:cSld>
-  <p:clrMapOvr>
-    <a:masterClrMapping/>
-  </p:clrMapOvr>
-</p:sld>
-</file>
-
-<file path=ppt/slides/slide15.xml><?xml version="1.0" encoding="utf-8"?>
+<file path=ppt/slides/slide16.xml><?xml version="1.0" encoding="utf-8"?>
 <p:sld xmlns:a="http://schemas.openxmlformats.org/drawingml/2006/main" xmlns:r="http://schemas.openxmlformats.org/officeDocument/2006/relationships" xmlns:p="http://schemas.openxmlformats.org/presentationml/2006/main">
   <p:cSld>
     <p:spTree>
@@ -13789,6 +14597,617 @@
   <p:cSld>
     <p:spTree>
       <p:nvGrpSpPr>
+        <p:cNvPr id="1" name="Shape 106"/>
+        <p:cNvGrpSpPr/>
+        <p:nvPr/>
+      </p:nvGrpSpPr>
+      <p:grpSpPr>
+        <a:xfrm>
+          <a:off x="0" y="0"/>
+          <a:ext cx="0" cy="0"/>
+          <a:chOff x="0" y="0"/>
+          <a:chExt cx="0" cy="0"/>
+        </a:xfrm>
+      </p:grpSpPr>
+      <p:sp>
+        <p:nvSpPr>
+          <p:cNvPr id="107" name="Google Shape;107;g1347d530a7d_1_0"/>
+          <p:cNvSpPr txBox="1">
+            <a:spLocks noGrp="1"/>
+          </p:cNvSpPr>
+          <p:nvPr>
+            <p:ph type="title"/>
+          </p:nvPr>
+        </p:nvSpPr>
+        <p:spPr>
+          <a:xfrm>
+            <a:off x="1689100" y="355600"/>
+            <a:ext cx="21005700" cy="2286000"/>
+          </a:xfrm>
+          <a:prstGeom prst="rect">
+            <a:avLst/>
+          </a:prstGeom>
+        </p:spPr>
+        <p:txBody>
+          <a:bodyPr spcFirstLastPara="1" wrap="square" lIns="50800" tIns="50800" rIns="50800" bIns="50800" anchor="ctr" anchorCtr="0">
+            <a:normAutofit/>
+          </a:bodyPr>
+          <a:lstStyle/>
+          <a:p>
+            <a:pPr marL="0" lvl="0" indent="0" algn="ctr" rtl="0">
+              <a:spcBef>
+                <a:spcPts val="0"/>
+              </a:spcBef>
+              <a:spcAft>
+                <a:spcPts val="0"/>
+              </a:spcAft>
+              <a:buNone/>
+            </a:pPr>
+            <a:r>
+              <a:rPr lang="en-US" dirty="0">
+                <a:latin typeface="+mn-lt"/>
+              </a:rPr>
+              <a:t>Class-sourced Vocabulary List</a:t>
+            </a:r>
+            <a:endParaRPr dirty="0">
+              <a:latin typeface="+mn-lt"/>
+            </a:endParaRPr>
+          </a:p>
+        </p:txBody>
+      </p:sp>
+      <p:sp>
+        <p:nvSpPr>
+          <p:cNvPr id="108" name="Google Shape;108;g1347d530a7d_1_0"/>
+          <p:cNvSpPr txBox="1">
+            <a:spLocks noGrp="1"/>
+          </p:cNvSpPr>
+          <p:nvPr>
+            <p:ph type="body" idx="1"/>
+          </p:nvPr>
+        </p:nvSpPr>
+        <p:spPr>
+          <a:xfrm>
+            <a:off x="236525" y="2641600"/>
+            <a:ext cx="21005700" cy="9296400"/>
+          </a:xfrm>
+          <a:prstGeom prst="rect">
+            <a:avLst/>
+          </a:prstGeom>
+        </p:spPr>
+        <p:txBody>
+          <a:bodyPr spcFirstLastPara="1" wrap="square" lIns="50800" tIns="50800" rIns="50800" bIns="50800" anchor="ctr" anchorCtr="0">
+            <a:normAutofit fontScale="92500" lnSpcReduction="20000"/>
+          </a:bodyPr>
+          <a:lstStyle/>
+          <a:p>
+            <a:pPr marL="0" lvl="0" indent="0" algn="l" rtl="0">
+              <a:spcBef>
+                <a:spcPts val="5900"/>
+              </a:spcBef>
+              <a:spcAft>
+                <a:spcPts val="0"/>
+              </a:spcAft>
+              <a:buSzPts val="6000"/>
+              <a:buNone/>
+            </a:pPr>
+            <a:r>
+              <a:rPr lang="en-US" dirty="0">
+                <a:latin typeface="+mn-lt"/>
+              </a:rPr>
+              <a:t>A: Git: </a:t>
+            </a:r>
+          </a:p>
+          <a:p>
+            <a:pPr marL="0" lvl="0" indent="0" algn="l" rtl="0">
+              <a:spcBef>
+                <a:spcPts val="5900"/>
+              </a:spcBef>
+              <a:spcAft>
+                <a:spcPts val="0"/>
+              </a:spcAft>
+              <a:buSzPts val="6000"/>
+              <a:buNone/>
+            </a:pPr>
+            <a:r>
+              <a:rPr lang="en-US" dirty="0">
+                <a:latin typeface="+mn-lt"/>
+              </a:rPr>
+              <a:t>B: GitHub: </a:t>
+            </a:r>
+          </a:p>
+          <a:p>
+            <a:pPr marL="0" lvl="0" indent="0" algn="l" rtl="0">
+              <a:spcBef>
+                <a:spcPts val="5900"/>
+              </a:spcBef>
+              <a:spcAft>
+                <a:spcPts val="0"/>
+              </a:spcAft>
+              <a:buSzPts val="6000"/>
+              <a:buNone/>
+            </a:pPr>
+            <a:r>
+              <a:rPr lang="en-US" dirty="0">
+                <a:solidFill>
+                  <a:schemeClr val="dk1"/>
+                </a:solidFill>
+                <a:latin typeface="+mn-lt"/>
+              </a:rPr>
+              <a:t>C: source control: </a:t>
+            </a:r>
+          </a:p>
+          <a:p>
+            <a:pPr marL="0" lvl="0" indent="0" algn="l" rtl="0">
+              <a:spcBef>
+                <a:spcPts val="5900"/>
+              </a:spcBef>
+              <a:spcAft>
+                <a:spcPts val="0"/>
+              </a:spcAft>
+              <a:buSzPts val="6000"/>
+              <a:buNone/>
+            </a:pPr>
+            <a:r>
+              <a:rPr lang="en-US" dirty="0">
+                <a:latin typeface="+mn-lt"/>
+              </a:rPr>
+              <a:t>D: repository (AKA “repo”): </a:t>
+            </a:r>
+          </a:p>
+          <a:p>
+            <a:pPr marL="0" lvl="0" indent="0" algn="l" rtl="0">
+              <a:spcBef>
+                <a:spcPts val="5900"/>
+              </a:spcBef>
+              <a:spcAft>
+                <a:spcPts val="0"/>
+              </a:spcAft>
+              <a:buSzPts val="6000"/>
+              <a:buNone/>
+            </a:pPr>
+            <a:r>
+              <a:rPr lang="en-US" dirty="0">
+                <a:solidFill>
+                  <a:schemeClr val="dk1"/>
+                </a:solidFill>
+                <a:latin typeface="+mn-lt"/>
+              </a:rPr>
+              <a:t>E: commit: </a:t>
+            </a:r>
+          </a:p>
+          <a:p>
+            <a:pPr marL="0" lvl="0" indent="0" algn="l" rtl="0">
+              <a:spcBef>
+                <a:spcPts val="5900"/>
+              </a:spcBef>
+              <a:spcAft>
+                <a:spcPts val="0"/>
+              </a:spcAft>
+              <a:buSzPts val="6000"/>
+              <a:buNone/>
+            </a:pPr>
+            <a:r>
+              <a:rPr lang="en-US" dirty="0">
+                <a:latin typeface="+mn-lt"/>
+              </a:rPr>
+              <a:t>F: branch: </a:t>
+            </a:r>
+          </a:p>
+          <a:p>
+            <a:pPr marL="0" lvl="0" indent="0" algn="l" rtl="0">
+              <a:spcBef>
+                <a:spcPts val="5900"/>
+              </a:spcBef>
+              <a:spcAft>
+                <a:spcPts val="0"/>
+              </a:spcAft>
+              <a:buSzPts val="6000"/>
+              <a:buNone/>
+            </a:pPr>
+            <a:r>
+              <a:rPr lang="en-US" dirty="0">
+                <a:latin typeface="+mn-lt"/>
+              </a:rPr>
+              <a:t>G: clone:</a:t>
+            </a:r>
+          </a:p>
+        </p:txBody>
+      </p:sp>
+      <p:sp>
+        <p:nvSpPr>
+          <p:cNvPr id="110" name="Google Shape;110;g1347d530a7d_1_0"/>
+          <p:cNvSpPr txBox="1"/>
+          <p:nvPr/>
+        </p:nvSpPr>
+        <p:spPr>
+          <a:xfrm>
+            <a:off x="19701035" y="12896087"/>
+            <a:ext cx="4667725" cy="738633"/>
+          </a:xfrm>
+          <a:prstGeom prst="rect">
+            <a:avLst/>
+          </a:prstGeom>
+          <a:noFill/>
+          <a:ln w="9525" cap="flat" cmpd="sng">
+            <a:solidFill>
+              <a:schemeClr val="dk1"/>
+            </a:solidFill>
+            <a:prstDash val="solid"/>
+            <a:round/>
+            <a:headEnd type="none" w="sm" len="sm"/>
+            <a:tailEnd type="none" w="sm" len="sm"/>
+          </a:ln>
+        </p:spPr>
+        <p:txBody>
+          <a:bodyPr spcFirstLastPara="1" wrap="square" lIns="91425" tIns="91425" rIns="91425" bIns="91425" anchor="t" anchorCtr="0">
+            <a:spAutoFit/>
+          </a:bodyPr>
+          <a:lstStyle/>
+          <a:p>
+            <a:pPr marL="0" lvl="0" indent="0" algn="ctr" rtl="0">
+              <a:spcBef>
+                <a:spcPts val="0"/>
+              </a:spcBef>
+              <a:spcAft>
+                <a:spcPts val="0"/>
+              </a:spcAft>
+              <a:buNone/>
+            </a:pPr>
+            <a:r>
+              <a:rPr lang="en-US" sz="3600" u="sng" dirty="0">
+                <a:latin typeface="Helvetica Neue"/>
+                <a:ea typeface="Helvetica Neue"/>
+                <a:cs typeface="Helvetica Neue"/>
+                <a:sym typeface="Helvetica Neue"/>
+                <a:hlinkClick r:id="rId3"/>
+              </a:rPr>
+              <a:t>Code/Astro vocab list</a:t>
+            </a:r>
+            <a:endParaRPr sz="3600" dirty="0">
+              <a:latin typeface="Helvetica Neue"/>
+              <a:ea typeface="Helvetica Neue"/>
+              <a:cs typeface="Helvetica Neue"/>
+              <a:sym typeface="Helvetica Neue"/>
+            </a:endParaRPr>
+          </a:p>
+        </p:txBody>
+      </p:sp>
+      <p:sp>
+        <p:nvSpPr>
+          <p:cNvPr id="2" name="TextBox 1">
+            <a:extLst>
+              <a:ext uri="{FF2B5EF4-FFF2-40B4-BE49-F238E27FC236}">
+                <a16:creationId xmlns:a16="http://schemas.microsoft.com/office/drawing/2014/main" id="{6908548B-681F-2DBC-924E-B37C82221E54}"/>
+              </a:ext>
+            </a:extLst>
+          </p:cNvPr>
+          <p:cNvSpPr txBox="1"/>
+          <p:nvPr/>
+        </p:nvSpPr>
+        <p:spPr>
+          <a:xfrm>
+            <a:off x="8436841" y="2643220"/>
+            <a:ext cx="14920110" cy="1200329"/>
+          </a:xfrm>
+          <a:prstGeom prst="rect">
+            <a:avLst/>
+          </a:prstGeom>
+          <a:noFill/>
+        </p:spPr>
+        <p:txBody>
+          <a:bodyPr wrap="square" rtlCol="0">
+            <a:spAutoFit/>
+          </a:bodyPr>
+          <a:lstStyle/>
+          <a:p>
+            <a:r>
+              <a:rPr lang="en-US" sz="3600" dirty="0"/>
+              <a:t>1. The practice of storing changes you’ve made to your code alongside the code itself.</a:t>
+            </a:r>
+          </a:p>
+        </p:txBody>
+      </p:sp>
+      <p:sp>
+        <p:nvSpPr>
+          <p:cNvPr id="3" name="TextBox 2">
+            <a:extLst>
+              <a:ext uri="{FF2B5EF4-FFF2-40B4-BE49-F238E27FC236}">
+                <a16:creationId xmlns:a16="http://schemas.microsoft.com/office/drawing/2014/main" id="{A65AFF18-728B-F169-E4FF-4DC7D9C236B9}"/>
+              </a:ext>
+            </a:extLst>
+          </p:cNvPr>
+          <p:cNvSpPr txBox="1"/>
+          <p:nvPr/>
+        </p:nvSpPr>
+        <p:spPr>
+          <a:xfrm>
+            <a:off x="8436841" y="3932832"/>
+            <a:ext cx="14131158" cy="1200329"/>
+          </a:xfrm>
+          <a:prstGeom prst="rect">
+            <a:avLst/>
+          </a:prstGeom>
+          <a:noFill/>
+        </p:spPr>
+        <p:txBody>
+          <a:bodyPr wrap="square" rtlCol="0">
+            <a:spAutoFit/>
+          </a:bodyPr>
+          <a:lstStyle/>
+          <a:p>
+            <a:r>
+              <a:rPr lang="en-US" sz="3600" dirty="0"/>
+              <a:t>2. The current version of all code and documentation for a project, plus its history.</a:t>
+            </a:r>
+          </a:p>
+        </p:txBody>
+      </p:sp>
+      <p:sp>
+        <p:nvSpPr>
+          <p:cNvPr id="4" name="TextBox 3">
+            <a:extLst>
+              <a:ext uri="{FF2B5EF4-FFF2-40B4-BE49-F238E27FC236}">
+                <a16:creationId xmlns:a16="http://schemas.microsoft.com/office/drawing/2014/main" id="{B8AA63D4-1E5A-D7B3-9B00-99BBD2688182}"/>
+              </a:ext>
+            </a:extLst>
+          </p:cNvPr>
+          <p:cNvSpPr txBox="1"/>
+          <p:nvPr/>
+        </p:nvSpPr>
+        <p:spPr>
+          <a:xfrm>
+            <a:off x="8455663" y="5465242"/>
+            <a:ext cx="13815848" cy="1200329"/>
+          </a:xfrm>
+          <a:prstGeom prst="rect">
+            <a:avLst/>
+          </a:prstGeom>
+          <a:noFill/>
+        </p:spPr>
+        <p:txBody>
+          <a:bodyPr wrap="square" rtlCol="0">
+            <a:spAutoFit/>
+          </a:bodyPr>
+          <a:lstStyle/>
+          <a:p>
+            <a:r>
+              <a:rPr lang="en-US" sz="3600" dirty="0"/>
+              <a:t>3. To create a copy of a repository that you can edit on your computer.</a:t>
+            </a:r>
+          </a:p>
+        </p:txBody>
+      </p:sp>
+      <p:sp>
+        <p:nvSpPr>
+          <p:cNvPr id="5" name="TextBox 4">
+            <a:extLst>
+              <a:ext uri="{FF2B5EF4-FFF2-40B4-BE49-F238E27FC236}">
+                <a16:creationId xmlns:a16="http://schemas.microsoft.com/office/drawing/2014/main" id="{00128B70-5343-ECD7-5E31-463243CC3804}"/>
+              </a:ext>
+            </a:extLst>
+          </p:cNvPr>
+          <p:cNvSpPr txBox="1"/>
+          <p:nvPr/>
+        </p:nvSpPr>
+        <p:spPr>
+          <a:xfrm>
+            <a:off x="8455663" y="7035852"/>
+            <a:ext cx="14131158" cy="1200329"/>
+          </a:xfrm>
+          <a:prstGeom prst="rect">
+            <a:avLst/>
+          </a:prstGeom>
+          <a:noFill/>
+        </p:spPr>
+        <p:txBody>
+          <a:bodyPr wrap="square" rtlCol="0">
+            <a:spAutoFit/>
+          </a:bodyPr>
+          <a:lstStyle/>
+          <a:p>
+            <a:r>
+              <a:rPr lang="en-US" sz="3600" dirty="0"/>
+              <a:t>4. The smallest unit of a code’s history. A set of changes. (fun fact: at Google, these are called “CLs,” short for “change lists”).</a:t>
+            </a:r>
+          </a:p>
+        </p:txBody>
+      </p:sp>
+      <p:sp>
+        <p:nvSpPr>
+          <p:cNvPr id="6" name="TextBox 5">
+            <a:extLst>
+              <a:ext uri="{FF2B5EF4-FFF2-40B4-BE49-F238E27FC236}">
+                <a16:creationId xmlns:a16="http://schemas.microsoft.com/office/drawing/2014/main" id="{2155F2E7-9D78-66A0-8CAC-A6A2F4AE6F51}"/>
+              </a:ext>
+            </a:extLst>
+          </p:cNvPr>
+          <p:cNvSpPr txBox="1"/>
+          <p:nvPr/>
+        </p:nvSpPr>
+        <p:spPr>
+          <a:xfrm>
+            <a:off x="8436841" y="10126328"/>
+            <a:ext cx="17836772" cy="646331"/>
+          </a:xfrm>
+          <a:prstGeom prst="rect">
+            <a:avLst/>
+          </a:prstGeom>
+          <a:noFill/>
+        </p:spPr>
+        <p:txBody>
+          <a:bodyPr wrap="square" rtlCol="0">
+            <a:spAutoFit/>
+          </a:bodyPr>
+          <a:lstStyle/>
+          <a:p>
+            <a:r>
+              <a:rPr lang="en-US" sz="3600" dirty="0"/>
+              <a:t>6. A website that stores repositories (among other things).</a:t>
+            </a:r>
+          </a:p>
+        </p:txBody>
+      </p:sp>
+      <p:sp>
+        <p:nvSpPr>
+          <p:cNvPr id="7" name="TextBox 6">
+            <a:extLst>
+              <a:ext uri="{FF2B5EF4-FFF2-40B4-BE49-F238E27FC236}">
+                <a16:creationId xmlns:a16="http://schemas.microsoft.com/office/drawing/2014/main" id="{B2E15650-6407-4905-3C38-B3B31ABF5C9B}"/>
+              </a:ext>
+            </a:extLst>
+          </p:cNvPr>
+          <p:cNvSpPr txBox="1"/>
+          <p:nvPr/>
+        </p:nvSpPr>
+        <p:spPr>
+          <a:xfrm>
+            <a:off x="8455663" y="8883461"/>
+            <a:ext cx="17836772" cy="646331"/>
+          </a:xfrm>
+          <a:prstGeom prst="rect">
+            <a:avLst/>
+          </a:prstGeom>
+          <a:noFill/>
+        </p:spPr>
+        <p:txBody>
+          <a:bodyPr wrap="square" rtlCol="0">
+            <a:spAutoFit/>
+          </a:bodyPr>
+          <a:lstStyle/>
+          <a:p>
+            <a:r>
+              <a:rPr lang="en-US" sz="3600" dirty="0"/>
+              <a:t>5. A piece of software that defines, reads, and modifies repositories. </a:t>
+            </a:r>
+          </a:p>
+        </p:txBody>
+      </p:sp>
+      <p:sp>
+        <p:nvSpPr>
+          <p:cNvPr id="8" name="TextBox 7">
+            <a:extLst>
+              <a:ext uri="{FF2B5EF4-FFF2-40B4-BE49-F238E27FC236}">
+                <a16:creationId xmlns:a16="http://schemas.microsoft.com/office/drawing/2014/main" id="{3EA3498B-03A5-8039-4A2F-592742D00070}"/>
+              </a:ext>
+            </a:extLst>
+          </p:cNvPr>
+          <p:cNvSpPr txBox="1"/>
+          <p:nvPr/>
+        </p:nvSpPr>
+        <p:spPr>
+          <a:xfrm>
+            <a:off x="8436841" y="11525624"/>
+            <a:ext cx="16346551" cy="1200329"/>
+          </a:xfrm>
+          <a:prstGeom prst="rect">
+            <a:avLst/>
+          </a:prstGeom>
+          <a:noFill/>
+        </p:spPr>
+        <p:txBody>
+          <a:bodyPr wrap="square" rtlCol="0">
+            <a:spAutoFit/>
+          </a:bodyPr>
+          <a:lstStyle/>
+          <a:p>
+            <a:r>
+              <a:rPr lang="en-US" sz="3600" dirty="0"/>
+              <a:t>7. A pointer to a version of the main code that diverges from the main line of development.</a:t>
+            </a:r>
+          </a:p>
+        </p:txBody>
+      </p:sp>
+    </p:spTree>
+  </p:cSld>
+  <p:clrMapOvr>
+    <a:masterClrMapping/>
+  </p:clrMapOvr>
+  <p:timing>
+    <p:tnLst>
+      <p:par>
+        <p:cTn id="1" dur="indefinite" restart="never" nodeType="tmRoot">
+          <p:childTnLst>
+            <p:seq concurrent="1" nextAc="seek">
+              <p:cTn id="2" dur="indefinite" nodeType="mainSeq">
+                <p:childTnLst>
+                  <p:par>
+                    <p:cTn id="3" fill="hold">
+                      <p:stCondLst>
+                        <p:cond delay="indefinite"/>
+                      </p:stCondLst>
+                      <p:childTnLst>
+                        <p:par>
+                          <p:cTn id="4" fill="hold">
+                            <p:stCondLst>
+                              <p:cond delay="0"/>
+                            </p:stCondLst>
+                            <p:childTnLst>
+                              <p:par>
+                                <p:cTn id="5" presetID="1" presetClass="entr" presetSubtype="0" fill="hold" grpId="0" nodeType="clickEffect">
+                                  <p:stCondLst>
+                                    <p:cond delay="0"/>
+                                  </p:stCondLst>
+                                  <p:childTnLst>
+                                    <p:set>
+                                      <p:cBhvr>
+                                        <p:cTn id="6" dur="1" fill="hold">
+                                          <p:stCondLst>
+                                            <p:cond delay="0"/>
+                                          </p:stCondLst>
+                                        </p:cTn>
+                                        <p:tgtEl>
+                                          <p:spTgt spid="110"/>
+                                        </p:tgtEl>
+                                        <p:attrNameLst>
+                                          <p:attrName>style.visibility</p:attrName>
+                                        </p:attrNameLst>
+                                      </p:cBhvr>
+                                      <p:to>
+                                        <p:strVal val="visible"/>
+                                      </p:to>
+                                    </p:set>
+                                  </p:childTnLst>
+                                </p:cTn>
+                              </p:par>
+                            </p:childTnLst>
+                          </p:cTn>
+                        </p:par>
+                      </p:childTnLst>
+                    </p:cTn>
+                  </p:par>
+                </p:childTnLst>
+              </p:cTn>
+              <p:prevCondLst>
+                <p:cond evt="onPrev" delay="0">
+                  <p:tgtEl>
+                    <p:sldTgt/>
+                  </p:tgtEl>
+                </p:cond>
+              </p:prevCondLst>
+              <p:nextCondLst>
+                <p:cond evt="onNext" delay="0">
+                  <p:tgtEl>
+                    <p:sldTgt/>
+                  </p:tgtEl>
+                </p:cond>
+              </p:nextCondLst>
+            </p:seq>
+          </p:childTnLst>
+        </p:cTn>
+      </p:par>
+    </p:tnLst>
+    <p:bldLst>
+      <p:bldP spid="110" grpId="0" animBg="1"/>
+    </p:bldLst>
+  </p:timing>
+</p:sld>
+</file>
+
+<file path=ppt/slides/slide4.xml><?xml version="1.0" encoding="utf-8"?>
+<p:sld xmlns:a="http://schemas.openxmlformats.org/drawingml/2006/main" xmlns:r="http://schemas.openxmlformats.org/officeDocument/2006/relationships" xmlns:p="http://schemas.openxmlformats.org/presentationml/2006/main">
+  <p:cSld>
+    <p:spTree>
+      <p:nvGrpSpPr>
         <p:cNvPr id="1" name="Shape 93"/>
         <p:cNvGrpSpPr/>
         <p:nvPr/>
@@ -13925,7 +15344,7 @@
 </p:sld>
 </file>
 
-<file path=ppt/slides/slide4.xml><?xml version="1.0" encoding="utf-8"?>
+<file path=ppt/slides/slide5.xml><?xml version="1.0" encoding="utf-8"?>
 <p:sld xmlns:a="http://schemas.openxmlformats.org/drawingml/2006/main" xmlns:r="http://schemas.openxmlformats.org/officeDocument/2006/relationships" xmlns:p="http://schemas.openxmlformats.org/presentationml/2006/main">
   <p:cSld>
     <p:spTree>
@@ -14156,7 +15575,7 @@
 </p:sld>
 </file>
 
-<file path=ppt/slides/slide5.xml><?xml version="1.0" encoding="utf-8"?>
+<file path=ppt/slides/slide6.xml><?xml version="1.0" encoding="utf-8"?>
 <p:sld xmlns:a="http://schemas.openxmlformats.org/drawingml/2006/main" xmlns:r="http://schemas.openxmlformats.org/officeDocument/2006/relationships" xmlns:p="http://schemas.openxmlformats.org/presentationml/2006/main">
   <p:cSld>
     <p:spTree>
@@ -14420,7 +15839,7 @@
 </p:sld>
 </file>
 
-<file path=ppt/slides/slide6.xml><?xml version="1.0" encoding="utf-8"?>
+<file path=ppt/slides/slide7.xml><?xml version="1.0" encoding="utf-8"?>
 <p:sld xmlns:a="http://schemas.openxmlformats.org/drawingml/2006/main" xmlns:r="http://schemas.openxmlformats.org/officeDocument/2006/relationships" xmlns:p="http://schemas.openxmlformats.org/presentationml/2006/main">
   <p:cSld>
     <p:spTree>
@@ -14974,7 +16393,7 @@
 </p:sld>
 </file>
 
-<file path=ppt/slides/slide7.xml><?xml version="1.0" encoding="utf-8"?>
+<file path=ppt/slides/slide8.xml><?xml version="1.0" encoding="utf-8"?>
 <p:sld xmlns:a="http://schemas.openxmlformats.org/drawingml/2006/main" xmlns:r="http://schemas.openxmlformats.org/officeDocument/2006/relationships" xmlns:p="http://schemas.openxmlformats.org/presentationml/2006/main">
   <p:cSld>
     <p:spTree>
@@ -15958,7 +17377,7 @@
 </p:sld>
 </file>
 
-<file path=ppt/slides/slide8.xml><?xml version="1.0" encoding="utf-8"?>
+<file path=ppt/slides/slide9.xml><?xml version="1.0" encoding="utf-8"?>
 <p:sld xmlns:a="http://schemas.openxmlformats.org/drawingml/2006/main" xmlns:r="http://schemas.openxmlformats.org/officeDocument/2006/relationships" xmlns:p="http://schemas.openxmlformats.org/presentationml/2006/main">
   <p:cSld>
     <p:spTree>
@@ -17128,940 +18547,6 @@
         </p:txBody>
       </p:sp>
     </p:spTree>
-  </p:cSld>
-  <p:clrMapOvr>
-    <a:masterClrMapping/>
-  </p:clrMapOvr>
-</p:sld>
-</file>
-
-<file path=ppt/slides/slide9.xml><?xml version="1.0" encoding="utf-8"?>
-<p:sld xmlns:a="http://schemas.openxmlformats.org/drawingml/2006/main" xmlns:r="http://schemas.openxmlformats.org/officeDocument/2006/relationships" xmlns:p="http://schemas.openxmlformats.org/presentationml/2006/main">
-  <p:cSld>
-    <p:spTree>
-      <p:nvGrpSpPr>
-        <p:cNvPr id="1" name="Shape 196"/>
-        <p:cNvGrpSpPr/>
-        <p:nvPr/>
-      </p:nvGrpSpPr>
-      <p:grpSpPr>
-        <a:xfrm>
-          <a:off x="0" y="0"/>
-          <a:ext cx="0" cy="0"/>
-          <a:chOff x="0" y="0"/>
-          <a:chExt cx="0" cy="0"/>
-        </a:xfrm>
-      </p:grpSpPr>
-      <p:pic>
-        <p:nvPicPr>
-          <p:cNvPr id="197" name="Google Shape;197;p13" descr="Screenshot 2020-06-05 12.22.34.png"/>
-          <p:cNvPicPr preferRelativeResize="0"/>
-          <p:nvPr/>
-        </p:nvPicPr>
-        <p:blipFill rotWithShape="1">
-          <a:blip r:embed="rId3">
-            <a:alphaModFix/>
-          </a:blip>
-          <a:srcRect b="11825"/>
-          <a:stretch/>
-        </p:blipFill>
-        <p:spPr>
-          <a:xfrm>
-            <a:off x="2566743" y="2541399"/>
-            <a:ext cx="19250514" cy="9765931"/>
-          </a:xfrm>
-          <a:prstGeom prst="rect">
-            <a:avLst/>
-          </a:prstGeom>
-          <a:noFill/>
-          <a:ln>
-            <a:noFill/>
-          </a:ln>
-        </p:spPr>
-      </p:pic>
-      <p:sp>
-        <p:nvSpPr>
-          <p:cNvPr id="198" name="Google Shape;198;p13"/>
-          <p:cNvSpPr txBox="1">
-            <a:spLocks noGrp="1"/>
-          </p:cNvSpPr>
-          <p:nvPr>
-            <p:ph type="title"/>
-          </p:nvPr>
-        </p:nvSpPr>
-        <p:spPr>
-          <a:xfrm>
-            <a:off x="1689100" y="355600"/>
-            <a:ext cx="21005800" cy="2286000"/>
-          </a:xfrm>
-          <a:prstGeom prst="rect">
-            <a:avLst/>
-          </a:prstGeom>
-          <a:noFill/>
-          <a:ln>
-            <a:noFill/>
-          </a:ln>
-        </p:spPr>
-        <p:txBody>
-          <a:bodyPr spcFirstLastPara="1" wrap="square" lIns="50800" tIns="50800" rIns="50800" bIns="50800" anchor="ctr" anchorCtr="0">
-            <a:normAutofit/>
-          </a:bodyPr>
-          <a:lstStyle/>
-          <a:p>
-            <a:pPr marL="0" lvl="0" indent="0" algn="ctr" rtl="0">
-              <a:lnSpc>
-                <a:spcPct val="100000"/>
-              </a:lnSpc>
-              <a:spcBef>
-                <a:spcPts val="0"/>
-              </a:spcBef>
-              <a:spcAft>
-                <a:spcPts val="0"/>
-              </a:spcAft>
-              <a:buClr>
-                <a:srgbClr val="000000"/>
-              </a:buClr>
-              <a:buSzPts val="11200"/>
-              <a:buFont typeface="Helvetica Neue"/>
-              <a:buNone/>
-            </a:pPr>
-            <a:r>
-              <a:rPr lang="en-US" sz="7200" b="0" i="0" u="none" strike="noStrike" cap="none" dirty="0">
-                <a:solidFill>
-                  <a:srgbClr val="000000"/>
-                </a:solidFill>
-                <a:latin typeface="+mn-lt"/>
-                <a:ea typeface="Helvetica Neue"/>
-                <a:cs typeface="Helvetica Neue"/>
-                <a:sym typeface="Helvetica Neue"/>
-              </a:rPr>
-              <a:t>4. Merge into main</a:t>
-            </a:r>
-            <a:endParaRPr sz="7200" dirty="0">
-              <a:latin typeface="+mn-lt"/>
-            </a:endParaRPr>
-          </a:p>
-        </p:txBody>
-      </p:sp>
-      <p:sp>
-        <p:nvSpPr>
-          <p:cNvPr id="199" name="Google Shape;199;p13"/>
-          <p:cNvSpPr/>
-          <p:nvPr/>
-        </p:nvSpPr>
-        <p:spPr>
-          <a:xfrm>
-            <a:off x="14670332" y="10583134"/>
-            <a:ext cx="7146925" cy="1719842"/>
-          </a:xfrm>
-          <a:prstGeom prst="rect">
-            <a:avLst/>
-          </a:prstGeom>
-          <a:solidFill>
-            <a:srgbClr val="F5F5F5"/>
-          </a:solidFill>
-          <a:ln>
-            <a:noFill/>
-          </a:ln>
-        </p:spPr>
-        <p:txBody>
-          <a:bodyPr spcFirstLastPara="1" wrap="square" lIns="0" tIns="0" rIns="0" bIns="0" anchor="ctr" anchorCtr="0">
-            <a:noAutofit/>
-          </a:bodyPr>
-          <a:lstStyle/>
-          <a:p>
-            <a:pPr marL="0" marR="0" lvl="0" indent="0" algn="ctr" rtl="0">
-              <a:lnSpc>
-                <a:spcPct val="100000"/>
-              </a:lnSpc>
-              <a:spcBef>
-                <a:spcPts val="0"/>
-              </a:spcBef>
-              <a:spcAft>
-                <a:spcPts val="0"/>
-              </a:spcAft>
-              <a:buClr>
-                <a:srgbClr val="FFFFFF"/>
-              </a:buClr>
-              <a:buSzPts val="3200"/>
-              <a:buFont typeface="Helvetica Neue"/>
-              <a:buNone/>
-            </a:pPr>
-            <a:endParaRPr sz="3200" b="0" i="0" u="none" strike="noStrike" cap="none">
-              <a:solidFill>
-                <a:srgbClr val="FFFFFF"/>
-              </a:solidFill>
-              <a:latin typeface="Helvetica Neue"/>
-              <a:ea typeface="Helvetica Neue"/>
-              <a:cs typeface="Helvetica Neue"/>
-              <a:sym typeface="Helvetica Neue"/>
-            </a:endParaRPr>
-          </a:p>
-        </p:txBody>
-      </p:sp>
-      <p:sp>
-        <p:nvSpPr>
-          <p:cNvPr id="200" name="Google Shape;200;p13"/>
-          <p:cNvSpPr/>
-          <p:nvPr/>
-        </p:nvSpPr>
-        <p:spPr>
-          <a:xfrm>
-            <a:off x="8956802" y="5734935"/>
-            <a:ext cx="2729938" cy="2246130"/>
-          </a:xfrm>
-          <a:prstGeom prst="rect">
-            <a:avLst/>
-          </a:prstGeom>
-          <a:solidFill>
-            <a:srgbClr val="F5F5F5"/>
-          </a:solidFill>
-          <a:ln>
-            <a:noFill/>
-          </a:ln>
-        </p:spPr>
-        <p:txBody>
-          <a:bodyPr spcFirstLastPara="1" wrap="square" lIns="0" tIns="0" rIns="0" bIns="0" anchor="ctr" anchorCtr="0">
-            <a:noAutofit/>
-          </a:bodyPr>
-          <a:lstStyle/>
-          <a:p>
-            <a:pPr marL="0" marR="0" lvl="0" indent="0" algn="ctr" rtl="0">
-              <a:lnSpc>
-                <a:spcPct val="100000"/>
-              </a:lnSpc>
-              <a:spcBef>
-                <a:spcPts val="0"/>
-              </a:spcBef>
-              <a:spcAft>
-                <a:spcPts val="0"/>
-              </a:spcAft>
-              <a:buClr>
-                <a:srgbClr val="FFFFFF"/>
-              </a:buClr>
-              <a:buSzPts val="3200"/>
-              <a:buFont typeface="Helvetica Neue"/>
-              <a:buNone/>
-            </a:pPr>
-            <a:endParaRPr sz="3200" b="0" i="0" u="none" strike="noStrike" cap="none">
-              <a:solidFill>
-                <a:srgbClr val="FFFFFF"/>
-              </a:solidFill>
-              <a:latin typeface="Helvetica Neue"/>
-              <a:ea typeface="Helvetica Neue"/>
-              <a:cs typeface="Helvetica Neue"/>
-              <a:sym typeface="Helvetica Neue"/>
-            </a:endParaRPr>
-          </a:p>
-        </p:txBody>
-      </p:sp>
-      <p:sp>
-        <p:nvSpPr>
-          <p:cNvPr id="203" name="Google Shape;203;p13"/>
-          <p:cNvSpPr txBox="1"/>
-          <p:nvPr/>
-        </p:nvSpPr>
-        <p:spPr>
-          <a:xfrm>
-            <a:off x="3506109" y="3215894"/>
-            <a:ext cx="1264921" cy="548134"/>
-          </a:xfrm>
-          <a:prstGeom prst="rect">
-            <a:avLst/>
-          </a:prstGeom>
-          <a:solidFill>
-            <a:srgbClr val="B3E3FF"/>
-          </a:solidFill>
-          <a:ln>
-            <a:noFill/>
-          </a:ln>
-        </p:spPr>
-        <p:txBody>
-          <a:bodyPr spcFirstLastPara="1" wrap="square" lIns="50800" tIns="50800" rIns="50800" bIns="50800" anchor="ctr" anchorCtr="0">
-            <a:spAutoFit/>
-          </a:bodyPr>
-          <a:lstStyle/>
-          <a:p>
-            <a:pPr marL="0" marR="0" lvl="0" indent="0" algn="ctr" rtl="0">
-              <a:lnSpc>
-                <a:spcPct val="100000"/>
-              </a:lnSpc>
-              <a:spcBef>
-                <a:spcPts val="0"/>
-              </a:spcBef>
-              <a:spcAft>
-                <a:spcPts val="0"/>
-              </a:spcAft>
-              <a:buClr>
-                <a:srgbClr val="000000"/>
-              </a:buClr>
-              <a:buSzPts val="3000"/>
-              <a:buFont typeface="Helvetica Neue"/>
-              <a:buNone/>
-            </a:pPr>
-            <a:r>
-              <a:rPr lang="en-US" sz="3000" b="0" i="0" u="none" strike="noStrike" cap="none">
-                <a:solidFill>
-                  <a:srgbClr val="000000"/>
-                </a:solidFill>
-                <a:latin typeface="Helvetica Neue"/>
-                <a:ea typeface="Helvetica Neue"/>
-                <a:cs typeface="Helvetica Neue"/>
-                <a:sym typeface="Helvetica Neue"/>
-              </a:rPr>
-              <a:t>Main   </a:t>
-            </a:r>
-            <a:endParaRPr/>
-          </a:p>
-        </p:txBody>
-      </p:sp>
-      <p:sp>
-        <p:nvSpPr>
-          <p:cNvPr id="10" name="Rectangle 9">
-            <a:extLst>
-              <a:ext uri="{FF2B5EF4-FFF2-40B4-BE49-F238E27FC236}">
-                <a16:creationId xmlns:a16="http://schemas.microsoft.com/office/drawing/2014/main" id="{51F4AA09-C08B-5848-8FB7-C74D7A5FCF27}"/>
-              </a:ext>
-            </a:extLst>
-          </p:cNvPr>
-          <p:cNvSpPr/>
-          <p:nvPr/>
-        </p:nvSpPr>
-        <p:spPr>
-          <a:xfrm>
-            <a:off x="3029288" y="10428456"/>
-            <a:ext cx="5601761" cy="1874519"/>
-          </a:xfrm>
-          <a:prstGeom prst="rect">
-            <a:avLst/>
-          </a:prstGeom>
-          <a:solidFill>
-            <a:srgbClr val="F5F5F5"/>
-          </a:solidFill>
-          <a:ln>
-            <a:noFill/>
-          </a:ln>
-        </p:spPr>
-        <p:style>
-          <a:lnRef idx="2">
-            <a:schemeClr val="accent1">
-              <a:shade val="50000"/>
-            </a:schemeClr>
-          </a:lnRef>
-          <a:fillRef idx="1">
-            <a:schemeClr val="accent1"/>
-          </a:fillRef>
-          <a:effectRef idx="0">
-            <a:schemeClr val="accent1"/>
-          </a:effectRef>
-          <a:fontRef idx="minor">
-            <a:schemeClr val="lt1"/>
-          </a:fontRef>
-        </p:style>
-        <p:txBody>
-          <a:bodyPr rtlCol="0" anchor="ctr"/>
-          <a:lstStyle/>
-          <a:p>
-            <a:pPr algn="ctr"/>
-            <a:endParaRPr lang="en-US" dirty="0"/>
-          </a:p>
-        </p:txBody>
-      </p:sp>
-      <p:sp>
-        <p:nvSpPr>
-          <p:cNvPr id="11" name="Rectangle 10">
-            <a:extLst>
-              <a:ext uri="{FF2B5EF4-FFF2-40B4-BE49-F238E27FC236}">
-                <a16:creationId xmlns:a16="http://schemas.microsoft.com/office/drawing/2014/main" id="{8B1407B6-8D8F-F747-98F5-D43EB86F87CE}"/>
-              </a:ext>
-            </a:extLst>
-          </p:cNvPr>
-          <p:cNvSpPr/>
-          <p:nvPr/>
-        </p:nvSpPr>
-        <p:spPr>
-          <a:xfrm>
-            <a:off x="6806307" y="8896942"/>
-            <a:ext cx="1266745" cy="1829445"/>
-          </a:xfrm>
-          <a:prstGeom prst="rect">
-            <a:avLst/>
-          </a:prstGeom>
-          <a:solidFill>
-            <a:srgbClr val="F5F5F5"/>
-          </a:solidFill>
-          <a:ln>
-            <a:noFill/>
-          </a:ln>
-        </p:spPr>
-        <p:style>
-          <a:lnRef idx="2">
-            <a:schemeClr val="accent1">
-              <a:shade val="50000"/>
-            </a:schemeClr>
-          </a:lnRef>
-          <a:fillRef idx="1">
-            <a:schemeClr val="accent1"/>
-          </a:fillRef>
-          <a:effectRef idx="0">
-            <a:schemeClr val="accent1"/>
-          </a:effectRef>
-          <a:fontRef idx="minor">
-            <a:schemeClr val="lt1"/>
-          </a:fontRef>
-        </p:style>
-        <p:txBody>
-          <a:bodyPr rtlCol="0" anchor="ctr"/>
-          <a:lstStyle/>
-          <a:p>
-            <a:pPr algn="ctr"/>
-            <a:endParaRPr lang="en-US" dirty="0"/>
-          </a:p>
-        </p:txBody>
-      </p:sp>
-      <p:cxnSp>
-        <p:nvCxnSpPr>
-          <p:cNvPr id="12" name="Straight Connector 11">
-            <a:extLst>
-              <a:ext uri="{FF2B5EF4-FFF2-40B4-BE49-F238E27FC236}">
-                <a16:creationId xmlns:a16="http://schemas.microsoft.com/office/drawing/2014/main" id="{34A23E5E-0B14-7B4F-8E65-0E8DEAF3CF45}"/>
-              </a:ext>
-            </a:extLst>
-          </p:cNvPr>
-          <p:cNvCxnSpPr>
-            <a:cxnSpLocks/>
-          </p:cNvCxnSpPr>
-          <p:nvPr/>
-        </p:nvCxnSpPr>
-        <p:spPr>
-          <a:xfrm flipH="1">
-            <a:off x="6732165" y="9984662"/>
-            <a:ext cx="1800028" cy="0"/>
-          </a:xfrm>
-          <a:prstGeom prst="line">
-            <a:avLst/>
-          </a:prstGeom>
-          <a:ln w="107950">
-            <a:solidFill>
-              <a:srgbClr val="414141"/>
-            </a:solidFill>
-          </a:ln>
-        </p:spPr>
-        <p:style>
-          <a:lnRef idx="1">
-            <a:schemeClr val="accent1"/>
-          </a:lnRef>
-          <a:fillRef idx="0">
-            <a:schemeClr val="accent1"/>
-          </a:fillRef>
-          <a:effectRef idx="0">
-            <a:schemeClr val="accent1"/>
-          </a:effectRef>
-          <a:fontRef idx="minor">
-            <a:schemeClr val="tx1"/>
-          </a:fontRef>
-        </p:style>
-      </p:cxnSp>
-      <p:sp>
-        <p:nvSpPr>
-          <p:cNvPr id="13" name="Rectangle 12">
-            <a:extLst>
-              <a:ext uri="{FF2B5EF4-FFF2-40B4-BE49-F238E27FC236}">
-                <a16:creationId xmlns:a16="http://schemas.microsoft.com/office/drawing/2014/main" id="{06577297-76D3-FA47-8F9B-15AABC1AC8D9}"/>
-              </a:ext>
-            </a:extLst>
-          </p:cNvPr>
-          <p:cNvSpPr/>
-          <p:nvPr/>
-        </p:nvSpPr>
-        <p:spPr>
-          <a:xfrm>
-            <a:off x="9688398" y="7981065"/>
-            <a:ext cx="1266745" cy="1096386"/>
-          </a:xfrm>
-          <a:prstGeom prst="rect">
-            <a:avLst/>
-          </a:prstGeom>
-          <a:solidFill>
-            <a:srgbClr val="F5F5F5"/>
-          </a:solidFill>
-          <a:ln>
-            <a:noFill/>
-          </a:ln>
-        </p:spPr>
-        <p:style>
-          <a:lnRef idx="2">
-            <a:schemeClr val="accent1">
-              <a:shade val="50000"/>
-            </a:schemeClr>
-          </a:lnRef>
-          <a:fillRef idx="1">
-            <a:schemeClr val="accent1"/>
-          </a:fillRef>
-          <a:effectRef idx="0">
-            <a:schemeClr val="accent1"/>
-          </a:effectRef>
-          <a:fontRef idx="minor">
-            <a:schemeClr val="lt1"/>
-          </a:fontRef>
-        </p:style>
-        <p:txBody>
-          <a:bodyPr rtlCol="0" anchor="ctr"/>
-          <a:lstStyle/>
-          <a:p>
-            <a:pPr algn="ctr"/>
-            <a:endParaRPr lang="en-US" dirty="0"/>
-          </a:p>
-        </p:txBody>
-      </p:sp>
-      <p:cxnSp>
-        <p:nvCxnSpPr>
-          <p:cNvPr id="14" name="Straight Connector 13">
-            <a:extLst>
-              <a:ext uri="{FF2B5EF4-FFF2-40B4-BE49-F238E27FC236}">
-                <a16:creationId xmlns:a16="http://schemas.microsoft.com/office/drawing/2014/main" id="{4FD0EBA6-9D64-8747-8299-EF34C821E23F}"/>
-              </a:ext>
-            </a:extLst>
-          </p:cNvPr>
-          <p:cNvCxnSpPr>
-            <a:cxnSpLocks/>
-          </p:cNvCxnSpPr>
-          <p:nvPr/>
-        </p:nvCxnSpPr>
-        <p:spPr>
-          <a:xfrm flipH="1">
-            <a:off x="9446470" y="8512998"/>
-            <a:ext cx="1800028" cy="0"/>
-          </a:xfrm>
-          <a:prstGeom prst="line">
-            <a:avLst/>
-          </a:prstGeom>
-          <a:ln w="107950">
-            <a:solidFill>
-              <a:srgbClr val="414141"/>
-            </a:solidFill>
-          </a:ln>
-        </p:spPr>
-        <p:style>
-          <a:lnRef idx="1">
-            <a:schemeClr val="accent1"/>
-          </a:lnRef>
-          <a:fillRef idx="0">
-            <a:schemeClr val="accent1"/>
-          </a:fillRef>
-          <a:effectRef idx="0">
-            <a:schemeClr val="accent1"/>
-          </a:effectRef>
-          <a:fontRef idx="minor">
-            <a:schemeClr val="tx1"/>
-          </a:fontRef>
-        </p:style>
-      </p:cxnSp>
-      <p:sp>
-        <p:nvSpPr>
-          <p:cNvPr id="15" name="Rectangle 14">
-            <a:extLst>
-              <a:ext uri="{FF2B5EF4-FFF2-40B4-BE49-F238E27FC236}">
-                <a16:creationId xmlns:a16="http://schemas.microsoft.com/office/drawing/2014/main" id="{E2347BE9-0939-EC4C-A0CF-BCFCDB9219B6}"/>
-              </a:ext>
-            </a:extLst>
-          </p:cNvPr>
-          <p:cNvSpPr/>
-          <p:nvPr/>
-        </p:nvSpPr>
-        <p:spPr>
-          <a:xfrm>
-            <a:off x="9713669" y="9500617"/>
-            <a:ext cx="1266745" cy="1096386"/>
-          </a:xfrm>
-          <a:prstGeom prst="rect">
-            <a:avLst/>
-          </a:prstGeom>
-          <a:solidFill>
-            <a:srgbClr val="F5F5F5"/>
-          </a:solidFill>
-          <a:ln>
-            <a:noFill/>
-          </a:ln>
-        </p:spPr>
-        <p:style>
-          <a:lnRef idx="2">
-            <a:schemeClr val="accent1">
-              <a:shade val="50000"/>
-            </a:schemeClr>
-          </a:lnRef>
-          <a:fillRef idx="1">
-            <a:schemeClr val="accent1"/>
-          </a:fillRef>
-          <a:effectRef idx="0">
-            <a:schemeClr val="accent1"/>
-          </a:effectRef>
-          <a:fontRef idx="minor">
-            <a:schemeClr val="lt1"/>
-          </a:fontRef>
-        </p:style>
-        <p:txBody>
-          <a:bodyPr rtlCol="0" anchor="ctr"/>
-          <a:lstStyle/>
-          <a:p>
-            <a:pPr algn="ctr"/>
-            <a:endParaRPr lang="en-US" dirty="0"/>
-          </a:p>
-        </p:txBody>
-      </p:sp>
-      <p:cxnSp>
-        <p:nvCxnSpPr>
-          <p:cNvPr id="16" name="Straight Connector 15">
-            <a:extLst>
-              <a:ext uri="{FF2B5EF4-FFF2-40B4-BE49-F238E27FC236}">
-                <a16:creationId xmlns:a16="http://schemas.microsoft.com/office/drawing/2014/main" id="{8E619E55-491C-5F42-92DF-0EC0D778BCB4}"/>
-              </a:ext>
-            </a:extLst>
-          </p:cNvPr>
-          <p:cNvCxnSpPr>
-            <a:cxnSpLocks/>
-          </p:cNvCxnSpPr>
-          <p:nvPr/>
-        </p:nvCxnSpPr>
-        <p:spPr>
-          <a:xfrm flipH="1">
-            <a:off x="9500014" y="9954434"/>
-            <a:ext cx="1800028" cy="0"/>
-          </a:xfrm>
-          <a:prstGeom prst="line">
-            <a:avLst/>
-          </a:prstGeom>
-          <a:ln w="107950">
-            <a:solidFill>
-              <a:srgbClr val="414141"/>
-            </a:solidFill>
-          </a:ln>
-        </p:spPr>
-        <p:style>
-          <a:lnRef idx="1">
-            <a:schemeClr val="accent1"/>
-          </a:lnRef>
-          <a:fillRef idx="0">
-            <a:schemeClr val="accent1"/>
-          </a:fillRef>
-          <a:effectRef idx="0">
-            <a:schemeClr val="accent1"/>
-          </a:effectRef>
-          <a:fontRef idx="minor">
-            <a:schemeClr val="tx1"/>
-          </a:fontRef>
-        </p:style>
-      </p:cxnSp>
-      <p:sp>
-        <p:nvSpPr>
-          <p:cNvPr id="18" name="Rectangle 17">
-            <a:extLst>
-              <a:ext uri="{FF2B5EF4-FFF2-40B4-BE49-F238E27FC236}">
-                <a16:creationId xmlns:a16="http://schemas.microsoft.com/office/drawing/2014/main" id="{1E40074E-3C11-4F4E-B750-19551E3EE30C}"/>
-              </a:ext>
-            </a:extLst>
-          </p:cNvPr>
-          <p:cNvSpPr/>
-          <p:nvPr/>
-        </p:nvSpPr>
-        <p:spPr>
-          <a:xfrm>
-            <a:off x="11762970" y="10395371"/>
-            <a:ext cx="4646803" cy="1874519"/>
-          </a:xfrm>
-          <a:prstGeom prst="rect">
-            <a:avLst/>
-          </a:prstGeom>
-          <a:solidFill>
-            <a:srgbClr val="F5F5F5"/>
-          </a:solidFill>
-          <a:ln>
-            <a:noFill/>
-          </a:ln>
-        </p:spPr>
-        <p:style>
-          <a:lnRef idx="2">
-            <a:schemeClr val="accent1">
-              <a:shade val="50000"/>
-            </a:schemeClr>
-          </a:lnRef>
-          <a:fillRef idx="1">
-            <a:schemeClr val="accent1"/>
-          </a:fillRef>
-          <a:effectRef idx="0">
-            <a:schemeClr val="accent1"/>
-          </a:effectRef>
-          <a:fontRef idx="minor">
-            <a:schemeClr val="lt1"/>
-          </a:fontRef>
-        </p:style>
-        <p:txBody>
-          <a:bodyPr rtlCol="0" anchor="ctr"/>
-          <a:lstStyle/>
-          <a:p>
-            <a:pPr algn="ctr"/>
-            <a:endParaRPr lang="en-US" dirty="0"/>
-          </a:p>
-        </p:txBody>
-      </p:sp>
-      <p:sp>
-        <p:nvSpPr>
-          <p:cNvPr id="19" name="Rectangle 18">
-            <a:extLst>
-              <a:ext uri="{FF2B5EF4-FFF2-40B4-BE49-F238E27FC236}">
-                <a16:creationId xmlns:a16="http://schemas.microsoft.com/office/drawing/2014/main" id="{39F72549-CD58-DA47-B664-DA16198CEFEE}"/>
-              </a:ext>
-            </a:extLst>
-          </p:cNvPr>
-          <p:cNvSpPr/>
-          <p:nvPr/>
-        </p:nvSpPr>
-        <p:spPr>
-          <a:xfrm>
-            <a:off x="12088018" y="10028576"/>
-            <a:ext cx="1652349" cy="1874519"/>
-          </a:xfrm>
-          <a:prstGeom prst="rect">
-            <a:avLst/>
-          </a:prstGeom>
-          <a:solidFill>
-            <a:srgbClr val="F5F5F5"/>
-          </a:solidFill>
-          <a:ln>
-            <a:noFill/>
-          </a:ln>
-        </p:spPr>
-        <p:style>
-          <a:lnRef idx="2">
-            <a:schemeClr val="accent1">
-              <a:shade val="50000"/>
-            </a:schemeClr>
-          </a:lnRef>
-          <a:fillRef idx="1">
-            <a:schemeClr val="accent1"/>
-          </a:fillRef>
-          <a:effectRef idx="0">
-            <a:schemeClr val="accent1"/>
-          </a:effectRef>
-          <a:fontRef idx="minor">
-            <a:schemeClr val="lt1"/>
-          </a:fontRef>
-        </p:style>
-        <p:txBody>
-          <a:bodyPr rtlCol="0" anchor="ctr"/>
-          <a:lstStyle/>
-          <a:p>
-            <a:pPr algn="ctr"/>
-            <a:endParaRPr lang="en-US" dirty="0"/>
-          </a:p>
-        </p:txBody>
-      </p:sp>
-      <p:cxnSp>
-        <p:nvCxnSpPr>
-          <p:cNvPr id="20" name="Google Shape;202;p13">
-            <a:extLst>
-              <a:ext uri="{FF2B5EF4-FFF2-40B4-BE49-F238E27FC236}">
-                <a16:creationId xmlns:a16="http://schemas.microsoft.com/office/drawing/2014/main" id="{154699A9-7FCA-724C-91DE-741CE2808BD0}"/>
-              </a:ext>
-            </a:extLst>
-          </p:cNvPr>
-          <p:cNvCxnSpPr>
-            <a:cxnSpLocks/>
-          </p:cNvCxnSpPr>
-          <p:nvPr/>
-        </p:nvCxnSpPr>
-        <p:spPr>
-          <a:xfrm flipV="1">
-            <a:off x="11846816" y="10220006"/>
-            <a:ext cx="2040960" cy="1012762"/>
-          </a:xfrm>
-          <a:prstGeom prst="straightConnector1">
-            <a:avLst/>
-          </a:prstGeom>
-          <a:noFill/>
-          <a:ln w="127000" cap="flat" cmpd="sng">
-            <a:solidFill>
-              <a:srgbClr val="FF0000"/>
-            </a:solidFill>
-            <a:prstDash val="solid"/>
-            <a:miter lim="400000"/>
-            <a:headEnd type="none" w="sm" len="sm"/>
-            <a:tailEnd type="triangle" w="med" len="med"/>
-          </a:ln>
-        </p:spPr>
-      </p:cxnSp>
-      <p:cxnSp>
-        <p:nvCxnSpPr>
-          <p:cNvPr id="22" name="Google Shape;202;p13">
-            <a:extLst>
-              <a:ext uri="{FF2B5EF4-FFF2-40B4-BE49-F238E27FC236}">
-                <a16:creationId xmlns:a16="http://schemas.microsoft.com/office/drawing/2014/main" id="{FA55A6E1-E3E8-174F-8801-F6292B1C214A}"/>
-              </a:ext>
-            </a:extLst>
-          </p:cNvPr>
-          <p:cNvCxnSpPr>
-            <a:cxnSpLocks/>
-          </p:cNvCxnSpPr>
-          <p:nvPr/>
-        </p:nvCxnSpPr>
-        <p:spPr>
-          <a:xfrm flipV="1">
-            <a:off x="14670332" y="8723546"/>
-            <a:ext cx="2961294" cy="1103078"/>
-          </a:xfrm>
-          <a:prstGeom prst="straightConnector1">
-            <a:avLst/>
-          </a:prstGeom>
-          <a:noFill/>
-          <a:ln w="127000" cap="flat" cmpd="sng">
-            <a:solidFill>
-              <a:srgbClr val="FF0000"/>
-            </a:solidFill>
-            <a:prstDash val="solid"/>
-            <a:miter lim="400000"/>
-            <a:headEnd type="none" w="sm" len="sm"/>
-            <a:tailEnd type="triangle" w="med" len="med"/>
-          </a:ln>
-        </p:spPr>
-      </p:cxnSp>
-      <p:sp>
-        <p:nvSpPr>
-          <p:cNvPr id="25" name="Rectangle 24">
-            <a:extLst>
-              <a:ext uri="{FF2B5EF4-FFF2-40B4-BE49-F238E27FC236}">
-                <a16:creationId xmlns:a16="http://schemas.microsoft.com/office/drawing/2014/main" id="{530E4166-F09F-234C-B97D-A7F2252828B9}"/>
-              </a:ext>
-            </a:extLst>
-          </p:cNvPr>
-          <p:cNvSpPr/>
-          <p:nvPr/>
-        </p:nvSpPr>
-        <p:spPr>
-          <a:xfrm>
-            <a:off x="12086799" y="2735613"/>
-            <a:ext cx="3532909" cy="1508695"/>
-          </a:xfrm>
-          <a:prstGeom prst="rect">
-            <a:avLst/>
-          </a:prstGeom>
-          <a:solidFill>
-            <a:srgbClr val="F5F5F5"/>
-          </a:solidFill>
-          <a:ln>
-            <a:noFill/>
-          </a:ln>
-        </p:spPr>
-        <p:style>
-          <a:lnRef idx="2">
-            <a:schemeClr val="accent1">
-              <a:shade val="50000"/>
-            </a:schemeClr>
-          </a:lnRef>
-          <a:fillRef idx="1">
-            <a:schemeClr val="accent1"/>
-          </a:fillRef>
-          <a:effectRef idx="0">
-            <a:schemeClr val="accent1"/>
-          </a:effectRef>
-          <a:fontRef idx="minor">
-            <a:schemeClr val="lt1"/>
-          </a:fontRef>
-        </p:style>
-        <p:txBody>
-          <a:bodyPr rtlCol="0" anchor="ctr"/>
-          <a:lstStyle/>
-          <a:p>
-            <a:pPr algn="ctr"/>
-            <a:endParaRPr lang="en-US" dirty="0"/>
-          </a:p>
-        </p:txBody>
-      </p:sp>
-      <p:sp>
-        <p:nvSpPr>
-          <p:cNvPr id="23" name="TextBox 22">
-            <a:extLst>
-              <a:ext uri="{FF2B5EF4-FFF2-40B4-BE49-F238E27FC236}">
-                <a16:creationId xmlns:a16="http://schemas.microsoft.com/office/drawing/2014/main" id="{3EC0232B-692F-834C-B3DC-E9F8F5633EAC}"/>
-              </a:ext>
-            </a:extLst>
-          </p:cNvPr>
-          <p:cNvSpPr txBox="1"/>
-          <p:nvPr/>
-        </p:nvSpPr>
-        <p:spPr>
-          <a:xfrm>
-            <a:off x="13121340" y="10839471"/>
-            <a:ext cx="3673798" cy="630942"/>
-          </a:xfrm>
-          <a:prstGeom prst="rect">
-            <a:avLst/>
-          </a:prstGeom>
-          <a:noFill/>
-        </p:spPr>
-        <p:txBody>
-          <a:bodyPr wrap="square" rtlCol="0">
-            <a:spAutoFit/>
-          </a:bodyPr>
-          <a:lstStyle/>
-          <a:p>
-            <a:pPr algn="ctr"/>
-            <a:r>
-              <a:rPr lang="en-US" sz="3500" dirty="0">
-                <a:solidFill>
-                  <a:srgbClr val="FF0000"/>
-                </a:solidFill>
-              </a:rPr>
-              <a:t>Pull Request # 1</a:t>
-            </a:r>
-          </a:p>
-        </p:txBody>
-      </p:sp>
-      <p:sp>
-        <p:nvSpPr>
-          <p:cNvPr id="24" name="TextBox 23">
-            <a:extLst>
-              <a:ext uri="{FF2B5EF4-FFF2-40B4-BE49-F238E27FC236}">
-                <a16:creationId xmlns:a16="http://schemas.microsoft.com/office/drawing/2014/main" id="{150370D1-A4F5-F249-8F76-7AE51C7517DC}"/>
-              </a:ext>
-            </a:extLst>
-          </p:cNvPr>
-          <p:cNvSpPr txBox="1"/>
-          <p:nvPr/>
-        </p:nvSpPr>
-        <p:spPr>
-          <a:xfrm>
-            <a:off x="16281957" y="9188915"/>
-            <a:ext cx="3673798" cy="630942"/>
-          </a:xfrm>
-          <a:prstGeom prst="rect">
-            <a:avLst/>
-          </a:prstGeom>
-          <a:noFill/>
-        </p:spPr>
-        <p:txBody>
-          <a:bodyPr wrap="square" rtlCol="0">
-            <a:spAutoFit/>
-          </a:bodyPr>
-          <a:lstStyle/>
-          <a:p>
-            <a:pPr algn="ctr"/>
-            <a:r>
-              <a:rPr lang="en-US" sz="3500" dirty="0">
-                <a:solidFill>
-                  <a:srgbClr val="FF0000"/>
-                </a:solidFill>
-              </a:rPr>
-              <a:t>Pull Request # 2</a:t>
-            </a:r>
-          </a:p>
-        </p:txBody>
-      </p:sp>
-    </p:spTree>
-    <p:extLst>
-      <p:ext uri="{BB962C8B-B14F-4D97-AF65-F5344CB8AC3E}">
-        <p14:creationId xmlns:p14="http://schemas.microsoft.com/office/powerpoint/2010/main" val="2495907393"/>
-      </p:ext>
-    </p:extLst>
   </p:cSld>
   <p:clrMapOvr>
     <a:masterClrMapping/>

</xml_diff>